<commit_message>
presentation about 90% complete; feedback welcomed
</commit_message>
<xml_diff>
--- a/docs/presentations/LeanUx - IT Management.pptx
+++ b/docs/presentations/LeanUx - IT Management.pptx
@@ -14,7 +14,8 @@
     <p:sldId id="265" r:id="rId8"/>
     <p:sldId id="266" r:id="rId9"/>
     <p:sldId id="267" r:id="rId10"/>
-    <p:sldId id="268" r:id="rId11"/>
+    <p:sldId id="269" r:id="rId11"/>
+    <p:sldId id="268" r:id="rId12"/>
   </p:sldIdLst>
   <p:sldSz cx="9144000" cy="6858000" type="screen4x3"/>
   <p:notesSz cx="6858000" cy="9144000"/>
@@ -3489,14 +3490,107 @@
 </file>
 
 <file path=ppt/diagrams/colors5.xml><?xml version="1.0" encoding="utf-8"?>
-<dgm:colorsDef xmlns:dgm="http://schemas.openxmlformats.org/drawingml/2006/diagram" xmlns:a="http://schemas.openxmlformats.org/drawingml/2006/main" uniqueId="urn:microsoft.com/office/officeart/2005/8/colors/accent1_2">
+<dgm:colorsDef xmlns:dgm="http://schemas.openxmlformats.org/drawingml/2006/diagram" xmlns:a="http://schemas.openxmlformats.org/drawingml/2006/main" uniqueId="urn:microsoft.com/office/officeart/2005/8/colors/colorful4">
   <dgm:title val=""/>
   <dgm:desc val=""/>
   <dgm:catLst>
-    <dgm:cat type="accent1" pri="11200"/>
+    <dgm:cat type="colorful" pri="10400"/>
   </dgm:catLst>
   <dgm:styleLbl name="node0">
     <dgm:fillClrLst meth="repeat">
+      <a:schemeClr val="accent3"/>
+    </dgm:fillClrLst>
+    <dgm:linClrLst meth="repeat">
+      <a:schemeClr val="lt1"/>
+    </dgm:linClrLst>
+    <dgm:effectClrLst/>
+    <dgm:txLinClrLst/>
+    <dgm:txFillClrLst/>
+    <dgm:txEffectClrLst/>
+  </dgm:styleLbl>
+  <dgm:styleLbl name="node1">
+    <dgm:fillClrLst>
+      <a:schemeClr val="accent4"/>
+      <a:schemeClr val="accent5"/>
+    </dgm:fillClrLst>
+    <dgm:linClrLst meth="repeat">
+      <a:schemeClr val="lt1"/>
+    </dgm:linClrLst>
+    <dgm:effectClrLst/>
+    <dgm:txLinClrLst/>
+    <dgm:txFillClrLst/>
+    <dgm:txEffectClrLst/>
+  </dgm:styleLbl>
+  <dgm:styleLbl name="alignNode1">
+    <dgm:fillClrLst>
+      <a:schemeClr val="accent4"/>
+      <a:schemeClr val="accent5"/>
+    </dgm:fillClrLst>
+    <dgm:linClrLst>
+      <a:schemeClr val="accent4"/>
+      <a:schemeClr val="accent5"/>
+    </dgm:linClrLst>
+    <dgm:effectClrLst/>
+    <dgm:txLinClrLst/>
+    <dgm:txFillClrLst/>
+    <dgm:txEffectClrLst/>
+  </dgm:styleLbl>
+  <dgm:styleLbl name="lnNode1">
+    <dgm:fillClrLst>
+      <a:schemeClr val="accent4"/>
+      <a:schemeClr val="accent5"/>
+    </dgm:fillClrLst>
+    <dgm:linClrLst meth="repeat">
+      <a:schemeClr val="lt1"/>
+    </dgm:linClrLst>
+    <dgm:effectClrLst/>
+    <dgm:txLinClrLst/>
+    <dgm:txFillClrLst/>
+    <dgm:txEffectClrLst/>
+  </dgm:styleLbl>
+  <dgm:styleLbl name="vennNode1">
+    <dgm:fillClrLst>
+      <a:schemeClr val="accent4">
+        <a:alpha val="50000"/>
+      </a:schemeClr>
+      <a:schemeClr val="accent5">
+        <a:alpha val="50000"/>
+      </a:schemeClr>
+    </dgm:fillClrLst>
+    <dgm:linClrLst meth="repeat">
+      <a:schemeClr val="lt1"/>
+    </dgm:linClrLst>
+    <dgm:effectClrLst/>
+    <dgm:txLinClrLst/>
+    <dgm:txFillClrLst/>
+    <dgm:txEffectClrLst/>
+  </dgm:styleLbl>
+  <dgm:styleLbl name="node2">
+    <dgm:fillClrLst>
+      <a:schemeClr val="accent5"/>
+    </dgm:fillClrLst>
+    <dgm:linClrLst meth="repeat">
+      <a:schemeClr val="lt1"/>
+    </dgm:linClrLst>
+    <dgm:effectClrLst/>
+    <dgm:txLinClrLst/>
+    <dgm:txFillClrLst/>
+    <dgm:txEffectClrLst/>
+  </dgm:styleLbl>
+  <dgm:styleLbl name="node3">
+    <dgm:fillClrLst>
+      <a:schemeClr val="accent6"/>
+    </dgm:fillClrLst>
+    <dgm:linClrLst meth="repeat">
+      <a:schemeClr val="lt1"/>
+    </dgm:linClrLst>
+    <dgm:effectClrLst/>
+    <dgm:txLinClrLst/>
+    <dgm:txFillClrLst/>
+    <dgm:txEffectClrLst/>
+  </dgm:styleLbl>
+  <dgm:styleLbl name="node4">
+    <dgm:fillClrLst>
       <a:schemeClr val="accent1"/>
     </dgm:fillClrLst>
     <dgm:linClrLst meth="repeat">
@@ -3507,95 +3601,12 @@
     <dgm:txFillClrLst/>
     <dgm:txEffectClrLst/>
   </dgm:styleLbl>
-  <dgm:styleLbl name="alignNode1">
-    <dgm:fillClrLst meth="repeat">
-      <a:schemeClr val="accent1"/>
-    </dgm:fillClrLst>
-    <dgm:linClrLst meth="repeat">
-      <a:schemeClr val="accent1"/>
-    </dgm:linClrLst>
-    <dgm:effectClrLst/>
-    <dgm:txLinClrLst/>
-    <dgm:txFillClrLst/>
-    <dgm:txEffectClrLst/>
-  </dgm:styleLbl>
-  <dgm:styleLbl name="node1">
-    <dgm:fillClrLst meth="repeat">
-      <a:schemeClr val="accent1"/>
-    </dgm:fillClrLst>
-    <dgm:linClrLst meth="repeat">
-      <a:schemeClr val="lt1"/>
-    </dgm:linClrLst>
-    <dgm:effectClrLst/>
-    <dgm:txLinClrLst/>
-    <dgm:txFillClrLst/>
-    <dgm:txEffectClrLst/>
-  </dgm:styleLbl>
-  <dgm:styleLbl name="lnNode1">
-    <dgm:fillClrLst meth="repeat">
-      <a:schemeClr val="accent1"/>
-    </dgm:fillClrLst>
-    <dgm:linClrLst meth="repeat">
-      <a:schemeClr val="lt1"/>
-    </dgm:linClrLst>
-    <dgm:effectClrLst/>
-    <dgm:txLinClrLst/>
-    <dgm:txFillClrLst/>
-    <dgm:txEffectClrLst/>
-  </dgm:styleLbl>
-  <dgm:styleLbl name="vennNode1">
-    <dgm:fillClrLst meth="repeat">
-      <a:schemeClr val="accent1">
-        <a:alpha val="50000"/>
-      </a:schemeClr>
-    </dgm:fillClrLst>
-    <dgm:linClrLst meth="repeat">
-      <a:schemeClr val="lt1"/>
-    </dgm:linClrLst>
-    <dgm:effectClrLst/>
-    <dgm:txLinClrLst/>
-    <dgm:txFillClrLst/>
-    <dgm:txEffectClrLst/>
-  </dgm:styleLbl>
-  <dgm:styleLbl name="node2">
-    <dgm:fillClrLst meth="repeat">
-      <a:schemeClr val="accent1"/>
-    </dgm:fillClrLst>
-    <dgm:linClrLst meth="repeat">
-      <a:schemeClr val="lt1"/>
-    </dgm:linClrLst>
-    <dgm:effectClrLst/>
-    <dgm:txLinClrLst/>
-    <dgm:txFillClrLst/>
-    <dgm:txEffectClrLst/>
-  </dgm:styleLbl>
-  <dgm:styleLbl name="node3">
-    <dgm:fillClrLst meth="repeat">
-      <a:schemeClr val="accent1"/>
-    </dgm:fillClrLst>
-    <dgm:linClrLst meth="repeat">
-      <a:schemeClr val="lt1"/>
-    </dgm:linClrLst>
-    <dgm:effectClrLst/>
-    <dgm:txLinClrLst/>
-    <dgm:txFillClrLst/>
-    <dgm:txEffectClrLst/>
-  </dgm:styleLbl>
-  <dgm:styleLbl name="node4">
-    <dgm:fillClrLst meth="repeat">
-      <a:schemeClr val="accent1"/>
-    </dgm:fillClrLst>
-    <dgm:linClrLst meth="repeat">
-      <a:schemeClr val="lt1"/>
-    </dgm:linClrLst>
-    <dgm:effectClrLst/>
-    <dgm:txLinClrLst/>
-    <dgm:txFillClrLst/>
-    <dgm:txEffectClrLst/>
-  </dgm:styleLbl>
   <dgm:styleLbl name="fgImgPlace1">
-    <dgm:fillClrLst meth="repeat">
-      <a:schemeClr val="accent1">
+    <dgm:fillClrLst>
+      <a:schemeClr val="accent4">
+        <a:tint val="50000"/>
+      </a:schemeClr>
+      <a:schemeClr val="accent5">
         <a:tint val="50000"/>
       </a:schemeClr>
     </dgm:fillClrLst>
@@ -3610,9 +3621,12 @@
     <dgm:txEffectClrLst/>
   </dgm:styleLbl>
   <dgm:styleLbl name="alignImgPlace1">
-    <dgm:fillClrLst meth="repeat">
-      <a:schemeClr val="accent1">
+    <dgm:fillClrLst>
+      <a:schemeClr val="accent4">
         <a:tint val="50000"/>
+      </a:schemeClr>
+      <a:schemeClr val="accent5">
+        <a:tint val="20000"/>
       </a:schemeClr>
     </dgm:fillClrLst>
     <dgm:linClrLst meth="repeat">
@@ -3626,9 +3640,12 @@
     <dgm:txEffectClrLst/>
   </dgm:styleLbl>
   <dgm:styleLbl name="bgImgPlace1">
-    <dgm:fillClrLst meth="repeat">
-      <a:schemeClr val="accent1">
+    <dgm:fillClrLst>
+      <a:schemeClr val="accent4">
         <a:tint val="50000"/>
+      </a:schemeClr>
+      <a:schemeClr val="accent5">
+        <a:tint val="20000"/>
       </a:schemeClr>
     </dgm:fillClrLst>
     <dgm:linClrLst meth="repeat">
@@ -3642,15 +3659,12 @@
     <dgm:txEffectClrLst/>
   </dgm:styleLbl>
   <dgm:styleLbl name="sibTrans2D1">
-    <dgm:fillClrLst meth="repeat">
-      <a:schemeClr val="accent1">
-        <a:tint val="60000"/>
-      </a:schemeClr>
+    <dgm:fillClrLst>
+      <a:schemeClr val="accent4"/>
+      <a:schemeClr val="accent5"/>
     </dgm:fillClrLst>
     <dgm:linClrLst meth="repeat">
-      <a:schemeClr val="accent1">
-        <a:tint val="60000"/>
-      </a:schemeClr>
+      <a:schemeClr val="lt1"/>
     </dgm:linClrLst>
     <dgm:effectClrLst/>
     <dgm:txLinClrLst/>
@@ -3658,14 +3672,71 @@
     <dgm:txEffectClrLst/>
   </dgm:styleLbl>
   <dgm:styleLbl name="fgSibTrans2D1">
-    <dgm:fillClrLst meth="repeat">
-      <a:schemeClr val="accent1">
-        <a:tint val="60000"/>
-      </a:schemeClr>
+    <dgm:fillClrLst>
+      <a:schemeClr val="accent4"/>
+      <a:schemeClr val="accent5"/>
     </dgm:fillClrLst>
     <dgm:linClrLst meth="repeat">
-      <a:schemeClr val="accent1">
-        <a:tint val="60000"/>
+      <a:schemeClr val="lt1"/>
+    </dgm:linClrLst>
+    <dgm:effectClrLst/>
+    <dgm:txLinClrLst/>
+    <dgm:txFillClrLst meth="repeat">
+      <a:schemeClr val="lt1"/>
+    </dgm:txFillClrLst>
+    <dgm:txEffectClrLst/>
+  </dgm:styleLbl>
+  <dgm:styleLbl name="bgSibTrans2D1">
+    <dgm:fillClrLst>
+      <a:schemeClr val="accent4"/>
+      <a:schemeClr val="accent5"/>
+    </dgm:fillClrLst>
+    <dgm:linClrLst meth="repeat">
+      <a:schemeClr val="lt1"/>
+    </dgm:linClrLst>
+    <dgm:effectClrLst/>
+    <dgm:txLinClrLst/>
+    <dgm:txFillClrLst meth="repeat">
+      <a:schemeClr val="lt1"/>
+    </dgm:txFillClrLst>
+    <dgm:txEffectClrLst/>
+  </dgm:styleLbl>
+  <dgm:styleLbl name="sibTrans1D1">
+    <dgm:fillClrLst/>
+    <dgm:linClrLst>
+      <a:schemeClr val="accent4"/>
+      <a:schemeClr val="accent5"/>
+    </dgm:linClrLst>
+    <dgm:effectClrLst/>
+    <dgm:txLinClrLst/>
+    <dgm:txFillClrLst meth="repeat">
+      <a:schemeClr val="tx1"/>
+    </dgm:txFillClrLst>
+    <dgm:txEffectClrLst/>
+  </dgm:styleLbl>
+  <dgm:styleLbl name="callout">
+    <dgm:fillClrLst meth="repeat">
+      <a:schemeClr val="accent4"/>
+    </dgm:fillClrLst>
+    <dgm:linClrLst meth="repeat">
+      <a:schemeClr val="accent4">
+        <a:tint val="50000"/>
+      </a:schemeClr>
+    </dgm:linClrLst>
+    <dgm:effectClrLst/>
+    <dgm:txLinClrLst/>
+    <dgm:txFillClrLst meth="repeat">
+      <a:schemeClr val="tx1"/>
+    </dgm:txFillClrLst>
+    <dgm:txEffectClrLst/>
+  </dgm:styleLbl>
+  <dgm:styleLbl name="asst0">
+    <dgm:fillClrLst meth="repeat">
+      <a:schemeClr val="accent4"/>
+    </dgm:fillClrLst>
+    <dgm:linClrLst meth="repeat">
+      <a:schemeClr val="lt1">
+        <a:shade val="80000"/>
       </a:schemeClr>
     </dgm:linClrLst>
     <dgm:effectClrLst/>
@@ -3673,15 +3744,13 @@
     <dgm:txFillClrLst/>
     <dgm:txEffectClrLst/>
   </dgm:styleLbl>
-  <dgm:styleLbl name="bgSibTrans2D1">
+  <dgm:styleLbl name="asst1">
     <dgm:fillClrLst meth="repeat">
-      <a:schemeClr val="accent1">
-        <a:tint val="60000"/>
-      </a:schemeClr>
+      <a:schemeClr val="accent5"/>
     </dgm:fillClrLst>
     <dgm:linClrLst meth="repeat">
-      <a:schemeClr val="accent1">
-        <a:tint val="60000"/>
+      <a:schemeClr val="lt1">
+        <a:shade val="80000"/>
       </a:schemeClr>
     </dgm:linClrLst>
     <dgm:effectClrLst/>
@@ -3689,9 +3758,145 @@
     <dgm:txFillClrLst/>
     <dgm:txEffectClrLst/>
   </dgm:styleLbl>
-  <dgm:styleLbl name="sibTrans1D1">
+  <dgm:styleLbl name="asst2">
+    <dgm:fillClrLst>
+      <a:schemeClr val="accent6"/>
+    </dgm:fillClrLst>
+    <dgm:linClrLst meth="repeat">
+      <a:schemeClr val="lt1"/>
+    </dgm:linClrLst>
+    <dgm:effectClrLst/>
+    <dgm:txLinClrLst/>
+    <dgm:txFillClrLst/>
+    <dgm:txEffectClrLst/>
+  </dgm:styleLbl>
+  <dgm:styleLbl name="asst3">
+    <dgm:fillClrLst>
+      <a:schemeClr val="accent1"/>
+    </dgm:fillClrLst>
+    <dgm:linClrLst meth="repeat">
+      <a:schemeClr val="lt1"/>
+    </dgm:linClrLst>
+    <dgm:effectClrLst/>
+    <dgm:txLinClrLst/>
+    <dgm:txFillClrLst/>
+    <dgm:txEffectClrLst/>
+  </dgm:styleLbl>
+  <dgm:styleLbl name="asst4">
+    <dgm:fillClrLst>
+      <a:schemeClr val="accent2"/>
+    </dgm:fillClrLst>
+    <dgm:linClrLst meth="repeat">
+      <a:schemeClr val="lt1"/>
+    </dgm:linClrLst>
+    <dgm:effectClrLst/>
+    <dgm:txLinClrLst/>
+    <dgm:txFillClrLst/>
+    <dgm:txEffectClrLst/>
+  </dgm:styleLbl>
+  <dgm:styleLbl name="parChTrans2D1">
     <dgm:fillClrLst meth="repeat">
-      <a:schemeClr val="accent1"/>
+      <a:schemeClr val="accent4"/>
+    </dgm:fillClrLst>
+    <dgm:linClrLst meth="repeat">
+      <a:schemeClr val="lt1"/>
+    </dgm:linClrLst>
+    <dgm:effectClrLst/>
+    <dgm:txLinClrLst/>
+    <dgm:txFillClrLst meth="repeat">
+      <a:schemeClr val="lt1"/>
+    </dgm:txFillClrLst>
+    <dgm:txEffectClrLst/>
+  </dgm:styleLbl>
+  <dgm:styleLbl name="parChTrans2D2">
+    <dgm:fillClrLst meth="repeat">
+      <a:schemeClr val="accent5"/>
+    </dgm:fillClrLst>
+    <dgm:linClrLst meth="repeat">
+      <a:schemeClr val="lt1"/>
+    </dgm:linClrLst>
+    <dgm:effectClrLst/>
+    <dgm:txLinClrLst/>
+    <dgm:txFillClrLst/>
+    <dgm:txEffectClrLst/>
+  </dgm:styleLbl>
+  <dgm:styleLbl name="parChTrans2D3">
+    <dgm:fillClrLst meth="repeat">
+      <a:schemeClr val="accent5"/>
+    </dgm:fillClrLst>
+    <dgm:linClrLst meth="repeat">
+      <a:schemeClr val="lt1"/>
+    </dgm:linClrLst>
+    <dgm:effectClrLst/>
+    <dgm:txLinClrLst/>
+    <dgm:txFillClrLst/>
+    <dgm:txEffectClrLst/>
+  </dgm:styleLbl>
+  <dgm:styleLbl name="parChTrans2D4">
+    <dgm:fillClrLst meth="repeat">
+      <a:schemeClr val="accent6"/>
+    </dgm:fillClrLst>
+    <dgm:linClrLst meth="repeat">
+      <a:schemeClr val="lt1"/>
+    </dgm:linClrLst>
+    <dgm:effectClrLst/>
+    <dgm:txLinClrLst/>
+    <dgm:txFillClrLst meth="repeat">
+      <a:schemeClr val="lt1"/>
+    </dgm:txFillClrLst>
+    <dgm:txEffectClrLst/>
+  </dgm:styleLbl>
+  <dgm:styleLbl name="parChTrans1D1">
+    <dgm:fillClrLst meth="repeat">
+      <a:schemeClr val="accent4"/>
+    </dgm:fillClrLst>
+    <dgm:linClrLst meth="repeat">
+      <a:schemeClr val="accent4"/>
+    </dgm:linClrLst>
+    <dgm:effectClrLst/>
+    <dgm:txLinClrLst/>
+    <dgm:txFillClrLst meth="repeat">
+      <a:schemeClr val="tx1"/>
+    </dgm:txFillClrLst>
+    <dgm:txEffectClrLst/>
+  </dgm:styleLbl>
+  <dgm:styleLbl name="parChTrans1D2">
+    <dgm:fillClrLst meth="repeat">
+      <a:schemeClr val="accent4">
+        <a:tint val="90000"/>
+      </a:schemeClr>
+    </dgm:fillClrLst>
+    <dgm:linClrLst meth="repeat">
+      <a:schemeClr val="accent5"/>
+    </dgm:linClrLst>
+    <dgm:effectClrLst/>
+    <dgm:txLinClrLst/>
+    <dgm:txFillClrLst meth="repeat">
+      <a:schemeClr val="tx1"/>
+    </dgm:txFillClrLst>
+    <dgm:txEffectClrLst/>
+  </dgm:styleLbl>
+  <dgm:styleLbl name="parChTrans1D3">
+    <dgm:fillClrLst meth="repeat">
+      <a:schemeClr val="accent4">
+        <a:tint val="70000"/>
+      </a:schemeClr>
+    </dgm:fillClrLst>
+    <dgm:linClrLst meth="repeat">
+      <a:schemeClr val="accent6"/>
+    </dgm:linClrLst>
+    <dgm:effectClrLst/>
+    <dgm:txLinClrLst/>
+    <dgm:txFillClrLst meth="repeat">
+      <a:schemeClr val="tx1"/>
+    </dgm:txFillClrLst>
+    <dgm:txEffectClrLst/>
+  </dgm:styleLbl>
+  <dgm:styleLbl name="parChTrans1D4">
+    <dgm:fillClrLst meth="repeat">
+      <a:schemeClr val="accent4">
+        <a:tint val="50000"/>
+      </a:schemeClr>
     </dgm:fillClrLst>
     <dgm:linClrLst meth="repeat">
       <a:schemeClr val="accent1"/>
@@ -3703,213 +3908,274 @@
     </dgm:txFillClrLst>
     <dgm:txEffectClrLst/>
   </dgm:styleLbl>
-  <dgm:styleLbl name="callout">
+  <dgm:styleLbl name="fgAcc1">
     <dgm:fillClrLst meth="repeat">
-      <a:schemeClr val="accent1"/>
+      <a:schemeClr val="lt1">
+        <a:alpha val="90000"/>
+      </a:schemeClr>
     </dgm:fillClrLst>
-    <dgm:linClrLst meth="repeat">
-      <a:schemeClr val="accent1">
-        <a:tint val="50000"/>
-      </a:schemeClr>
+    <dgm:linClrLst>
+      <a:schemeClr val="accent4"/>
+      <a:schemeClr val="accent5"/>
     </dgm:linClrLst>
     <dgm:effectClrLst/>
     <dgm:txLinClrLst/>
     <dgm:txFillClrLst meth="repeat">
-      <a:schemeClr val="tx1"/>
+      <a:schemeClr val="dk1"/>
     </dgm:txFillClrLst>
     <dgm:txEffectClrLst/>
   </dgm:styleLbl>
-  <dgm:styleLbl name="asst0">
+  <dgm:styleLbl name="conFgAcc1">
     <dgm:fillClrLst meth="repeat">
-      <a:schemeClr val="accent1"/>
+      <a:schemeClr val="lt1">
+        <a:alpha val="90000"/>
+      </a:schemeClr>
     </dgm:fillClrLst>
-    <dgm:linClrLst meth="repeat">
-      <a:schemeClr val="lt1"/>
-    </dgm:linClrLst>
-    <dgm:effectClrLst/>
-    <dgm:txLinClrLst/>
-    <dgm:txFillClrLst/>
-    <dgm:txEffectClrLst/>
-  </dgm:styleLbl>
-  <dgm:styleLbl name="asst1">
-    <dgm:fillClrLst meth="repeat">
-      <a:schemeClr val="accent1"/>
-    </dgm:fillClrLst>
-    <dgm:linClrLst meth="repeat">
-      <a:schemeClr val="lt1"/>
-    </dgm:linClrLst>
-    <dgm:effectClrLst/>
-    <dgm:txLinClrLst/>
-    <dgm:txFillClrLst/>
-    <dgm:txEffectClrLst/>
-  </dgm:styleLbl>
-  <dgm:styleLbl name="asst2">
-    <dgm:fillClrLst meth="repeat">
-      <a:schemeClr val="accent1"/>
-    </dgm:fillClrLst>
-    <dgm:linClrLst meth="repeat">
-      <a:schemeClr val="lt1"/>
-    </dgm:linClrLst>
-    <dgm:effectClrLst/>
-    <dgm:txLinClrLst/>
-    <dgm:txFillClrLst/>
-    <dgm:txEffectClrLst/>
-  </dgm:styleLbl>
-  <dgm:styleLbl name="asst3">
-    <dgm:fillClrLst meth="repeat">
-      <a:schemeClr val="accent1"/>
-    </dgm:fillClrLst>
-    <dgm:linClrLst meth="repeat">
-      <a:schemeClr val="lt1"/>
-    </dgm:linClrLst>
-    <dgm:effectClrLst/>
-    <dgm:txLinClrLst/>
-    <dgm:txFillClrLst/>
-    <dgm:txEffectClrLst/>
-  </dgm:styleLbl>
-  <dgm:styleLbl name="asst4">
-    <dgm:fillClrLst meth="repeat">
-      <a:schemeClr val="accent1"/>
-    </dgm:fillClrLst>
-    <dgm:linClrLst meth="repeat">
-      <a:schemeClr val="lt1"/>
-    </dgm:linClrLst>
-    <dgm:effectClrLst/>
-    <dgm:txLinClrLst/>
-    <dgm:txFillClrLst/>
-    <dgm:txEffectClrLst/>
-  </dgm:styleLbl>
-  <dgm:styleLbl name="parChTrans2D1">
-    <dgm:fillClrLst meth="repeat">
-      <a:schemeClr val="accent1">
-        <a:tint val="60000"/>
-      </a:schemeClr>
-    </dgm:fillClrLst>
-    <dgm:linClrLst meth="repeat">
-      <a:schemeClr val="accent1">
-        <a:tint val="60000"/>
-      </a:schemeClr>
+    <dgm:linClrLst>
+      <a:schemeClr val="accent4"/>
+      <a:schemeClr val="accent5"/>
     </dgm:linClrLst>
     <dgm:effectClrLst/>
     <dgm:txLinClrLst/>
     <dgm:txFillClrLst meth="repeat">
-      <a:schemeClr val="lt1"/>
+      <a:schemeClr val="dk1"/>
     </dgm:txFillClrLst>
     <dgm:txEffectClrLst/>
   </dgm:styleLbl>
-  <dgm:styleLbl name="parChTrans2D2">
+  <dgm:styleLbl name="alignAcc1">
     <dgm:fillClrLst meth="repeat">
-      <a:schemeClr val="accent1"/>
+      <a:schemeClr val="lt1">
+        <a:alpha val="90000"/>
+      </a:schemeClr>
     </dgm:fillClrLst>
-    <dgm:linClrLst meth="repeat">
-      <a:schemeClr val="accent1"/>
+    <dgm:linClrLst>
+      <a:schemeClr val="accent4"/>
+      <a:schemeClr val="accent5"/>
     </dgm:linClrLst>
     <dgm:effectClrLst/>
     <dgm:txLinClrLst/>
     <dgm:txFillClrLst meth="repeat">
-      <a:schemeClr val="lt1"/>
+      <a:schemeClr val="dk1"/>
     </dgm:txFillClrLst>
     <dgm:txEffectClrLst/>
   </dgm:styleLbl>
-  <dgm:styleLbl name="parChTrans2D3">
+  <dgm:styleLbl name="trAlignAcc1">
     <dgm:fillClrLst meth="repeat">
-      <a:schemeClr val="accent1"/>
+      <a:schemeClr val="lt1">
+        <a:alpha val="40000"/>
+      </a:schemeClr>
     </dgm:fillClrLst>
     <dgm:linClrLst meth="repeat">
-      <a:schemeClr val="accent1"/>
+      <a:schemeClr val="accent4"/>
     </dgm:linClrLst>
     <dgm:effectClrLst/>
     <dgm:txLinClrLst/>
     <dgm:txFillClrLst meth="repeat">
-      <a:schemeClr val="lt1"/>
+      <a:schemeClr val="dk1"/>
     </dgm:txFillClrLst>
     <dgm:txEffectClrLst/>
   </dgm:styleLbl>
-  <dgm:styleLbl name="parChTrans2D4">
+  <dgm:styleLbl name="bgAcc1">
     <dgm:fillClrLst meth="repeat">
-      <a:schemeClr val="accent1"/>
+      <a:schemeClr val="lt1">
+        <a:alpha val="90000"/>
+      </a:schemeClr>
     </dgm:fillClrLst>
-    <dgm:linClrLst meth="repeat">
-      <a:schemeClr val="accent1"/>
+    <dgm:linClrLst>
+      <a:schemeClr val="accent4"/>
+      <a:schemeClr val="accent5"/>
     </dgm:linClrLst>
     <dgm:effectClrLst/>
     <dgm:txLinClrLst/>
     <dgm:txFillClrLst meth="repeat">
-      <a:schemeClr val="lt1"/>
+      <a:schemeClr val="dk1"/>
     </dgm:txFillClrLst>
     <dgm:txEffectClrLst/>
   </dgm:styleLbl>
-  <dgm:styleLbl name="parChTrans1D1">
+  <dgm:styleLbl name="solidFgAcc1">
     <dgm:fillClrLst meth="repeat">
-      <a:schemeClr val="accent1"/>
+      <a:schemeClr val="lt1"/>
     </dgm:fillClrLst>
-    <dgm:linClrLst meth="repeat">
-      <a:schemeClr val="accent1">
-        <a:shade val="60000"/>
-      </a:schemeClr>
+    <dgm:linClrLst>
+      <a:schemeClr val="accent4"/>
+      <a:schemeClr val="accent5"/>
     </dgm:linClrLst>
     <dgm:effectClrLst/>
     <dgm:txLinClrLst/>
     <dgm:txFillClrLst meth="repeat">
-      <a:schemeClr val="tx1"/>
+      <a:schemeClr val="dk1"/>
     </dgm:txFillClrLst>
     <dgm:txEffectClrLst/>
   </dgm:styleLbl>
-  <dgm:styleLbl name="parChTrans1D2">
+  <dgm:styleLbl name="solidAlignAcc1">
     <dgm:fillClrLst meth="repeat">
-      <a:schemeClr val="accent1"/>
+      <a:schemeClr val="lt1"/>
     </dgm:fillClrLst>
-    <dgm:linClrLst meth="repeat">
-      <a:schemeClr val="accent1">
-        <a:shade val="60000"/>
-      </a:schemeClr>
+    <dgm:linClrLst>
+      <a:schemeClr val="accent4"/>
+      <a:schemeClr val="accent5"/>
     </dgm:linClrLst>
     <dgm:effectClrLst/>
     <dgm:txLinClrLst/>
     <dgm:txFillClrLst meth="repeat">
-      <a:schemeClr val="tx1"/>
+      <a:schemeClr val="dk1"/>
     </dgm:txFillClrLst>
     <dgm:txEffectClrLst/>
   </dgm:styleLbl>
-  <dgm:styleLbl name="parChTrans1D3">
+  <dgm:styleLbl name="solidBgAcc1">
     <dgm:fillClrLst meth="repeat">
-      <a:schemeClr val="accent1"/>
+      <a:schemeClr val="lt1"/>
     </dgm:fillClrLst>
-    <dgm:linClrLst meth="repeat">
-      <a:schemeClr val="accent1">
-        <a:shade val="80000"/>
-      </a:schemeClr>
+    <dgm:linClrLst>
+      <a:schemeClr val="accent4"/>
+      <a:schemeClr val="accent5"/>
     </dgm:linClrLst>
     <dgm:effectClrLst/>
     <dgm:txLinClrLst/>
     <dgm:txFillClrLst meth="repeat">
-      <a:schemeClr val="tx1"/>
+      <a:schemeClr val="dk1"/>
     </dgm:txFillClrLst>
     <dgm:txEffectClrLst/>
   </dgm:styleLbl>
-  <dgm:styleLbl name="parChTrans1D4">
-    <dgm:fillClrLst meth="repeat">
-      <a:schemeClr val="accent1"/>
+  <dgm:styleLbl name="fgAccFollowNode1">
+    <dgm:fillClrLst>
+      <a:schemeClr val="accent4">
+        <a:tint val="40000"/>
+        <a:alpha val="90000"/>
+      </a:schemeClr>
+      <a:schemeClr val="accent5">
+        <a:tint val="40000"/>
+        <a:alpha val="90000"/>
+      </a:schemeClr>
     </dgm:fillClrLst>
-    <dgm:linClrLst meth="repeat">
-      <a:schemeClr val="accent1">
-        <a:shade val="80000"/>
+    <dgm:linClrLst>
+      <a:schemeClr val="accent4">
+        <a:tint val="40000"/>
+        <a:alpha val="90000"/>
+      </a:schemeClr>
+      <a:schemeClr val="accent5">
+        <a:tint val="40000"/>
+        <a:alpha val="90000"/>
       </a:schemeClr>
     </dgm:linClrLst>
     <dgm:effectClrLst/>
     <dgm:txLinClrLst/>
     <dgm:txFillClrLst meth="repeat">
-      <a:schemeClr val="tx1"/>
+      <a:schemeClr val="dk1"/>
     </dgm:txFillClrLst>
     <dgm:txEffectClrLst/>
   </dgm:styleLbl>
-  <dgm:styleLbl name="fgAcc1">
+  <dgm:styleLbl name="alignAccFollowNode1">
+    <dgm:fillClrLst>
+      <a:schemeClr val="accent4">
+        <a:tint val="40000"/>
+        <a:alpha val="90000"/>
+      </a:schemeClr>
+      <a:schemeClr val="accent5">
+        <a:tint val="40000"/>
+        <a:alpha val="90000"/>
+      </a:schemeClr>
+    </dgm:fillClrLst>
+    <dgm:linClrLst>
+      <a:schemeClr val="accent4">
+        <a:tint val="40000"/>
+        <a:alpha val="90000"/>
+      </a:schemeClr>
+      <a:schemeClr val="accent5">
+        <a:tint val="40000"/>
+        <a:alpha val="90000"/>
+      </a:schemeClr>
+    </dgm:linClrLst>
+    <dgm:effectClrLst/>
+    <dgm:txLinClrLst/>
+    <dgm:txFillClrLst meth="repeat">
+      <a:schemeClr val="dk1"/>
+    </dgm:txFillClrLst>
+    <dgm:txEffectClrLst/>
+  </dgm:styleLbl>
+  <dgm:styleLbl name="bgAccFollowNode1">
+    <dgm:fillClrLst>
+      <a:schemeClr val="accent4">
+        <a:tint val="40000"/>
+        <a:alpha val="90000"/>
+      </a:schemeClr>
+      <a:schemeClr val="accent5">
+        <a:tint val="40000"/>
+        <a:alpha val="90000"/>
+      </a:schemeClr>
+    </dgm:fillClrLst>
+    <dgm:linClrLst>
+      <a:schemeClr val="accent4">
+        <a:tint val="40000"/>
+        <a:alpha val="90000"/>
+      </a:schemeClr>
+      <a:schemeClr val="accent5">
+        <a:tint val="40000"/>
+        <a:alpha val="90000"/>
+      </a:schemeClr>
+    </dgm:linClrLst>
+    <dgm:effectClrLst/>
+    <dgm:txLinClrLst/>
+    <dgm:txFillClrLst meth="repeat">
+      <a:schemeClr val="dk1"/>
+    </dgm:txFillClrLst>
+    <dgm:txEffectClrLst/>
+  </dgm:styleLbl>
+  <dgm:styleLbl name="fgAcc0">
     <dgm:fillClrLst meth="repeat">
       <a:schemeClr val="lt1">
         <a:alpha val="90000"/>
       </a:schemeClr>
     </dgm:fillClrLst>
-    <dgm:linClrLst meth="repeat">
+    <dgm:linClrLst>
+      <a:schemeClr val="accent3"/>
+    </dgm:linClrLst>
+    <dgm:effectClrLst/>
+    <dgm:txLinClrLst/>
+    <dgm:txFillClrLst meth="repeat">
+      <a:schemeClr val="dk1"/>
+    </dgm:txFillClrLst>
+    <dgm:txEffectClrLst/>
+  </dgm:styleLbl>
+  <dgm:styleLbl name="fgAcc2">
+    <dgm:fillClrLst meth="repeat">
+      <a:schemeClr val="lt1">
+        <a:alpha val="90000"/>
+      </a:schemeClr>
+    </dgm:fillClrLst>
+    <dgm:linClrLst>
+      <a:schemeClr val="accent5"/>
+    </dgm:linClrLst>
+    <dgm:effectClrLst/>
+    <dgm:txLinClrLst/>
+    <dgm:txFillClrLst meth="repeat">
+      <a:schemeClr val="dk1"/>
+    </dgm:txFillClrLst>
+    <dgm:txEffectClrLst/>
+  </dgm:styleLbl>
+  <dgm:styleLbl name="fgAcc3">
+    <dgm:fillClrLst meth="repeat">
+      <a:schemeClr val="lt1">
+        <a:alpha val="90000"/>
+      </a:schemeClr>
+    </dgm:fillClrLst>
+    <dgm:linClrLst>
+      <a:schemeClr val="accent6"/>
+    </dgm:linClrLst>
+    <dgm:effectClrLst/>
+    <dgm:txLinClrLst/>
+    <dgm:txFillClrLst meth="repeat">
+      <a:schemeClr val="dk1"/>
+    </dgm:txFillClrLst>
+    <dgm:txEffectClrLst/>
+  </dgm:styleLbl>
+  <dgm:styleLbl name="fgAcc4">
+    <dgm:fillClrLst meth="repeat">
+      <a:schemeClr val="lt1">
+        <a:alpha val="90000"/>
+      </a:schemeClr>
+    </dgm:fillClrLst>
+    <dgm:linClrLst>
       <a:schemeClr val="accent1"/>
     </dgm:linClrLst>
     <dgm:effectClrLst/>
@@ -3919,14 +4185,14 @@
     </dgm:txFillClrLst>
     <dgm:txEffectClrLst/>
   </dgm:styleLbl>
-  <dgm:styleLbl name="conFgAcc1">
+  <dgm:styleLbl name="bgShp">
     <dgm:fillClrLst meth="repeat">
-      <a:schemeClr val="lt1">
-        <a:alpha val="90000"/>
+      <a:schemeClr val="accent4">
+        <a:tint val="40000"/>
       </a:schemeClr>
     </dgm:fillClrLst>
     <dgm:linClrLst meth="repeat">
-      <a:schemeClr val="accent1"/>
+      <a:schemeClr val="dk1"/>
     </dgm:linClrLst>
     <dgm:effectClrLst/>
     <dgm:txLinClrLst/>
@@ -3935,244 +4201,14 @@
     </dgm:txFillClrLst>
     <dgm:txEffectClrLst/>
   </dgm:styleLbl>
-  <dgm:styleLbl name="alignAcc1">
+  <dgm:styleLbl name="dkBgShp">
     <dgm:fillClrLst meth="repeat">
-      <a:schemeClr val="lt1">
-        <a:alpha val="90000"/>
+      <a:schemeClr val="accent4">
+        <a:shade val="90000"/>
       </a:schemeClr>
     </dgm:fillClrLst>
     <dgm:linClrLst meth="repeat">
-      <a:schemeClr val="accent1"/>
-    </dgm:linClrLst>
-    <dgm:effectClrLst/>
-    <dgm:txLinClrLst/>
-    <dgm:txFillClrLst meth="repeat">
       <a:schemeClr val="dk1"/>
-    </dgm:txFillClrLst>
-    <dgm:txEffectClrLst/>
-  </dgm:styleLbl>
-  <dgm:styleLbl name="trAlignAcc1">
-    <dgm:fillClrLst meth="repeat">
-      <a:schemeClr val="lt1">
-        <a:alpha val="40000"/>
-      </a:schemeClr>
-    </dgm:fillClrLst>
-    <dgm:linClrLst meth="repeat">
-      <a:schemeClr val="accent1"/>
-    </dgm:linClrLst>
-    <dgm:effectClrLst/>
-    <dgm:txLinClrLst/>
-    <dgm:txFillClrLst meth="repeat">
-      <a:schemeClr val="dk1"/>
-    </dgm:txFillClrLst>
-    <dgm:txEffectClrLst/>
-  </dgm:styleLbl>
-  <dgm:styleLbl name="bgAcc1">
-    <dgm:fillClrLst meth="repeat">
-      <a:schemeClr val="lt1">
-        <a:alpha val="90000"/>
-      </a:schemeClr>
-    </dgm:fillClrLst>
-    <dgm:linClrLst meth="repeat">
-      <a:schemeClr val="accent1"/>
-    </dgm:linClrLst>
-    <dgm:effectClrLst/>
-    <dgm:txLinClrLst/>
-    <dgm:txFillClrLst meth="repeat">
-      <a:schemeClr val="dk1"/>
-    </dgm:txFillClrLst>
-    <dgm:txEffectClrLst/>
-  </dgm:styleLbl>
-  <dgm:styleLbl name="solidFgAcc1">
-    <dgm:fillClrLst meth="repeat">
-      <a:schemeClr val="lt1"/>
-    </dgm:fillClrLst>
-    <dgm:linClrLst meth="repeat">
-      <a:schemeClr val="accent1"/>
-    </dgm:linClrLst>
-    <dgm:effectClrLst/>
-    <dgm:txLinClrLst/>
-    <dgm:txFillClrLst meth="repeat">
-      <a:schemeClr val="dk1"/>
-    </dgm:txFillClrLst>
-    <dgm:txEffectClrLst/>
-  </dgm:styleLbl>
-  <dgm:styleLbl name="solidAlignAcc1">
-    <dgm:fillClrLst meth="repeat">
-      <a:schemeClr val="lt1"/>
-    </dgm:fillClrLst>
-    <dgm:linClrLst meth="repeat">
-      <a:schemeClr val="accent1"/>
-    </dgm:linClrLst>
-    <dgm:effectClrLst/>
-    <dgm:txLinClrLst/>
-    <dgm:txFillClrLst meth="repeat">
-      <a:schemeClr val="dk1"/>
-    </dgm:txFillClrLst>
-    <dgm:txEffectClrLst/>
-  </dgm:styleLbl>
-  <dgm:styleLbl name="solidBgAcc1">
-    <dgm:fillClrLst meth="repeat">
-      <a:schemeClr val="lt1"/>
-    </dgm:fillClrLst>
-    <dgm:linClrLst meth="repeat">
-      <a:schemeClr val="accent1"/>
-    </dgm:linClrLst>
-    <dgm:effectClrLst/>
-    <dgm:txLinClrLst/>
-    <dgm:txFillClrLst meth="repeat">
-      <a:schemeClr val="dk1"/>
-    </dgm:txFillClrLst>
-    <dgm:txEffectClrLst/>
-  </dgm:styleLbl>
-  <dgm:styleLbl name="fgAccFollowNode1">
-    <dgm:fillClrLst meth="repeat">
-      <a:schemeClr val="accent1">
-        <a:alpha val="90000"/>
-        <a:tint val="40000"/>
-      </a:schemeClr>
-    </dgm:fillClrLst>
-    <dgm:linClrLst meth="repeat">
-      <a:schemeClr val="accent1">
-        <a:alpha val="90000"/>
-        <a:tint val="40000"/>
-      </a:schemeClr>
-    </dgm:linClrLst>
-    <dgm:effectClrLst/>
-    <dgm:txLinClrLst/>
-    <dgm:txFillClrLst meth="repeat">
-      <a:schemeClr val="dk1"/>
-    </dgm:txFillClrLst>
-    <dgm:txEffectClrLst/>
-  </dgm:styleLbl>
-  <dgm:styleLbl name="alignAccFollowNode1">
-    <dgm:fillClrLst meth="repeat">
-      <a:schemeClr val="accent1">
-        <a:alpha val="90000"/>
-        <a:tint val="40000"/>
-      </a:schemeClr>
-    </dgm:fillClrLst>
-    <dgm:linClrLst meth="repeat">
-      <a:schemeClr val="accent1">
-        <a:alpha val="90000"/>
-        <a:tint val="40000"/>
-      </a:schemeClr>
-    </dgm:linClrLst>
-    <dgm:effectClrLst/>
-    <dgm:txLinClrLst/>
-    <dgm:txFillClrLst meth="repeat">
-      <a:schemeClr val="dk1"/>
-    </dgm:txFillClrLst>
-    <dgm:txEffectClrLst/>
-  </dgm:styleLbl>
-  <dgm:styleLbl name="bgAccFollowNode1">
-    <dgm:fillClrLst meth="repeat">
-      <a:schemeClr val="accent1">
-        <a:alpha val="90000"/>
-        <a:tint val="40000"/>
-      </a:schemeClr>
-    </dgm:fillClrLst>
-    <dgm:linClrLst meth="repeat">
-      <a:schemeClr val="accent1">
-        <a:alpha val="90000"/>
-        <a:tint val="40000"/>
-      </a:schemeClr>
-    </dgm:linClrLst>
-    <dgm:effectClrLst/>
-    <dgm:txLinClrLst/>
-    <dgm:txFillClrLst meth="repeat">
-      <a:schemeClr val="dk1"/>
-    </dgm:txFillClrLst>
-    <dgm:txEffectClrLst/>
-  </dgm:styleLbl>
-  <dgm:styleLbl name="fgAcc0">
-    <dgm:fillClrLst meth="repeat">
-      <a:schemeClr val="lt1">
-        <a:alpha val="90000"/>
-      </a:schemeClr>
-    </dgm:fillClrLst>
-    <dgm:linClrLst meth="repeat">
-      <a:schemeClr val="accent1"/>
-    </dgm:linClrLst>
-    <dgm:effectClrLst/>
-    <dgm:txLinClrLst/>
-    <dgm:txFillClrLst meth="repeat">
-      <a:schemeClr val="dk1"/>
-    </dgm:txFillClrLst>
-    <dgm:txEffectClrLst/>
-  </dgm:styleLbl>
-  <dgm:styleLbl name="fgAcc2">
-    <dgm:fillClrLst meth="repeat">
-      <a:schemeClr val="lt1">
-        <a:alpha val="90000"/>
-      </a:schemeClr>
-    </dgm:fillClrLst>
-    <dgm:linClrLst meth="repeat">
-      <a:schemeClr val="accent1"/>
-    </dgm:linClrLst>
-    <dgm:effectClrLst/>
-    <dgm:txLinClrLst/>
-    <dgm:txFillClrLst meth="repeat">
-      <a:schemeClr val="dk1"/>
-    </dgm:txFillClrLst>
-    <dgm:txEffectClrLst/>
-  </dgm:styleLbl>
-  <dgm:styleLbl name="fgAcc3">
-    <dgm:fillClrLst meth="repeat">
-      <a:schemeClr val="lt1">
-        <a:alpha val="90000"/>
-      </a:schemeClr>
-    </dgm:fillClrLst>
-    <dgm:linClrLst meth="repeat">
-      <a:schemeClr val="accent1"/>
-    </dgm:linClrLst>
-    <dgm:effectClrLst/>
-    <dgm:txLinClrLst/>
-    <dgm:txFillClrLst meth="repeat">
-      <a:schemeClr val="dk1"/>
-    </dgm:txFillClrLst>
-    <dgm:txEffectClrLst/>
-  </dgm:styleLbl>
-  <dgm:styleLbl name="fgAcc4">
-    <dgm:fillClrLst meth="repeat">
-      <a:schemeClr val="lt1">
-        <a:alpha val="90000"/>
-      </a:schemeClr>
-    </dgm:fillClrLst>
-    <dgm:linClrLst meth="repeat">
-      <a:schemeClr val="accent1"/>
-    </dgm:linClrLst>
-    <dgm:effectClrLst/>
-    <dgm:txLinClrLst/>
-    <dgm:txFillClrLst meth="repeat">
-      <a:schemeClr val="dk1"/>
-    </dgm:txFillClrLst>
-    <dgm:txEffectClrLst/>
-  </dgm:styleLbl>
-  <dgm:styleLbl name="bgShp">
-    <dgm:fillClrLst meth="repeat">
-      <a:schemeClr val="accent1">
-        <a:tint val="40000"/>
-      </a:schemeClr>
-    </dgm:fillClrLst>
-    <dgm:linClrLst meth="repeat">
-      <a:schemeClr val="accent1"/>
-    </dgm:linClrLst>
-    <dgm:effectClrLst/>
-    <dgm:txLinClrLst/>
-    <dgm:txFillClrLst meth="repeat">
-      <a:schemeClr val="dk1"/>
-    </dgm:txFillClrLst>
-    <dgm:txEffectClrLst/>
-  </dgm:styleLbl>
-  <dgm:styleLbl name="dkBgShp">
-    <dgm:fillClrLst meth="repeat">
-      <a:schemeClr val="accent1">
-        <a:shade val="80000"/>
-      </a:schemeClr>
-    </dgm:fillClrLst>
-    <dgm:linClrLst meth="repeat">
-      <a:schemeClr val="accent1"/>
     </dgm:linClrLst>
     <dgm:effectClrLst/>
     <dgm:txLinClrLst/>
@@ -4183,13 +4219,13 @@
   </dgm:styleLbl>
   <dgm:styleLbl name="trBgShp">
     <dgm:fillClrLst meth="repeat">
-      <a:schemeClr val="accent1">
+      <a:schemeClr val="accent4">
         <a:tint val="50000"/>
         <a:alpha val="40000"/>
       </a:schemeClr>
     </dgm:fillClrLst>
     <dgm:linClrLst meth="repeat">
-      <a:schemeClr val="accent1"/>
+      <a:schemeClr val="accent4"/>
     </dgm:linClrLst>
     <dgm:effectClrLst/>
     <dgm:txLinClrLst/>
@@ -4200,8 +4236,8 @@
   </dgm:styleLbl>
   <dgm:styleLbl name="fgShp">
     <dgm:fillClrLst meth="repeat">
-      <a:schemeClr val="accent1">
-        <a:tint val="60000"/>
+      <a:schemeClr val="accent4">
+        <a:tint val="40000"/>
       </a:schemeClr>
     </dgm:fillClrLst>
     <dgm:linClrLst meth="repeat">
@@ -5528,7 +5564,7 @@
 <dgm:dataModel xmlns:dgm="http://schemas.openxmlformats.org/drawingml/2006/diagram" xmlns:a="http://schemas.openxmlformats.org/drawingml/2006/main">
   <dgm:ptLst>
     <dgm:pt modelId="{B01B17A9-2FAF-024C-B2E7-759D8E60780D}" type="doc">
-      <dgm:prSet loTypeId="urn:microsoft.com/office/officeart/2005/8/layout/hierarchy4" loCatId="" qsTypeId="urn:microsoft.com/office/officeart/2005/8/quickstyle/simple4" qsCatId="simple" csTypeId="urn:microsoft.com/office/officeart/2005/8/colors/accent1_2" csCatId="accent1" phldr="1"/>
+      <dgm:prSet loTypeId="urn:microsoft.com/office/officeart/2005/8/layout/hierarchy4" loCatId="" qsTypeId="urn:microsoft.com/office/officeart/2005/8/quickstyle/simple4" qsCatId="simple" csTypeId="urn:microsoft.com/office/officeart/2005/8/colors/colorful4" csCatId="colorful" phldr="1"/>
       <dgm:spPr/>
       <dgm:t>
         <a:bodyPr/>
@@ -5540,14 +5576,26 @@
     </dgm:pt>
     <dgm:pt modelId="{F320AADD-9DA4-2F46-8DEA-7D62DF33CA34}">
       <dgm:prSet phldrT="[Text]"/>
-      <dgm:spPr/>
+      <dgm:spPr>
+        <a:solidFill>
+          <a:schemeClr val="accent1"/>
+        </a:solidFill>
+      </dgm:spPr>
       <dgm:t>
         <a:bodyPr/>
         <a:lstStyle/>
         <a:p>
           <a:r>
             <a:rPr lang="en-US" dirty="0" smtClean="0"/>
-            <a:t>Presentation – ONE User Interface</a:t>
+            <a:t>Presentation – </a:t>
+          </a:r>
+          <a:r>
+            <a:rPr lang="en-US" u="sng" dirty="0" smtClean="0"/>
+            <a:t>ONE</a:t>
+          </a:r>
+          <a:r>
+            <a:rPr lang="en-US" dirty="0" smtClean="0"/>
+            <a:t> User Interface</a:t>
           </a:r>
           <a:endParaRPr lang="en-US" dirty="0"/>
         </a:p>
@@ -8494,33 +8542,9 @@
             <a:gd name="adj" fmla="val 10000"/>
           </a:avLst>
         </a:prstGeom>
-        <a:gradFill rotWithShape="0">
-          <a:gsLst>
-            <a:gs pos="0">
-              <a:schemeClr val="accent1">
-                <a:hueOff val="0"/>
-                <a:satOff val="0"/>
-                <a:lumOff val="0"/>
-                <a:alphaOff val="0"/>
-                <a:tint val="95000"/>
-                <a:shade val="70000"/>
-                <a:satMod val="150000"/>
-              </a:schemeClr>
-            </a:gs>
-            <a:gs pos="100000">
-              <a:schemeClr val="accent1">
-                <a:hueOff val="0"/>
-                <a:satOff val="0"/>
-                <a:lumOff val="0"/>
-                <a:alphaOff val="0"/>
-                <a:tint val="100000"/>
-                <a:shade val="100000"/>
-                <a:satMod val="150000"/>
-              </a:schemeClr>
-            </a:gs>
-          </a:gsLst>
-          <a:lin ang="16200000" scaled="0"/>
-        </a:gradFill>
+        <a:solidFill>
+          <a:schemeClr val="accent1"/>
+        </a:solidFill>
         <a:ln>
           <a:noFill/>
         </a:ln>
@@ -8565,7 +8589,15 @@
           </a:pPr>
           <a:r>
             <a:rPr lang="en-US" sz="4400" kern="1200" dirty="0" smtClean="0"/>
-            <a:t>Presentation – ONE User Interface</a:t>
+            <a:t>Presentation – </a:t>
+          </a:r>
+          <a:r>
+            <a:rPr lang="en-US" sz="4400" u="sng" kern="1200" dirty="0" smtClean="0"/>
+            <a:t>ONE</a:t>
+          </a:r>
+          <a:r>
+            <a:rPr lang="en-US" sz="4400" kern="1200" dirty="0" smtClean="0"/>
+            <a:t> User Interface</a:t>
           </a:r>
           <a:endParaRPr lang="en-US" sz="4400" kern="1200" dirty="0"/>
         </a:p>
@@ -8593,7 +8625,7 @@
         <a:gradFill rotWithShape="0">
           <a:gsLst>
             <a:gs pos="0">
-              <a:schemeClr val="accent1">
+              <a:schemeClr val="accent5">
                 <a:hueOff val="0"/>
                 <a:satOff val="0"/>
                 <a:lumOff val="0"/>
@@ -8604,7 +8636,7 @@
               </a:schemeClr>
             </a:gs>
             <a:gs pos="100000">
-              <a:schemeClr val="accent1">
+              <a:schemeClr val="accent5">
                 <a:hueOff val="0"/>
                 <a:satOff val="0"/>
                 <a:lumOff val="0"/>
@@ -8689,7 +8721,7 @@
         <a:gradFill rotWithShape="0">
           <a:gsLst>
             <a:gs pos="0">
-              <a:schemeClr val="accent1">
+              <a:schemeClr val="accent6">
                 <a:hueOff val="0"/>
                 <a:satOff val="0"/>
                 <a:lumOff val="0"/>
@@ -8700,7 +8732,7 @@
               </a:schemeClr>
             </a:gs>
             <a:gs pos="100000">
-              <a:schemeClr val="accent1">
+              <a:schemeClr val="accent6">
                 <a:hueOff val="0"/>
                 <a:satOff val="0"/>
                 <a:lumOff val="0"/>
@@ -8785,7 +8817,7 @@
         <a:gradFill rotWithShape="0">
           <a:gsLst>
             <a:gs pos="0">
-              <a:schemeClr val="accent1">
+              <a:schemeClr val="accent6">
                 <a:hueOff val="0"/>
                 <a:satOff val="0"/>
                 <a:lumOff val="0"/>
@@ -8796,7 +8828,7 @@
               </a:schemeClr>
             </a:gs>
             <a:gs pos="100000">
-              <a:schemeClr val="accent1">
+              <a:schemeClr val="accent6">
                 <a:hueOff val="0"/>
                 <a:satOff val="0"/>
                 <a:lumOff val="0"/>
@@ -8881,7 +8913,7 @@
         <a:gradFill rotWithShape="0">
           <a:gsLst>
             <a:gs pos="0">
-              <a:schemeClr val="accent1">
+              <a:schemeClr val="accent6">
                 <a:hueOff val="0"/>
                 <a:satOff val="0"/>
                 <a:lumOff val="0"/>
@@ -8892,7 +8924,7 @@
               </a:schemeClr>
             </a:gs>
             <a:gs pos="100000">
-              <a:schemeClr val="accent1">
+              <a:schemeClr val="accent6">
                 <a:hueOff val="0"/>
                 <a:satOff val="0"/>
                 <a:lumOff val="0"/>
@@ -8977,7 +9009,7 @@
         <a:gradFill rotWithShape="0">
           <a:gsLst>
             <a:gs pos="0">
-              <a:schemeClr val="accent1">
+              <a:schemeClr val="accent5">
                 <a:hueOff val="0"/>
                 <a:satOff val="0"/>
                 <a:lumOff val="0"/>
@@ -8988,7 +9020,7 @@
               </a:schemeClr>
             </a:gs>
             <a:gs pos="100000">
-              <a:schemeClr val="accent1">
+              <a:schemeClr val="accent5">
                 <a:hueOff val="0"/>
                 <a:satOff val="0"/>
                 <a:lumOff val="0"/>
@@ -9073,7 +9105,7 @@
         <a:gradFill rotWithShape="0">
           <a:gsLst>
             <a:gs pos="0">
-              <a:schemeClr val="accent1">
+              <a:schemeClr val="accent6">
                 <a:hueOff val="0"/>
                 <a:satOff val="0"/>
                 <a:lumOff val="0"/>
@@ -9084,7 +9116,7 @@
               </a:schemeClr>
             </a:gs>
             <a:gs pos="100000">
-              <a:schemeClr val="accent1">
+              <a:schemeClr val="accent6">
                 <a:hueOff val="0"/>
                 <a:satOff val="0"/>
                 <a:lumOff val="0"/>
@@ -9169,7 +9201,7 @@
         <a:gradFill rotWithShape="0">
           <a:gsLst>
             <a:gs pos="0">
-              <a:schemeClr val="accent1">
+              <a:schemeClr val="accent6">
                 <a:hueOff val="0"/>
                 <a:satOff val="0"/>
                 <a:lumOff val="0"/>
@@ -9180,7 +9212,7 @@
               </a:schemeClr>
             </a:gs>
             <a:gs pos="100000">
-              <a:schemeClr val="accent1">
+              <a:schemeClr val="accent6">
                 <a:hueOff val="0"/>
                 <a:satOff val="0"/>
                 <a:lumOff val="0"/>
@@ -9265,7 +9297,7 @@
         <a:gradFill rotWithShape="0">
           <a:gsLst>
             <a:gs pos="0">
-              <a:schemeClr val="accent1">
+              <a:schemeClr val="accent6">
                 <a:hueOff val="0"/>
                 <a:satOff val="0"/>
                 <a:lumOff val="0"/>
@@ -9276,7 +9308,7 @@
               </a:schemeClr>
             </a:gs>
             <a:gs pos="100000">
-              <a:schemeClr val="accent1">
+              <a:schemeClr val="accent6">
                 <a:hueOff val="0"/>
                 <a:satOff val="0"/>
                 <a:lumOff val="0"/>
@@ -9361,7 +9393,7 @@
         <a:gradFill rotWithShape="0">
           <a:gsLst>
             <a:gs pos="0">
-              <a:schemeClr val="accent1">
+              <a:schemeClr val="accent5">
                 <a:hueOff val="0"/>
                 <a:satOff val="0"/>
                 <a:lumOff val="0"/>
@@ -9372,7 +9404,7 @@
               </a:schemeClr>
             </a:gs>
             <a:gs pos="100000">
-              <a:schemeClr val="accent1">
+              <a:schemeClr val="accent5">
                 <a:hueOff val="0"/>
                 <a:satOff val="0"/>
                 <a:lumOff val="0"/>
@@ -9457,7 +9489,7 @@
         <a:gradFill rotWithShape="0">
           <a:gsLst>
             <a:gs pos="0">
-              <a:schemeClr val="accent1">
+              <a:schemeClr val="accent6">
                 <a:hueOff val="0"/>
                 <a:satOff val="0"/>
                 <a:lumOff val="0"/>
@@ -9468,7 +9500,7 @@
               </a:schemeClr>
             </a:gs>
             <a:gs pos="100000">
-              <a:schemeClr val="accent1">
+              <a:schemeClr val="accent6">
                 <a:hueOff val="0"/>
                 <a:satOff val="0"/>
                 <a:lumOff val="0"/>
@@ -9553,7 +9585,7 @@
         <a:gradFill rotWithShape="0">
           <a:gsLst>
             <a:gs pos="0">
-              <a:schemeClr val="accent1">
+              <a:schemeClr val="accent6">
                 <a:hueOff val="0"/>
                 <a:satOff val="0"/>
                 <a:lumOff val="0"/>
@@ -9564,7 +9596,7 @@
               </a:schemeClr>
             </a:gs>
             <a:gs pos="100000">
-              <a:schemeClr val="accent1">
+              <a:schemeClr val="accent6">
                 <a:hueOff val="0"/>
                 <a:satOff val="0"/>
                 <a:lumOff val="0"/>
@@ -9649,7 +9681,7 @@
         <a:gradFill rotWithShape="0">
           <a:gsLst>
             <a:gs pos="0">
-              <a:schemeClr val="accent1">
+              <a:schemeClr val="accent5">
                 <a:hueOff val="0"/>
                 <a:satOff val="0"/>
                 <a:lumOff val="0"/>
@@ -9660,7 +9692,7 @@
               </a:schemeClr>
             </a:gs>
             <a:gs pos="100000">
-              <a:schemeClr val="accent1">
+              <a:schemeClr val="accent5">
                 <a:hueOff val="0"/>
                 <a:satOff val="0"/>
                 <a:lumOff val="0"/>
@@ -9745,7 +9777,7 @@
         <a:gradFill rotWithShape="0">
           <a:gsLst>
             <a:gs pos="0">
-              <a:schemeClr val="accent1">
+              <a:schemeClr val="accent6">
                 <a:hueOff val="0"/>
                 <a:satOff val="0"/>
                 <a:lumOff val="0"/>
@@ -9756,7 +9788,7 @@
               </a:schemeClr>
             </a:gs>
             <a:gs pos="100000">
-              <a:schemeClr val="accent1">
+              <a:schemeClr val="accent6">
                 <a:hueOff val="0"/>
                 <a:satOff val="0"/>
                 <a:lumOff val="0"/>
@@ -9841,7 +9873,7 @@
         <a:gradFill rotWithShape="0">
           <a:gsLst>
             <a:gs pos="0">
-              <a:schemeClr val="accent1">
+              <a:schemeClr val="accent5">
                 <a:hueOff val="0"/>
                 <a:satOff val="0"/>
                 <a:lumOff val="0"/>
@@ -9852,7 +9884,7 @@
               </a:schemeClr>
             </a:gs>
             <a:gs pos="100000">
-              <a:schemeClr val="accent1">
+              <a:schemeClr val="accent5">
                 <a:hueOff val="0"/>
                 <a:satOff val="0"/>
                 <a:lumOff val="0"/>
@@ -9937,7 +9969,7 @@
         <a:gradFill rotWithShape="0">
           <a:gsLst>
             <a:gs pos="0">
-              <a:schemeClr val="accent1">
+              <a:schemeClr val="accent6">
                 <a:hueOff val="0"/>
                 <a:satOff val="0"/>
                 <a:lumOff val="0"/>
@@ -9948,7 +9980,7 @@
               </a:schemeClr>
             </a:gs>
             <a:gs pos="100000">
-              <a:schemeClr val="accent1">
+              <a:schemeClr val="accent6">
                 <a:hueOff val="0"/>
                 <a:satOff val="0"/>
                 <a:lumOff val="0"/>
@@ -10033,7 +10065,7 @@
         <a:gradFill rotWithShape="0">
           <a:gsLst>
             <a:gs pos="0">
-              <a:schemeClr val="accent1">
+              <a:schemeClr val="accent6">
                 <a:hueOff val="0"/>
                 <a:satOff val="0"/>
                 <a:lumOff val="0"/>
@@ -10044,7 +10076,7 @@
               </a:schemeClr>
             </a:gs>
             <a:gs pos="100000">
-              <a:schemeClr val="accent1">
+              <a:schemeClr val="accent6">
                 <a:hueOff val="0"/>
                 <a:satOff val="0"/>
                 <a:lumOff val="0"/>
@@ -25174,6 +25206,97 @@
           <a:p>
             <a:r>
               <a:rPr lang="en-US" dirty="0" smtClean="0"/>
+              <a:t>Recommendations &amp; Next Steps</a:t>
+            </a:r>
+            <a:endParaRPr lang="en-US" dirty="0"/>
+          </a:p>
+        </p:txBody>
+      </p:sp>
+      <p:sp>
+        <p:nvSpPr>
+          <p:cNvPr id="3" name="Content Placeholder 2"/>
+          <p:cNvSpPr>
+            <a:spLocks noGrp="1"/>
+          </p:cNvSpPr>
+          <p:nvPr>
+            <p:ph sz="half" idx="1"/>
+          </p:nvPr>
+        </p:nvSpPr>
+        <p:spPr/>
+        <p:txBody>
+          <a:bodyPr/>
+          <a:lstStyle/>
+          <a:p>
+            <a:endParaRPr lang="en-US"/>
+          </a:p>
+        </p:txBody>
+      </p:sp>
+      <p:sp>
+        <p:nvSpPr>
+          <p:cNvPr id="4" name="Content Placeholder 3"/>
+          <p:cNvSpPr>
+            <a:spLocks noGrp="1"/>
+          </p:cNvSpPr>
+          <p:nvPr>
+            <p:ph sz="half" idx="2"/>
+          </p:nvPr>
+        </p:nvSpPr>
+        <p:spPr/>
+        <p:txBody>
+          <a:bodyPr/>
+          <a:lstStyle/>
+          <a:p>
+            <a:endParaRPr lang="en-US"/>
+          </a:p>
+        </p:txBody>
+      </p:sp>
+    </p:spTree>
+    <p:extLst>
+      <p:ext uri="{BB962C8B-B14F-4D97-AF65-F5344CB8AC3E}">
+        <p14:creationId xmlns:p14="http://schemas.microsoft.com/office/powerpoint/2010/main" val="3625280664"/>
+      </p:ext>
+    </p:extLst>
+  </p:cSld>
+  <p:clrMapOvr>
+    <a:masterClrMapping/>
+  </p:clrMapOvr>
+</p:sld>
+</file>
+
+<file path=ppt/slides/slide11.xml><?xml version="1.0" encoding="utf-8"?>
+<p:sld xmlns:a="http://schemas.openxmlformats.org/drawingml/2006/main" xmlns:r="http://schemas.openxmlformats.org/officeDocument/2006/relationships" xmlns:p="http://schemas.openxmlformats.org/presentationml/2006/main">
+  <p:cSld>
+    <p:spTree>
+      <p:nvGrpSpPr>
+        <p:cNvPr id="1" name=""/>
+        <p:cNvGrpSpPr/>
+        <p:nvPr/>
+      </p:nvGrpSpPr>
+      <p:grpSpPr>
+        <a:xfrm>
+          <a:off x="0" y="0"/>
+          <a:ext cx="0" cy="0"/>
+          <a:chOff x="0" y="0"/>
+          <a:chExt cx="0" cy="0"/>
+        </a:xfrm>
+      </p:grpSpPr>
+      <p:sp>
+        <p:nvSpPr>
+          <p:cNvPr id="2" name="Title 1"/>
+          <p:cNvSpPr>
+            <a:spLocks noGrp="1"/>
+          </p:cNvSpPr>
+          <p:nvPr>
+            <p:ph type="title"/>
+          </p:nvPr>
+        </p:nvSpPr>
+        <p:spPr/>
+        <p:txBody>
+          <a:bodyPr/>
+          <a:lstStyle/>
+          <a:p>
+            <a:r>
+              <a:rPr lang="en-US" dirty="0" smtClean="0"/>
               <a:t>Questions?</a:t>
             </a:r>
             <a:endParaRPr lang="en-US" dirty="0"/>
@@ -25553,7 +25676,7 @@
           <a:p>
             <a:r>
               <a:rPr lang="en-US" dirty="0" smtClean="0"/>
-              <a:t>Challenges with Current State</a:t>
+              <a:t>Key Challenges with Current State</a:t>
             </a:r>
             <a:endParaRPr lang="en-US" dirty="0"/>
           </a:p>
@@ -26416,7 +26539,7 @@
               <a:buNone/>
             </a:pPr>
             <a:r>
-              <a:rPr lang="en-US" sz="2000" b="1" dirty="0" smtClean="0">
+              <a:rPr lang="en-US" sz="2000" b="1" u="sng" dirty="0" smtClean="0">
                 <a:solidFill>
                   <a:schemeClr val="accent1"/>
                 </a:solidFill>
@@ -26712,7 +26835,7 @@
               <a:buNone/>
             </a:pPr>
             <a:r>
-              <a:rPr lang="en-US" sz="2000" b="1" dirty="0" smtClean="0">
+              <a:rPr lang="en-US" sz="2000" b="1" u="sng" dirty="0" smtClean="0">
                 <a:solidFill>
                   <a:srgbClr val="990000"/>
                 </a:solidFill>
@@ -26899,9 +27022,13 @@
           <a:p>
             <a:r>
               <a:rPr lang="en-US" dirty="0" smtClean="0"/>
-              <a:t>Walk-through of Lean UX Experimental Application in the cloud</a:t>
+              <a:t>Walk-through of Lean UX Experiment in the </a:t>
             </a:r>
-            <a:endParaRPr lang="en-US" dirty="0"/>
+            <a:r>
+              <a:rPr lang="en-US" b="1" dirty="0" smtClean="0"/>
+              <a:t>cloud</a:t>
+            </a:r>
+            <a:endParaRPr lang="en-US" b="1" dirty="0"/>
           </a:p>
         </p:txBody>
       </p:sp>
@@ -27066,7 +27193,7 @@
           <p:nvPr>
             <p:extLst>
               <p:ext uri="{D42A27DB-BD31-4B8C-83A1-F6EECF244321}">
-                <p14:modId xmlns:p14="http://schemas.microsoft.com/office/powerpoint/2010/main" val="1846475698"/>
+                <p14:modId xmlns:p14="http://schemas.microsoft.com/office/powerpoint/2010/main" val="1896280380"/>
               </p:ext>
             </p:extLst>
           </p:nvPr>
@@ -27186,6 +27313,618 @@
           </a:p>
         </p:txBody>
       </p:sp>
+      <p:sp>
+        <p:nvSpPr>
+          <p:cNvPr id="5" name="Content Placeholder 3"/>
+          <p:cNvSpPr txBox="1">
+            <a:spLocks/>
+          </p:cNvSpPr>
+          <p:nvPr/>
+        </p:nvSpPr>
+        <p:spPr>
+          <a:xfrm>
+            <a:off x="403412" y="1928559"/>
+            <a:ext cx="4055606" cy="4484120"/>
+          </a:xfrm>
+          <a:prstGeom prst="rect">
+            <a:avLst/>
+          </a:prstGeom>
+        </p:spPr>
+        <p:txBody>
+          <a:bodyPr/>
+          <a:lstStyle>
+            <a:lvl1pPr marL="454025" indent="-454025" algn="l" defTabSz="914400" rtl="0" eaLnBrk="1" latinLnBrk="0" hangingPunct="1">
+              <a:spcBef>
+                <a:spcPts val="2000"/>
+              </a:spcBef>
+              <a:buClr>
+                <a:schemeClr val="bg1">
+                  <a:lumMod val="65000"/>
+                </a:schemeClr>
+              </a:buClr>
+              <a:buSzPct val="90000"/>
+              <a:buFont typeface="Wingdings" pitchFamily="2" charset="2"/>
+              <a:buChar char=""/>
+              <a:defRPr sz="2400" kern="1200">
+                <a:solidFill>
+                  <a:schemeClr val="tx1">
+                    <a:lumMod val="85000"/>
+                    <a:lumOff val="15000"/>
+                  </a:schemeClr>
+                </a:solidFill>
+                <a:latin typeface="+mn-lt"/>
+                <a:ea typeface="+mn-ea"/>
+                <a:cs typeface="+mn-cs"/>
+              </a:defRPr>
+            </a:lvl1pPr>
+            <a:lvl2pPr marL="914400" indent="-457200" algn="l" defTabSz="914400" rtl="0" eaLnBrk="1" latinLnBrk="0" hangingPunct="1">
+              <a:spcBef>
+                <a:spcPts val="600"/>
+              </a:spcBef>
+              <a:buClr>
+                <a:schemeClr val="tx1">
+                  <a:lumMod val="75000"/>
+                  <a:lumOff val="25000"/>
+                </a:schemeClr>
+              </a:buClr>
+              <a:buSzPct val="90000"/>
+              <a:buFont typeface="Wingdings" pitchFamily="2" charset="2"/>
+              <a:buChar char=""/>
+              <a:defRPr sz="2200" kern="1200">
+                <a:solidFill>
+                  <a:schemeClr val="tx1">
+                    <a:lumMod val="85000"/>
+                    <a:lumOff val="15000"/>
+                  </a:schemeClr>
+                </a:solidFill>
+                <a:latin typeface="+mn-lt"/>
+                <a:ea typeface="+mn-ea"/>
+                <a:cs typeface="+mn-cs"/>
+              </a:defRPr>
+            </a:lvl2pPr>
+            <a:lvl3pPr marL="1260475" indent="-346075" algn="l" defTabSz="914400" rtl="0" eaLnBrk="1" latinLnBrk="0" hangingPunct="1">
+              <a:spcBef>
+                <a:spcPts val="600"/>
+              </a:spcBef>
+              <a:buClr>
+                <a:schemeClr val="bg1">
+                  <a:lumMod val="65000"/>
+                </a:schemeClr>
+              </a:buClr>
+              <a:buSzPct val="90000"/>
+              <a:buFont typeface="Wingdings" pitchFamily="2" charset="2"/>
+              <a:buChar char=""/>
+              <a:defRPr sz="2000" kern="1200">
+                <a:solidFill>
+                  <a:schemeClr val="tx1">
+                    <a:lumMod val="85000"/>
+                    <a:lumOff val="15000"/>
+                  </a:schemeClr>
+                </a:solidFill>
+                <a:latin typeface="+mn-lt"/>
+                <a:ea typeface="+mn-ea"/>
+                <a:cs typeface="+mn-cs"/>
+              </a:defRPr>
+            </a:lvl3pPr>
+            <a:lvl4pPr marL="1600200" indent="-339725" algn="l" defTabSz="914400" rtl="0" eaLnBrk="1" latinLnBrk="0" hangingPunct="1">
+              <a:spcBef>
+                <a:spcPts val="600"/>
+              </a:spcBef>
+              <a:buClr>
+                <a:schemeClr val="tx1">
+                  <a:lumMod val="75000"/>
+                  <a:lumOff val="25000"/>
+                </a:schemeClr>
+              </a:buClr>
+              <a:buSzPct val="90000"/>
+              <a:buFont typeface="Wingdings" pitchFamily="2" charset="2"/>
+              <a:buChar char=""/>
+              <a:defRPr sz="1800" kern="1200">
+                <a:solidFill>
+                  <a:schemeClr val="tx1">
+                    <a:lumMod val="85000"/>
+                    <a:lumOff val="15000"/>
+                  </a:schemeClr>
+                </a:solidFill>
+                <a:latin typeface="+mn-lt"/>
+                <a:ea typeface="+mn-ea"/>
+                <a:cs typeface="+mn-cs"/>
+              </a:defRPr>
+            </a:lvl4pPr>
+            <a:lvl5pPr marL="1939925" indent="-331788" algn="l" defTabSz="914400" rtl="0" eaLnBrk="1" latinLnBrk="0" hangingPunct="1">
+              <a:spcBef>
+                <a:spcPts val="600"/>
+              </a:spcBef>
+              <a:buClr>
+                <a:schemeClr val="bg1">
+                  <a:lumMod val="65000"/>
+                </a:schemeClr>
+              </a:buClr>
+              <a:buSzPct val="90000"/>
+              <a:buFont typeface="Wingdings" pitchFamily="2" charset="2"/>
+              <a:buChar char=""/>
+              <a:defRPr sz="1800" kern="1200">
+                <a:solidFill>
+                  <a:schemeClr val="tx1">
+                    <a:lumMod val="85000"/>
+                    <a:lumOff val="15000"/>
+                  </a:schemeClr>
+                </a:solidFill>
+                <a:latin typeface="+mn-lt"/>
+                <a:ea typeface="+mn-ea"/>
+                <a:cs typeface="+mn-cs"/>
+              </a:defRPr>
+            </a:lvl5pPr>
+            <a:lvl6pPr marL="2290763" indent="-344488" algn="l" defTabSz="914400" rtl="0" eaLnBrk="1" latinLnBrk="0" hangingPunct="1">
+              <a:spcBef>
+                <a:spcPts val="600"/>
+              </a:spcBef>
+              <a:buClr>
+                <a:schemeClr val="tx1">
+                  <a:lumMod val="75000"/>
+                  <a:lumOff val="25000"/>
+                </a:schemeClr>
+              </a:buClr>
+              <a:buSzPct val="90000"/>
+              <a:buFont typeface="Wingdings" pitchFamily="2" charset="2"/>
+              <a:buChar char=""/>
+              <a:defRPr lang="en-US" sz="1800" kern="1200" dirty="0" smtClean="0">
+                <a:solidFill>
+                  <a:schemeClr val="tx1">
+                    <a:lumMod val="85000"/>
+                    <a:lumOff val="15000"/>
+                  </a:schemeClr>
+                </a:solidFill>
+                <a:latin typeface="+mn-lt"/>
+                <a:ea typeface="+mn-ea"/>
+                <a:cs typeface="+mn-cs"/>
+              </a:defRPr>
+            </a:lvl6pPr>
+            <a:lvl7pPr marL="2625725" indent="-344488" algn="l" defTabSz="914400" rtl="0" eaLnBrk="1" latinLnBrk="0" hangingPunct="1">
+              <a:spcBef>
+                <a:spcPts val="600"/>
+              </a:spcBef>
+              <a:buClr>
+                <a:schemeClr val="bg1">
+                  <a:lumMod val="65000"/>
+                </a:schemeClr>
+              </a:buClr>
+              <a:buSzPct val="90000"/>
+              <a:buFont typeface="Wingdings" pitchFamily="2" charset="2"/>
+              <a:buChar char=""/>
+              <a:defRPr lang="en-US" sz="1800" kern="1200" dirty="0" smtClean="0">
+                <a:solidFill>
+                  <a:schemeClr val="tx1">
+                    <a:lumMod val="85000"/>
+                    <a:lumOff val="15000"/>
+                  </a:schemeClr>
+                </a:solidFill>
+                <a:latin typeface="+mn-lt"/>
+                <a:ea typeface="+mn-ea"/>
+                <a:cs typeface="+mn-cs"/>
+              </a:defRPr>
+            </a:lvl7pPr>
+            <a:lvl8pPr marL="2970213" indent="-344488" algn="l" defTabSz="914400" rtl="0" eaLnBrk="1" latinLnBrk="0" hangingPunct="1">
+              <a:spcBef>
+                <a:spcPts val="600"/>
+              </a:spcBef>
+              <a:buClr>
+                <a:schemeClr val="tx1">
+                  <a:lumMod val="75000"/>
+                  <a:lumOff val="25000"/>
+                </a:schemeClr>
+              </a:buClr>
+              <a:buSzPct val="90000"/>
+              <a:buFont typeface="Wingdings" pitchFamily="2" charset="2"/>
+              <a:buChar char=""/>
+              <a:defRPr lang="en-US" sz="1800" kern="1200" dirty="0" smtClean="0">
+                <a:solidFill>
+                  <a:schemeClr val="tx1">
+                    <a:lumMod val="85000"/>
+                    <a:lumOff val="15000"/>
+                  </a:schemeClr>
+                </a:solidFill>
+                <a:latin typeface="+mn-lt"/>
+                <a:ea typeface="+mn-ea"/>
+                <a:cs typeface="+mn-cs"/>
+              </a:defRPr>
+            </a:lvl8pPr>
+            <a:lvl9pPr marL="3313113" indent="-344488" algn="l" defTabSz="914400" rtl="0" eaLnBrk="1" latinLnBrk="0" hangingPunct="1">
+              <a:spcBef>
+                <a:spcPts val="600"/>
+              </a:spcBef>
+              <a:buClr>
+                <a:schemeClr val="bg1">
+                  <a:lumMod val="65000"/>
+                </a:schemeClr>
+              </a:buClr>
+              <a:buSzPct val="90000"/>
+              <a:buFont typeface="Wingdings" pitchFamily="2" charset="2"/>
+              <a:buChar char=""/>
+              <a:defRPr lang="en-US" sz="1800" kern="1200" dirty="0">
+                <a:solidFill>
+                  <a:schemeClr val="tx1">
+                    <a:lumMod val="85000"/>
+                    <a:lumOff val="15000"/>
+                  </a:schemeClr>
+                </a:solidFill>
+                <a:latin typeface="+mn-lt"/>
+                <a:ea typeface="+mn-ea"/>
+                <a:cs typeface="+mn-cs"/>
+              </a:defRPr>
+            </a:lvl9pPr>
+          </a:lstStyle>
+          <a:p>
+            <a:pPr marL="0" indent="0">
+              <a:buNone/>
+            </a:pPr>
+            <a:r>
+              <a:rPr lang="en-US" sz="2000" b="1" u="sng" dirty="0" smtClean="0">
+                <a:solidFill>
+                  <a:schemeClr val="accent1"/>
+                </a:solidFill>
+              </a:rPr>
+              <a:t>Meeting Current Quality Standards:</a:t>
+            </a:r>
+          </a:p>
+          <a:p>
+            <a:r>
+              <a:rPr lang="en-US" sz="2000" dirty="0" smtClean="0"/>
+              <a:t>Developer Documentation</a:t>
+            </a:r>
+          </a:p>
+          <a:p>
+            <a:r>
+              <a:rPr lang="en-US" sz="2000" dirty="0" smtClean="0"/>
+              <a:t>Source Control, Basic Continuous Integration, </a:t>
+            </a:r>
+            <a:r>
+              <a:rPr lang="en-US" sz="2000" dirty="0"/>
+              <a:t>Dependency </a:t>
+            </a:r>
+            <a:r>
+              <a:rPr lang="en-US" sz="2000" dirty="0" smtClean="0"/>
+              <a:t>Management, &amp; Automatic Deployment </a:t>
+            </a:r>
+          </a:p>
+          <a:p>
+            <a:r>
+              <a:rPr lang="en-US" sz="2000" dirty="0" smtClean="0"/>
+              <a:t>Enterprise Application Architecture</a:t>
+            </a:r>
+          </a:p>
+          <a:p>
+            <a:r>
+              <a:rPr lang="en-US" sz="2000" dirty="0" err="1" smtClean="0"/>
+              <a:t>CloudBerry</a:t>
+            </a:r>
+            <a:r>
+              <a:rPr lang="en-US" sz="2000" dirty="0" smtClean="0"/>
+              <a:t> Design</a:t>
+            </a:r>
+          </a:p>
+        </p:txBody>
+      </p:sp>
+      <p:sp>
+        <p:nvSpPr>
+          <p:cNvPr id="6" name="Content Placeholder 3"/>
+          <p:cNvSpPr txBox="1">
+            <a:spLocks/>
+          </p:cNvSpPr>
+          <p:nvPr/>
+        </p:nvSpPr>
+        <p:spPr>
+          <a:xfrm>
+            <a:off x="4792336" y="1928558"/>
+            <a:ext cx="4047374" cy="4484121"/>
+          </a:xfrm>
+          <a:prstGeom prst="rect">
+            <a:avLst/>
+          </a:prstGeom>
+        </p:spPr>
+        <p:txBody>
+          <a:bodyPr/>
+          <a:lstStyle>
+            <a:lvl1pPr marL="454025" indent="-454025" algn="l" defTabSz="914400" rtl="0" eaLnBrk="1" latinLnBrk="0" hangingPunct="1">
+              <a:spcBef>
+                <a:spcPts val="2000"/>
+              </a:spcBef>
+              <a:buClr>
+                <a:schemeClr val="bg1">
+                  <a:lumMod val="65000"/>
+                </a:schemeClr>
+              </a:buClr>
+              <a:buSzPct val="90000"/>
+              <a:buFont typeface="Wingdings" pitchFamily="2" charset="2"/>
+              <a:buChar char=""/>
+              <a:defRPr sz="2400" kern="1200">
+                <a:solidFill>
+                  <a:schemeClr val="tx1">
+                    <a:lumMod val="85000"/>
+                    <a:lumOff val="15000"/>
+                  </a:schemeClr>
+                </a:solidFill>
+                <a:latin typeface="+mn-lt"/>
+                <a:ea typeface="+mn-ea"/>
+                <a:cs typeface="+mn-cs"/>
+              </a:defRPr>
+            </a:lvl1pPr>
+            <a:lvl2pPr marL="914400" indent="-457200" algn="l" defTabSz="914400" rtl="0" eaLnBrk="1" latinLnBrk="0" hangingPunct="1">
+              <a:spcBef>
+                <a:spcPts val="600"/>
+              </a:spcBef>
+              <a:buClr>
+                <a:schemeClr val="tx1">
+                  <a:lumMod val="75000"/>
+                  <a:lumOff val="25000"/>
+                </a:schemeClr>
+              </a:buClr>
+              <a:buSzPct val="90000"/>
+              <a:buFont typeface="Wingdings" pitchFamily="2" charset="2"/>
+              <a:buChar char=""/>
+              <a:defRPr sz="2200" kern="1200">
+                <a:solidFill>
+                  <a:schemeClr val="tx1">
+                    <a:lumMod val="85000"/>
+                    <a:lumOff val="15000"/>
+                  </a:schemeClr>
+                </a:solidFill>
+                <a:latin typeface="+mn-lt"/>
+                <a:ea typeface="+mn-ea"/>
+                <a:cs typeface="+mn-cs"/>
+              </a:defRPr>
+            </a:lvl2pPr>
+            <a:lvl3pPr marL="1260475" indent="-346075" algn="l" defTabSz="914400" rtl="0" eaLnBrk="1" latinLnBrk="0" hangingPunct="1">
+              <a:spcBef>
+                <a:spcPts val="600"/>
+              </a:spcBef>
+              <a:buClr>
+                <a:schemeClr val="bg1">
+                  <a:lumMod val="65000"/>
+                </a:schemeClr>
+              </a:buClr>
+              <a:buSzPct val="90000"/>
+              <a:buFont typeface="Wingdings" pitchFamily="2" charset="2"/>
+              <a:buChar char=""/>
+              <a:defRPr sz="2000" kern="1200">
+                <a:solidFill>
+                  <a:schemeClr val="tx1">
+                    <a:lumMod val="85000"/>
+                    <a:lumOff val="15000"/>
+                  </a:schemeClr>
+                </a:solidFill>
+                <a:latin typeface="+mn-lt"/>
+                <a:ea typeface="+mn-ea"/>
+                <a:cs typeface="+mn-cs"/>
+              </a:defRPr>
+            </a:lvl3pPr>
+            <a:lvl4pPr marL="1600200" indent="-339725" algn="l" defTabSz="914400" rtl="0" eaLnBrk="1" latinLnBrk="0" hangingPunct="1">
+              <a:spcBef>
+                <a:spcPts val="600"/>
+              </a:spcBef>
+              <a:buClr>
+                <a:schemeClr val="tx1">
+                  <a:lumMod val="75000"/>
+                  <a:lumOff val="25000"/>
+                </a:schemeClr>
+              </a:buClr>
+              <a:buSzPct val="90000"/>
+              <a:buFont typeface="Wingdings" pitchFamily="2" charset="2"/>
+              <a:buChar char=""/>
+              <a:defRPr sz="1800" kern="1200">
+                <a:solidFill>
+                  <a:schemeClr val="tx1">
+                    <a:lumMod val="85000"/>
+                    <a:lumOff val="15000"/>
+                  </a:schemeClr>
+                </a:solidFill>
+                <a:latin typeface="+mn-lt"/>
+                <a:ea typeface="+mn-ea"/>
+                <a:cs typeface="+mn-cs"/>
+              </a:defRPr>
+            </a:lvl4pPr>
+            <a:lvl5pPr marL="1939925" indent="-331788" algn="l" defTabSz="914400" rtl="0" eaLnBrk="1" latinLnBrk="0" hangingPunct="1">
+              <a:spcBef>
+                <a:spcPts val="600"/>
+              </a:spcBef>
+              <a:buClr>
+                <a:schemeClr val="bg1">
+                  <a:lumMod val="65000"/>
+                </a:schemeClr>
+              </a:buClr>
+              <a:buSzPct val="90000"/>
+              <a:buFont typeface="Wingdings" pitchFamily="2" charset="2"/>
+              <a:buChar char=""/>
+              <a:defRPr sz="1800" kern="1200">
+                <a:solidFill>
+                  <a:schemeClr val="tx1">
+                    <a:lumMod val="85000"/>
+                    <a:lumOff val="15000"/>
+                  </a:schemeClr>
+                </a:solidFill>
+                <a:latin typeface="+mn-lt"/>
+                <a:ea typeface="+mn-ea"/>
+                <a:cs typeface="+mn-cs"/>
+              </a:defRPr>
+            </a:lvl5pPr>
+            <a:lvl6pPr marL="2290763" indent="-344488" algn="l" defTabSz="914400" rtl="0" eaLnBrk="1" latinLnBrk="0" hangingPunct="1">
+              <a:spcBef>
+                <a:spcPts val="600"/>
+              </a:spcBef>
+              <a:buClr>
+                <a:schemeClr val="tx1">
+                  <a:lumMod val="75000"/>
+                  <a:lumOff val="25000"/>
+                </a:schemeClr>
+              </a:buClr>
+              <a:buSzPct val="90000"/>
+              <a:buFont typeface="Wingdings" pitchFamily="2" charset="2"/>
+              <a:buChar char=""/>
+              <a:defRPr lang="en-US" sz="1800" kern="1200" dirty="0" smtClean="0">
+                <a:solidFill>
+                  <a:schemeClr val="tx1">
+                    <a:lumMod val="85000"/>
+                    <a:lumOff val="15000"/>
+                  </a:schemeClr>
+                </a:solidFill>
+                <a:latin typeface="+mn-lt"/>
+                <a:ea typeface="+mn-ea"/>
+                <a:cs typeface="+mn-cs"/>
+              </a:defRPr>
+            </a:lvl6pPr>
+            <a:lvl7pPr marL="2625725" indent="-344488" algn="l" defTabSz="914400" rtl="0" eaLnBrk="1" latinLnBrk="0" hangingPunct="1">
+              <a:spcBef>
+                <a:spcPts val="600"/>
+              </a:spcBef>
+              <a:buClr>
+                <a:schemeClr val="bg1">
+                  <a:lumMod val="65000"/>
+                </a:schemeClr>
+              </a:buClr>
+              <a:buSzPct val="90000"/>
+              <a:buFont typeface="Wingdings" pitchFamily="2" charset="2"/>
+              <a:buChar char=""/>
+              <a:defRPr lang="en-US" sz="1800" kern="1200" dirty="0" smtClean="0">
+                <a:solidFill>
+                  <a:schemeClr val="tx1">
+                    <a:lumMod val="85000"/>
+                    <a:lumOff val="15000"/>
+                  </a:schemeClr>
+                </a:solidFill>
+                <a:latin typeface="+mn-lt"/>
+                <a:ea typeface="+mn-ea"/>
+                <a:cs typeface="+mn-cs"/>
+              </a:defRPr>
+            </a:lvl7pPr>
+            <a:lvl8pPr marL="2970213" indent="-344488" algn="l" defTabSz="914400" rtl="0" eaLnBrk="1" latinLnBrk="0" hangingPunct="1">
+              <a:spcBef>
+                <a:spcPts val="600"/>
+              </a:spcBef>
+              <a:buClr>
+                <a:schemeClr val="tx1">
+                  <a:lumMod val="75000"/>
+                  <a:lumOff val="25000"/>
+                </a:schemeClr>
+              </a:buClr>
+              <a:buSzPct val="90000"/>
+              <a:buFont typeface="Wingdings" pitchFamily="2" charset="2"/>
+              <a:buChar char=""/>
+              <a:defRPr lang="en-US" sz="1800" kern="1200" dirty="0" smtClean="0">
+                <a:solidFill>
+                  <a:schemeClr val="tx1">
+                    <a:lumMod val="85000"/>
+                    <a:lumOff val="15000"/>
+                  </a:schemeClr>
+                </a:solidFill>
+                <a:latin typeface="+mn-lt"/>
+                <a:ea typeface="+mn-ea"/>
+                <a:cs typeface="+mn-cs"/>
+              </a:defRPr>
+            </a:lvl8pPr>
+            <a:lvl9pPr marL="3313113" indent="-344488" algn="l" defTabSz="914400" rtl="0" eaLnBrk="1" latinLnBrk="0" hangingPunct="1">
+              <a:spcBef>
+                <a:spcPts val="600"/>
+              </a:spcBef>
+              <a:buClr>
+                <a:schemeClr val="bg1">
+                  <a:lumMod val="65000"/>
+                </a:schemeClr>
+              </a:buClr>
+              <a:buSzPct val="90000"/>
+              <a:buFont typeface="Wingdings" pitchFamily="2" charset="2"/>
+              <a:buChar char=""/>
+              <a:defRPr lang="en-US" sz="1800" kern="1200" dirty="0">
+                <a:solidFill>
+                  <a:schemeClr val="tx1">
+                    <a:lumMod val="85000"/>
+                    <a:lumOff val="15000"/>
+                  </a:schemeClr>
+                </a:solidFill>
+                <a:latin typeface="+mn-lt"/>
+                <a:ea typeface="+mn-ea"/>
+                <a:cs typeface="+mn-cs"/>
+              </a:defRPr>
+            </a:lvl9pPr>
+          </a:lstStyle>
+          <a:p>
+            <a:pPr marL="0" indent="0">
+              <a:buNone/>
+            </a:pPr>
+            <a:r>
+              <a:rPr lang="en-US" sz="2000" b="1" u="sng" dirty="0" smtClean="0">
+                <a:solidFill>
+                  <a:srgbClr val="990000"/>
+                </a:solidFill>
+              </a:rPr>
+              <a:t>Breaking New Ground:</a:t>
+            </a:r>
+          </a:p>
+          <a:p>
+            <a:r>
+              <a:rPr lang="en-US" sz="2000" dirty="0" smtClean="0"/>
+              <a:t>Cutting-edge Presentation Technologies (JavaScript)</a:t>
+            </a:r>
+            <a:endParaRPr lang="en-US" sz="2000" b="1" dirty="0" smtClean="0"/>
+          </a:p>
+          <a:p>
+            <a:r>
+              <a:rPr lang="en-US" sz="2000" b="1" dirty="0" smtClean="0"/>
+              <a:t>Complimentary Data Storage Mechanism Used</a:t>
+            </a:r>
+          </a:p>
+          <a:p>
+            <a:r>
+              <a:rPr lang="en-US" sz="2000" dirty="0" smtClean="0"/>
+              <a:t>Continuous Delivery </a:t>
+            </a:r>
+            <a:br>
+              <a:rPr lang="en-US" sz="2000" dirty="0" smtClean="0"/>
+            </a:br>
+            <a:r>
+              <a:rPr lang="en-US" sz="2000" i="1" dirty="0" smtClean="0">
+                <a:solidFill>
+                  <a:schemeClr val="tx1">
+                    <a:lumMod val="50000"/>
+                    <a:lumOff val="50000"/>
+                  </a:schemeClr>
+                </a:solidFill>
+              </a:rPr>
+              <a:t>Note</a:t>
+            </a:r>
+            <a:r>
+              <a:rPr lang="en-US" sz="2000" dirty="0" smtClean="0">
+                <a:solidFill>
+                  <a:schemeClr val="tx1">
+                    <a:lumMod val="50000"/>
+                    <a:lumOff val="50000"/>
+                  </a:schemeClr>
+                </a:solidFill>
+              </a:rPr>
+              <a:t>: UI deployment separated</a:t>
+            </a:r>
+          </a:p>
+          <a:p>
+            <a:r>
+              <a:rPr lang="en-US" sz="2000" b="1" dirty="0" smtClean="0">
+                <a:solidFill>
+                  <a:schemeClr val="accent1"/>
+                </a:solidFill>
+              </a:rPr>
+              <a:t>Page Loads &lt; 1 second</a:t>
+            </a:r>
+          </a:p>
+          <a:p>
+            <a:r>
+              <a:rPr lang="en-US" sz="2000" b="1" dirty="0" smtClean="0">
+                <a:solidFill>
+                  <a:schemeClr val="accent1"/>
+                </a:solidFill>
+              </a:rPr>
+              <a:t>Deployed to the Cloud </a:t>
+            </a:r>
+          </a:p>
+        </p:txBody>
+      </p:sp>
     </p:spTree>
     <p:extLst>
       <p:ext uri="{BB962C8B-B14F-4D97-AF65-F5344CB8AC3E}">
@@ -27218,12 +27957,12 @@
       </p:grpSpPr>
       <p:sp>
         <p:nvSpPr>
-          <p:cNvPr id="2" name="Title 1"/>
+          <p:cNvPr id="5" name="Subtitle 4"/>
           <p:cNvSpPr>
             <a:spLocks noGrp="1"/>
           </p:cNvSpPr>
           <p:nvPr>
-            <p:ph type="title"/>
+            <p:ph type="subTitle" idx="1"/>
           </p:nvPr>
         </p:nvSpPr>
         <p:spPr/>
@@ -27233,20 +27972,32 @@
           <a:p>
             <a:r>
               <a:rPr lang="en-US" dirty="0" smtClean="0"/>
-              <a:t>Recommendations &amp; Next Steps</a:t>
+              <a:t>It’s all about delivering </a:t>
             </a:r>
-            <a:endParaRPr lang="en-US" dirty="0"/>
+            <a:r>
+              <a:rPr lang="en-US" b="1" u="sng" dirty="0" smtClean="0"/>
+              <a:t>Business Value</a:t>
+            </a:r>
+            <a:r>
+              <a:rPr lang="en-US" dirty="0" smtClean="0"/>
+              <a:t> while focusing on </a:t>
+            </a:r>
+            <a:r>
+              <a:rPr lang="en-US" b="1" u="sng" dirty="0" smtClean="0"/>
+              <a:t>Customer Satisfaction</a:t>
+            </a:r>
+            <a:endParaRPr lang="en-US" b="1" u="sng" dirty="0"/>
           </a:p>
         </p:txBody>
       </p:sp>
       <p:sp>
         <p:nvSpPr>
-          <p:cNvPr id="3" name="Content Placeholder 2"/>
+          <p:cNvPr id="2" name="Title 1"/>
           <p:cNvSpPr>
             <a:spLocks noGrp="1"/>
           </p:cNvSpPr>
           <p:nvPr>
-            <p:ph sz="half" idx="1"/>
+            <p:ph type="ctrTitle"/>
           </p:nvPr>
         </p:nvSpPr>
         <p:spPr/>
@@ -27254,29 +28005,38 @@
           <a:bodyPr/>
           <a:lstStyle/>
           <a:p>
-            <a:endParaRPr lang="en-US"/>
+            <a:r>
+              <a:rPr lang="en-US" dirty="0" smtClean="0"/>
+              <a:t>Understanding the Need	</a:t>
+            </a:r>
+            <a:endParaRPr lang="en-US" dirty="0"/>
           </a:p>
         </p:txBody>
       </p:sp>
-      <p:sp>
-        <p:nvSpPr>
-          <p:cNvPr id="4" name="Content Placeholder 3"/>
-          <p:cNvSpPr>
-            <a:spLocks noGrp="1"/>
-          </p:cNvSpPr>
+      <p:pic>
+        <p:nvPicPr>
+          <p:cNvPr id="13" name="Picture Placeholder 12"/>
+          <p:cNvPicPr>
+            <a:picLocks noGrp="1" noChangeAspect="1"/>
+          </p:cNvPicPr>
           <p:nvPr>
-            <p:ph sz="half" idx="2"/>
+            <p:ph type="pic" sz="quarter" idx="13"/>
           </p:nvPr>
-        </p:nvSpPr>
-        <p:spPr/>
-        <p:txBody>
-          <a:bodyPr/>
-          <a:lstStyle/>
-          <a:p>
-            <a:endParaRPr lang="en-US"/>
-          </a:p>
-        </p:txBody>
-      </p:sp>
+        </p:nvPicPr>
+        <p:blipFill>
+          <a:blip r:embed="rId2"/>
+          <a:srcRect l="-45562" r="-45562"/>
+          <a:stretch>
+            <a:fillRect/>
+          </a:stretch>
+        </p:blipFill>
+        <p:spPr>
+          <a:xfrm>
+            <a:off x="1146302" y="2605071"/>
+            <a:ext cx="6515381" cy="3325848"/>
+          </a:xfrm>
+        </p:spPr>
+      </p:pic>
     </p:spTree>
     <p:extLst>
       <p:ext uri="{BB962C8B-B14F-4D97-AF65-F5344CB8AC3E}">

</xml_diff>

<commit_message>
decided against next steps slide - will make that a discussion given the myraid of options that could come out of this effort
</commit_message>
<xml_diff>
--- a/docs/presentations/LeanUx - IT Management.pptx
+++ b/docs/presentations/LeanUx - IT Management.pptx
@@ -4,6 +4,9 @@
   <p:sldMasterIdLst>
     <p:sldMasterId id="2147483714" r:id="rId1"/>
   </p:sldMasterIdLst>
+  <p:notesMasterIdLst>
+    <p:notesMasterId r:id="rId12"/>
+  </p:notesMasterIdLst>
   <p:sldIdLst>
     <p:sldId id="256" r:id="rId2"/>
     <p:sldId id="260" r:id="rId3"/>
@@ -14,8 +17,7 @@
     <p:sldId id="265" r:id="rId8"/>
     <p:sldId id="266" r:id="rId9"/>
     <p:sldId id="267" r:id="rId10"/>
-    <p:sldId id="269" r:id="rId11"/>
-    <p:sldId id="268" r:id="rId12"/>
+    <p:sldId id="268" r:id="rId11"/>
   </p:sldIdLst>
   <p:sldSz cx="9144000" cy="6858000" type="screen4x3"/>
   <p:notesSz cx="6858000" cy="9144000"/>
@@ -4177,6 +4179,881 @@
     </dgm:fillClrLst>
     <dgm:linClrLst>
       <a:schemeClr val="accent1"/>
+    </dgm:linClrLst>
+    <dgm:effectClrLst/>
+    <dgm:txLinClrLst/>
+    <dgm:txFillClrLst meth="repeat">
+      <a:schemeClr val="dk1"/>
+    </dgm:txFillClrLst>
+    <dgm:txEffectClrLst/>
+  </dgm:styleLbl>
+  <dgm:styleLbl name="bgShp">
+    <dgm:fillClrLst meth="repeat">
+      <a:schemeClr val="accent4">
+        <a:tint val="40000"/>
+      </a:schemeClr>
+    </dgm:fillClrLst>
+    <dgm:linClrLst meth="repeat">
+      <a:schemeClr val="dk1"/>
+    </dgm:linClrLst>
+    <dgm:effectClrLst/>
+    <dgm:txLinClrLst/>
+    <dgm:txFillClrLst meth="repeat">
+      <a:schemeClr val="dk1"/>
+    </dgm:txFillClrLst>
+    <dgm:txEffectClrLst/>
+  </dgm:styleLbl>
+  <dgm:styleLbl name="dkBgShp">
+    <dgm:fillClrLst meth="repeat">
+      <a:schemeClr val="accent4">
+        <a:shade val="90000"/>
+      </a:schemeClr>
+    </dgm:fillClrLst>
+    <dgm:linClrLst meth="repeat">
+      <a:schemeClr val="dk1"/>
+    </dgm:linClrLst>
+    <dgm:effectClrLst/>
+    <dgm:txLinClrLst/>
+    <dgm:txFillClrLst meth="repeat">
+      <a:schemeClr val="lt1"/>
+    </dgm:txFillClrLst>
+    <dgm:txEffectClrLst/>
+  </dgm:styleLbl>
+  <dgm:styleLbl name="trBgShp">
+    <dgm:fillClrLst meth="repeat">
+      <a:schemeClr val="accent4">
+        <a:tint val="50000"/>
+        <a:alpha val="40000"/>
+      </a:schemeClr>
+    </dgm:fillClrLst>
+    <dgm:linClrLst meth="repeat">
+      <a:schemeClr val="accent4"/>
+    </dgm:linClrLst>
+    <dgm:effectClrLst/>
+    <dgm:txLinClrLst/>
+    <dgm:txFillClrLst meth="repeat">
+      <a:schemeClr val="lt1"/>
+    </dgm:txFillClrLst>
+    <dgm:txEffectClrLst/>
+  </dgm:styleLbl>
+  <dgm:styleLbl name="fgShp">
+    <dgm:fillClrLst meth="repeat">
+      <a:schemeClr val="accent4">
+        <a:tint val="40000"/>
+      </a:schemeClr>
+    </dgm:fillClrLst>
+    <dgm:linClrLst meth="repeat">
+      <a:schemeClr val="lt1"/>
+    </dgm:linClrLst>
+    <dgm:effectClrLst/>
+    <dgm:txLinClrLst/>
+    <dgm:txFillClrLst meth="repeat">
+      <a:schemeClr val="dk1"/>
+    </dgm:txFillClrLst>
+    <dgm:txEffectClrLst/>
+  </dgm:styleLbl>
+  <dgm:styleLbl name="revTx">
+    <dgm:fillClrLst meth="repeat">
+      <a:schemeClr val="lt1">
+        <a:alpha val="0"/>
+      </a:schemeClr>
+    </dgm:fillClrLst>
+    <dgm:linClrLst meth="repeat">
+      <a:schemeClr val="dk1">
+        <a:alpha val="0"/>
+      </a:schemeClr>
+    </dgm:linClrLst>
+    <dgm:effectClrLst/>
+    <dgm:txLinClrLst/>
+    <dgm:txFillClrLst meth="repeat">
+      <a:schemeClr val="tx1"/>
+    </dgm:txFillClrLst>
+    <dgm:txEffectClrLst/>
+  </dgm:styleLbl>
+</dgm:colorsDef>
+</file>
+
+<file path=ppt/diagrams/colors6.xml><?xml version="1.0" encoding="utf-8"?>
+<dgm:colorsDef xmlns:dgm="http://schemas.openxmlformats.org/drawingml/2006/diagram" xmlns:a="http://schemas.openxmlformats.org/drawingml/2006/main" uniqueId="urn:microsoft.com/office/officeart/2005/8/colors/accent4_3">
+  <dgm:title val=""/>
+  <dgm:desc val=""/>
+  <dgm:catLst>
+    <dgm:cat type="accent4" pri="11300"/>
+  </dgm:catLst>
+  <dgm:styleLbl name="node0">
+    <dgm:fillClrLst meth="repeat">
+      <a:schemeClr val="accent4">
+        <a:shade val="80000"/>
+      </a:schemeClr>
+    </dgm:fillClrLst>
+    <dgm:linClrLst meth="repeat">
+      <a:schemeClr val="lt1"/>
+    </dgm:linClrLst>
+    <dgm:effectClrLst/>
+    <dgm:txLinClrLst/>
+    <dgm:txFillClrLst/>
+    <dgm:txEffectClrLst/>
+  </dgm:styleLbl>
+  <dgm:styleLbl name="node1">
+    <dgm:fillClrLst>
+      <a:schemeClr val="accent4">
+        <a:shade val="80000"/>
+      </a:schemeClr>
+      <a:schemeClr val="accent4">
+        <a:tint val="70000"/>
+      </a:schemeClr>
+    </dgm:fillClrLst>
+    <dgm:linClrLst meth="repeat">
+      <a:schemeClr val="lt1"/>
+    </dgm:linClrLst>
+    <dgm:effectClrLst/>
+    <dgm:txLinClrLst/>
+    <dgm:txFillClrLst/>
+    <dgm:txEffectClrLst/>
+  </dgm:styleLbl>
+  <dgm:styleLbl name="alignNode1">
+    <dgm:fillClrLst>
+      <a:schemeClr val="accent4">
+        <a:shade val="80000"/>
+      </a:schemeClr>
+      <a:schemeClr val="accent4">
+        <a:tint val="70000"/>
+      </a:schemeClr>
+    </dgm:fillClrLst>
+    <dgm:linClrLst>
+      <a:schemeClr val="accent4">
+        <a:shade val="80000"/>
+      </a:schemeClr>
+      <a:schemeClr val="accent4">
+        <a:tint val="70000"/>
+      </a:schemeClr>
+    </dgm:linClrLst>
+    <dgm:effectClrLst/>
+    <dgm:txLinClrLst/>
+    <dgm:txFillClrLst/>
+    <dgm:txEffectClrLst/>
+  </dgm:styleLbl>
+  <dgm:styleLbl name="lnNode1">
+    <dgm:fillClrLst>
+      <a:schemeClr val="accent4">
+        <a:shade val="80000"/>
+      </a:schemeClr>
+      <a:schemeClr val="accent4">
+        <a:tint val="70000"/>
+      </a:schemeClr>
+    </dgm:fillClrLst>
+    <dgm:linClrLst meth="repeat">
+      <a:schemeClr val="lt1"/>
+    </dgm:linClrLst>
+    <dgm:effectClrLst/>
+    <dgm:txLinClrLst/>
+    <dgm:txFillClrLst/>
+    <dgm:txEffectClrLst/>
+  </dgm:styleLbl>
+  <dgm:styleLbl name="vennNode1">
+    <dgm:fillClrLst>
+      <a:schemeClr val="accent4">
+        <a:shade val="80000"/>
+        <a:alpha val="50000"/>
+      </a:schemeClr>
+      <a:schemeClr val="accent4">
+        <a:tint val="70000"/>
+        <a:alpha val="50000"/>
+      </a:schemeClr>
+    </dgm:fillClrLst>
+    <dgm:linClrLst meth="repeat">
+      <a:schemeClr val="lt1"/>
+    </dgm:linClrLst>
+    <dgm:effectClrLst/>
+    <dgm:txLinClrLst/>
+    <dgm:txFillClrLst/>
+    <dgm:txEffectClrLst/>
+  </dgm:styleLbl>
+  <dgm:styleLbl name="node2">
+    <dgm:fillClrLst>
+      <a:schemeClr val="accent4">
+        <a:tint val="99000"/>
+      </a:schemeClr>
+    </dgm:fillClrLst>
+    <dgm:linClrLst meth="repeat">
+      <a:schemeClr val="lt1"/>
+    </dgm:linClrLst>
+    <dgm:effectClrLst/>
+    <dgm:txLinClrLst/>
+    <dgm:txFillClrLst/>
+    <dgm:txEffectClrLst/>
+  </dgm:styleLbl>
+  <dgm:styleLbl name="node3">
+    <dgm:fillClrLst>
+      <a:schemeClr val="accent4">
+        <a:tint val="80000"/>
+      </a:schemeClr>
+    </dgm:fillClrLst>
+    <dgm:linClrLst meth="repeat">
+      <a:schemeClr val="lt1"/>
+    </dgm:linClrLst>
+    <dgm:effectClrLst/>
+    <dgm:txLinClrLst/>
+    <dgm:txFillClrLst/>
+    <dgm:txEffectClrLst/>
+  </dgm:styleLbl>
+  <dgm:styleLbl name="node4">
+    <dgm:fillClrLst>
+      <a:schemeClr val="accent4">
+        <a:tint val="70000"/>
+      </a:schemeClr>
+    </dgm:fillClrLst>
+    <dgm:linClrLst meth="repeat">
+      <a:schemeClr val="lt1"/>
+    </dgm:linClrLst>
+    <dgm:effectClrLst/>
+    <dgm:txLinClrLst/>
+    <dgm:txFillClrLst/>
+    <dgm:txEffectClrLst/>
+  </dgm:styleLbl>
+  <dgm:styleLbl name="fgImgPlace1">
+    <dgm:fillClrLst>
+      <a:schemeClr val="accent4">
+        <a:tint val="50000"/>
+      </a:schemeClr>
+      <a:schemeClr val="accent4">
+        <a:tint val="20000"/>
+      </a:schemeClr>
+    </dgm:fillClrLst>
+    <dgm:linClrLst meth="repeat">
+      <a:schemeClr val="lt1"/>
+    </dgm:linClrLst>
+    <dgm:effectClrLst/>
+    <dgm:txLinClrLst/>
+    <dgm:txFillClrLst meth="repeat">
+      <a:schemeClr val="lt1"/>
+    </dgm:txFillClrLst>
+    <dgm:txEffectClrLst/>
+  </dgm:styleLbl>
+  <dgm:styleLbl name="alignImgPlace1">
+    <dgm:fillClrLst>
+      <a:schemeClr val="accent4">
+        <a:tint val="50000"/>
+      </a:schemeClr>
+      <a:schemeClr val="accent4">
+        <a:tint val="20000"/>
+      </a:schemeClr>
+    </dgm:fillClrLst>
+    <dgm:linClrLst meth="repeat">
+      <a:schemeClr val="lt1"/>
+    </dgm:linClrLst>
+    <dgm:effectClrLst/>
+    <dgm:txLinClrLst/>
+    <dgm:txFillClrLst meth="repeat">
+      <a:schemeClr val="lt1"/>
+    </dgm:txFillClrLst>
+    <dgm:txEffectClrLst/>
+  </dgm:styleLbl>
+  <dgm:styleLbl name="bgImgPlace1">
+    <dgm:fillClrLst>
+      <a:schemeClr val="accent4">
+        <a:tint val="50000"/>
+      </a:schemeClr>
+      <a:schemeClr val="accent4">
+        <a:tint val="20000"/>
+      </a:schemeClr>
+    </dgm:fillClrLst>
+    <dgm:linClrLst meth="repeat">
+      <a:schemeClr val="lt1"/>
+    </dgm:linClrLst>
+    <dgm:effectClrLst/>
+    <dgm:txLinClrLst/>
+    <dgm:txFillClrLst meth="repeat">
+      <a:schemeClr val="lt1"/>
+    </dgm:txFillClrLst>
+    <dgm:txEffectClrLst/>
+  </dgm:styleLbl>
+  <dgm:styleLbl name="sibTrans2D1">
+    <dgm:fillClrLst>
+      <a:schemeClr val="accent4">
+        <a:shade val="90000"/>
+      </a:schemeClr>
+      <a:schemeClr val="accent4">
+        <a:tint val="70000"/>
+      </a:schemeClr>
+    </dgm:fillClrLst>
+    <dgm:linClrLst>
+      <a:schemeClr val="accent4">
+        <a:shade val="90000"/>
+      </a:schemeClr>
+      <a:schemeClr val="accent4">
+        <a:tint val="70000"/>
+      </a:schemeClr>
+    </dgm:linClrLst>
+    <dgm:effectClrLst/>
+    <dgm:txLinClrLst/>
+    <dgm:txFillClrLst/>
+    <dgm:txEffectClrLst/>
+  </dgm:styleLbl>
+  <dgm:styleLbl name="fgSibTrans2D1">
+    <dgm:fillClrLst>
+      <a:schemeClr val="accent4">
+        <a:shade val="90000"/>
+      </a:schemeClr>
+      <a:schemeClr val="accent4">
+        <a:tint val="70000"/>
+      </a:schemeClr>
+    </dgm:fillClrLst>
+    <dgm:linClrLst>
+      <a:schemeClr val="accent4">
+        <a:shade val="90000"/>
+      </a:schemeClr>
+      <a:schemeClr val="accent4">
+        <a:tint val="70000"/>
+      </a:schemeClr>
+    </dgm:linClrLst>
+    <dgm:effectClrLst/>
+    <dgm:txLinClrLst/>
+    <dgm:txFillClrLst meth="repeat">
+      <a:schemeClr val="lt1"/>
+    </dgm:txFillClrLst>
+    <dgm:txEffectClrLst/>
+  </dgm:styleLbl>
+  <dgm:styleLbl name="bgSibTrans2D1">
+    <dgm:fillClrLst>
+      <a:schemeClr val="accent4">
+        <a:shade val="90000"/>
+      </a:schemeClr>
+      <a:schemeClr val="accent4">
+        <a:tint val="70000"/>
+      </a:schemeClr>
+    </dgm:fillClrLst>
+    <dgm:linClrLst>
+      <a:schemeClr val="accent4">
+        <a:shade val="90000"/>
+      </a:schemeClr>
+      <a:schemeClr val="accent4">
+        <a:tint val="70000"/>
+      </a:schemeClr>
+    </dgm:linClrLst>
+    <dgm:effectClrLst/>
+    <dgm:txLinClrLst/>
+    <dgm:txFillClrLst meth="repeat">
+      <a:schemeClr val="lt1"/>
+    </dgm:txFillClrLst>
+    <dgm:txEffectClrLst/>
+  </dgm:styleLbl>
+  <dgm:styleLbl name="sibTrans1D1">
+    <dgm:fillClrLst>
+      <a:schemeClr val="accent4">
+        <a:shade val="90000"/>
+      </a:schemeClr>
+      <a:schemeClr val="accent4">
+        <a:tint val="70000"/>
+      </a:schemeClr>
+    </dgm:fillClrLst>
+    <dgm:linClrLst>
+      <a:schemeClr val="accent4">
+        <a:shade val="90000"/>
+      </a:schemeClr>
+      <a:schemeClr val="accent4">
+        <a:tint val="70000"/>
+      </a:schemeClr>
+    </dgm:linClrLst>
+    <dgm:effectClrLst/>
+    <dgm:txLinClrLst/>
+    <dgm:txFillClrLst meth="repeat">
+      <a:schemeClr val="tx1"/>
+    </dgm:txFillClrLst>
+    <dgm:txEffectClrLst/>
+  </dgm:styleLbl>
+  <dgm:styleLbl name="callout">
+    <dgm:fillClrLst meth="repeat">
+      <a:schemeClr val="accent4"/>
+    </dgm:fillClrLst>
+    <dgm:linClrLst meth="repeat">
+      <a:schemeClr val="accent4"/>
+    </dgm:linClrLst>
+    <dgm:effectClrLst/>
+    <dgm:txLinClrLst/>
+    <dgm:txFillClrLst meth="repeat">
+      <a:schemeClr val="tx1"/>
+    </dgm:txFillClrLst>
+    <dgm:txEffectClrLst/>
+  </dgm:styleLbl>
+  <dgm:styleLbl name="asst0">
+    <dgm:fillClrLst meth="repeat">
+      <a:schemeClr val="accent4">
+        <a:shade val="80000"/>
+      </a:schemeClr>
+    </dgm:fillClrLst>
+    <dgm:linClrLst meth="repeat">
+      <a:schemeClr val="lt1"/>
+    </dgm:linClrLst>
+    <dgm:effectClrLst/>
+    <dgm:txLinClrLst/>
+    <dgm:txFillClrLst/>
+    <dgm:txEffectClrLst/>
+  </dgm:styleLbl>
+  <dgm:styleLbl name="asst1">
+    <dgm:fillClrLst meth="repeat">
+      <a:schemeClr val="accent4">
+        <a:shade val="80000"/>
+      </a:schemeClr>
+    </dgm:fillClrLst>
+    <dgm:linClrLst meth="repeat">
+      <a:schemeClr val="lt1"/>
+    </dgm:linClrLst>
+    <dgm:effectClrLst/>
+    <dgm:txLinClrLst/>
+    <dgm:txFillClrLst/>
+    <dgm:txEffectClrLst/>
+  </dgm:styleLbl>
+  <dgm:styleLbl name="asst2">
+    <dgm:fillClrLst>
+      <a:schemeClr val="accent4">
+        <a:tint val="99000"/>
+      </a:schemeClr>
+    </dgm:fillClrLst>
+    <dgm:linClrLst meth="repeat">
+      <a:schemeClr val="lt1"/>
+    </dgm:linClrLst>
+    <dgm:effectClrLst/>
+    <dgm:txLinClrLst/>
+    <dgm:txFillClrLst/>
+    <dgm:txEffectClrLst/>
+  </dgm:styleLbl>
+  <dgm:styleLbl name="asst3">
+    <dgm:fillClrLst>
+      <a:schemeClr val="accent4">
+        <a:tint val="80000"/>
+      </a:schemeClr>
+    </dgm:fillClrLst>
+    <dgm:linClrLst meth="repeat">
+      <a:schemeClr val="lt1"/>
+    </dgm:linClrLst>
+    <dgm:effectClrLst/>
+    <dgm:txLinClrLst/>
+    <dgm:txFillClrLst/>
+    <dgm:txEffectClrLst/>
+  </dgm:styleLbl>
+  <dgm:styleLbl name="asst4">
+    <dgm:fillClrLst>
+      <a:schemeClr val="accent4">
+        <a:tint val="70000"/>
+      </a:schemeClr>
+    </dgm:fillClrLst>
+    <dgm:linClrLst meth="repeat">
+      <a:schemeClr val="lt1"/>
+    </dgm:linClrLst>
+    <dgm:effectClrLst/>
+    <dgm:txLinClrLst/>
+    <dgm:txFillClrLst/>
+    <dgm:txEffectClrLst/>
+  </dgm:styleLbl>
+  <dgm:styleLbl name="parChTrans2D1">
+    <dgm:fillClrLst meth="repeat">
+      <a:schemeClr val="accent4">
+        <a:tint val="60000"/>
+      </a:schemeClr>
+    </dgm:fillClrLst>
+    <dgm:linClrLst meth="repeat">
+      <a:schemeClr val="accent4">
+        <a:tint val="60000"/>
+      </a:schemeClr>
+    </dgm:linClrLst>
+    <dgm:effectClrLst/>
+    <dgm:txLinClrLst/>
+    <dgm:txFillClrLst meth="repeat">
+      <a:schemeClr val="lt1"/>
+    </dgm:txFillClrLst>
+    <dgm:txEffectClrLst/>
+  </dgm:styleLbl>
+  <dgm:styleLbl name="parChTrans2D2">
+    <dgm:fillClrLst meth="repeat">
+      <a:schemeClr val="accent4">
+        <a:tint val="90000"/>
+      </a:schemeClr>
+    </dgm:fillClrLst>
+    <dgm:linClrLst meth="repeat">
+      <a:schemeClr val="accent4">
+        <a:tint val="90000"/>
+      </a:schemeClr>
+    </dgm:linClrLst>
+    <dgm:effectClrLst/>
+    <dgm:txLinClrLst/>
+    <dgm:txFillClrLst/>
+    <dgm:txEffectClrLst/>
+  </dgm:styleLbl>
+  <dgm:styleLbl name="parChTrans2D3">
+    <dgm:fillClrLst meth="repeat">
+      <a:schemeClr val="accent4">
+        <a:tint val="70000"/>
+      </a:schemeClr>
+    </dgm:fillClrLst>
+    <dgm:linClrLst meth="repeat">
+      <a:schemeClr val="accent4">
+        <a:tint val="70000"/>
+      </a:schemeClr>
+    </dgm:linClrLst>
+    <dgm:effectClrLst/>
+    <dgm:txLinClrLst/>
+    <dgm:txFillClrLst/>
+    <dgm:txEffectClrLst/>
+  </dgm:styleLbl>
+  <dgm:styleLbl name="parChTrans2D4">
+    <dgm:fillClrLst meth="repeat">
+      <a:schemeClr val="accent4">
+        <a:tint val="50000"/>
+      </a:schemeClr>
+    </dgm:fillClrLst>
+    <dgm:linClrLst meth="repeat">
+      <a:schemeClr val="accent4">
+        <a:tint val="50000"/>
+      </a:schemeClr>
+    </dgm:linClrLst>
+    <dgm:effectClrLst/>
+    <dgm:txLinClrLst/>
+    <dgm:txFillClrLst meth="repeat">
+      <a:schemeClr val="lt1"/>
+    </dgm:txFillClrLst>
+    <dgm:txEffectClrLst/>
+  </dgm:styleLbl>
+  <dgm:styleLbl name="parChTrans1D1">
+    <dgm:fillClrLst meth="repeat">
+      <a:schemeClr val="accent4">
+        <a:shade val="80000"/>
+      </a:schemeClr>
+    </dgm:fillClrLst>
+    <dgm:linClrLst meth="repeat">
+      <a:schemeClr val="accent4">
+        <a:shade val="80000"/>
+      </a:schemeClr>
+    </dgm:linClrLst>
+    <dgm:effectClrLst/>
+    <dgm:txLinClrLst/>
+    <dgm:txFillClrLst meth="repeat">
+      <a:schemeClr val="tx1"/>
+    </dgm:txFillClrLst>
+    <dgm:txEffectClrLst/>
+  </dgm:styleLbl>
+  <dgm:styleLbl name="parChTrans1D2">
+    <dgm:fillClrLst meth="repeat">
+      <a:schemeClr val="accent4">
+        <a:tint val="99000"/>
+      </a:schemeClr>
+    </dgm:fillClrLst>
+    <dgm:linClrLst meth="repeat">
+      <a:schemeClr val="accent4">
+        <a:tint val="99000"/>
+      </a:schemeClr>
+    </dgm:linClrLst>
+    <dgm:effectClrLst/>
+    <dgm:txLinClrLst/>
+    <dgm:txFillClrLst meth="repeat">
+      <a:schemeClr val="tx1"/>
+    </dgm:txFillClrLst>
+    <dgm:txEffectClrLst/>
+  </dgm:styleLbl>
+  <dgm:styleLbl name="parChTrans1D3">
+    <dgm:fillClrLst meth="repeat">
+      <a:schemeClr val="accent4">
+        <a:tint val="80000"/>
+      </a:schemeClr>
+    </dgm:fillClrLst>
+    <dgm:linClrLst meth="repeat">
+      <a:schemeClr val="accent4">
+        <a:tint val="80000"/>
+      </a:schemeClr>
+    </dgm:linClrLst>
+    <dgm:effectClrLst/>
+    <dgm:txLinClrLst/>
+    <dgm:txFillClrLst meth="repeat">
+      <a:schemeClr val="tx1"/>
+    </dgm:txFillClrLst>
+    <dgm:txEffectClrLst/>
+  </dgm:styleLbl>
+  <dgm:styleLbl name="parChTrans1D4">
+    <dgm:fillClrLst meth="repeat">
+      <a:schemeClr val="accent4">
+        <a:tint val="70000"/>
+      </a:schemeClr>
+    </dgm:fillClrLst>
+    <dgm:linClrLst meth="repeat">
+      <a:schemeClr val="accent4">
+        <a:tint val="70000"/>
+      </a:schemeClr>
+    </dgm:linClrLst>
+    <dgm:effectClrLst/>
+    <dgm:txLinClrLst/>
+    <dgm:txFillClrLst meth="repeat">
+      <a:schemeClr val="tx1"/>
+    </dgm:txFillClrLst>
+    <dgm:txEffectClrLst/>
+  </dgm:styleLbl>
+  <dgm:styleLbl name="fgAcc1">
+    <dgm:fillClrLst meth="repeat">
+      <a:schemeClr val="lt1">
+        <a:alpha val="90000"/>
+      </a:schemeClr>
+    </dgm:fillClrLst>
+    <dgm:linClrLst>
+      <a:schemeClr val="accent4">
+        <a:shade val="80000"/>
+      </a:schemeClr>
+      <a:schemeClr val="accent4">
+        <a:tint val="70000"/>
+      </a:schemeClr>
+    </dgm:linClrLst>
+    <dgm:effectClrLst/>
+    <dgm:txLinClrLst/>
+    <dgm:txFillClrLst meth="repeat">
+      <a:schemeClr val="dk1"/>
+    </dgm:txFillClrLst>
+    <dgm:txEffectClrLst/>
+  </dgm:styleLbl>
+  <dgm:styleLbl name="conFgAcc1">
+    <dgm:fillClrLst meth="repeat">
+      <a:schemeClr val="lt1">
+        <a:alpha val="90000"/>
+      </a:schemeClr>
+    </dgm:fillClrLst>
+    <dgm:linClrLst>
+      <a:schemeClr val="accent4">
+        <a:shade val="80000"/>
+      </a:schemeClr>
+      <a:schemeClr val="accent4">
+        <a:tint val="70000"/>
+      </a:schemeClr>
+    </dgm:linClrLst>
+    <dgm:effectClrLst/>
+    <dgm:txLinClrLst/>
+    <dgm:txFillClrLst meth="repeat">
+      <a:schemeClr val="dk1"/>
+    </dgm:txFillClrLst>
+    <dgm:txEffectClrLst/>
+  </dgm:styleLbl>
+  <dgm:styleLbl name="alignAcc1">
+    <dgm:fillClrLst meth="repeat">
+      <a:schemeClr val="lt1">
+        <a:alpha val="90000"/>
+      </a:schemeClr>
+    </dgm:fillClrLst>
+    <dgm:linClrLst>
+      <a:schemeClr val="accent4">
+        <a:shade val="80000"/>
+      </a:schemeClr>
+      <a:schemeClr val="accent4">
+        <a:tint val="70000"/>
+      </a:schemeClr>
+    </dgm:linClrLst>
+    <dgm:effectClrLst/>
+    <dgm:txLinClrLst/>
+    <dgm:txFillClrLst meth="repeat">
+      <a:schemeClr val="dk1"/>
+    </dgm:txFillClrLst>
+    <dgm:txEffectClrLst/>
+  </dgm:styleLbl>
+  <dgm:styleLbl name="trAlignAcc1">
+    <dgm:fillClrLst meth="repeat">
+      <a:schemeClr val="lt1">
+        <a:alpha val="40000"/>
+      </a:schemeClr>
+    </dgm:fillClrLst>
+    <dgm:linClrLst meth="repeat">
+      <a:schemeClr val="accent4"/>
+    </dgm:linClrLst>
+    <dgm:effectClrLst/>
+    <dgm:txLinClrLst/>
+    <dgm:txFillClrLst meth="repeat">
+      <a:schemeClr val="dk1"/>
+    </dgm:txFillClrLst>
+    <dgm:txEffectClrLst/>
+  </dgm:styleLbl>
+  <dgm:styleLbl name="bgAcc1">
+    <dgm:fillClrLst meth="repeat">
+      <a:schemeClr val="lt1">
+        <a:alpha val="90000"/>
+      </a:schemeClr>
+    </dgm:fillClrLst>
+    <dgm:linClrLst>
+      <a:schemeClr val="accent4">
+        <a:shade val="80000"/>
+      </a:schemeClr>
+      <a:schemeClr val="accent4">
+        <a:tint val="70000"/>
+      </a:schemeClr>
+    </dgm:linClrLst>
+    <dgm:effectClrLst/>
+    <dgm:txLinClrLst/>
+    <dgm:txFillClrLst meth="repeat">
+      <a:schemeClr val="dk1"/>
+    </dgm:txFillClrLst>
+    <dgm:txEffectClrLst/>
+  </dgm:styleLbl>
+  <dgm:styleLbl name="solidFgAcc1">
+    <dgm:fillClrLst meth="repeat">
+      <a:schemeClr val="lt1"/>
+    </dgm:fillClrLst>
+    <dgm:linClrLst>
+      <a:schemeClr val="accent4">
+        <a:shade val="80000"/>
+      </a:schemeClr>
+      <a:schemeClr val="accent4">
+        <a:tint val="70000"/>
+      </a:schemeClr>
+    </dgm:linClrLst>
+    <dgm:effectClrLst/>
+    <dgm:txLinClrLst/>
+    <dgm:txFillClrLst meth="repeat">
+      <a:schemeClr val="dk1"/>
+    </dgm:txFillClrLst>
+    <dgm:txEffectClrLst/>
+  </dgm:styleLbl>
+  <dgm:styleLbl name="solidAlignAcc1">
+    <dgm:fillClrLst meth="repeat">
+      <a:schemeClr val="lt1"/>
+    </dgm:fillClrLst>
+    <dgm:linClrLst meth="repeat">
+      <a:schemeClr val="accent4"/>
+    </dgm:linClrLst>
+    <dgm:effectClrLst/>
+    <dgm:txLinClrLst/>
+    <dgm:txFillClrLst meth="repeat">
+      <a:schemeClr val="dk1"/>
+    </dgm:txFillClrLst>
+    <dgm:txEffectClrLst/>
+  </dgm:styleLbl>
+  <dgm:styleLbl name="solidBgAcc1">
+    <dgm:fillClrLst meth="repeat">
+      <a:schemeClr val="lt1"/>
+    </dgm:fillClrLst>
+    <dgm:linClrLst meth="repeat">
+      <a:schemeClr val="accent4"/>
+    </dgm:linClrLst>
+    <dgm:effectClrLst/>
+    <dgm:txLinClrLst/>
+    <dgm:txFillClrLst meth="repeat">
+      <a:schemeClr val="dk1"/>
+    </dgm:txFillClrLst>
+    <dgm:txEffectClrLst/>
+  </dgm:styleLbl>
+  <dgm:styleLbl name="fgAccFollowNode1">
+    <dgm:fillClrLst meth="repeat">
+      <a:schemeClr val="accent4">
+        <a:alpha val="90000"/>
+        <a:tint val="40000"/>
+      </a:schemeClr>
+    </dgm:fillClrLst>
+    <dgm:linClrLst meth="repeat">
+      <a:schemeClr val="accent4">
+        <a:alpha val="90000"/>
+        <a:tint val="40000"/>
+      </a:schemeClr>
+    </dgm:linClrLst>
+    <dgm:effectClrLst/>
+    <dgm:txLinClrLst/>
+    <dgm:txFillClrLst meth="repeat">
+      <a:schemeClr val="dk1"/>
+    </dgm:txFillClrLst>
+    <dgm:txEffectClrLst/>
+  </dgm:styleLbl>
+  <dgm:styleLbl name="alignAccFollowNode1">
+    <dgm:fillClrLst meth="repeat">
+      <a:schemeClr val="accent4">
+        <a:alpha val="90000"/>
+        <a:tint val="40000"/>
+      </a:schemeClr>
+    </dgm:fillClrLst>
+    <dgm:linClrLst meth="repeat">
+      <a:schemeClr val="accent4">
+        <a:alpha val="90000"/>
+        <a:tint val="40000"/>
+      </a:schemeClr>
+    </dgm:linClrLst>
+    <dgm:effectClrLst/>
+    <dgm:txLinClrLst/>
+    <dgm:txFillClrLst meth="repeat">
+      <a:schemeClr val="dk1"/>
+    </dgm:txFillClrLst>
+    <dgm:txEffectClrLst/>
+  </dgm:styleLbl>
+  <dgm:styleLbl name="bgAccFollowNode1">
+    <dgm:fillClrLst meth="repeat">
+      <a:schemeClr val="accent4">
+        <a:alpha val="90000"/>
+        <a:tint val="40000"/>
+      </a:schemeClr>
+    </dgm:fillClrLst>
+    <dgm:linClrLst meth="repeat">
+      <a:schemeClr val="lt1"/>
+    </dgm:linClrLst>
+    <dgm:effectClrLst/>
+    <dgm:txLinClrLst/>
+    <dgm:txFillClrLst meth="repeat">
+      <a:schemeClr val="dk1"/>
+    </dgm:txFillClrLst>
+    <dgm:txEffectClrLst/>
+  </dgm:styleLbl>
+  <dgm:styleLbl name="fgAcc0">
+    <dgm:fillClrLst meth="repeat">
+      <a:schemeClr val="lt1">
+        <a:alpha val="90000"/>
+      </a:schemeClr>
+    </dgm:fillClrLst>
+    <dgm:linClrLst meth="repeat">
+      <a:schemeClr val="accent4">
+        <a:shade val="80000"/>
+      </a:schemeClr>
+    </dgm:linClrLst>
+    <dgm:effectClrLst/>
+    <dgm:txLinClrLst/>
+    <dgm:txFillClrLst meth="repeat">
+      <a:schemeClr val="dk1"/>
+    </dgm:txFillClrLst>
+    <dgm:txEffectClrLst/>
+  </dgm:styleLbl>
+  <dgm:styleLbl name="fgAcc2">
+    <dgm:fillClrLst meth="repeat">
+      <a:schemeClr val="lt1">
+        <a:alpha val="90000"/>
+      </a:schemeClr>
+    </dgm:fillClrLst>
+    <dgm:linClrLst meth="repeat">
+      <a:schemeClr val="accent4">
+        <a:tint val="99000"/>
+      </a:schemeClr>
+    </dgm:linClrLst>
+    <dgm:effectClrLst/>
+    <dgm:txLinClrLst/>
+    <dgm:txFillClrLst meth="repeat">
+      <a:schemeClr val="dk1"/>
+    </dgm:txFillClrLst>
+    <dgm:txEffectClrLst/>
+  </dgm:styleLbl>
+  <dgm:styleLbl name="fgAcc3">
+    <dgm:fillClrLst meth="repeat">
+      <a:schemeClr val="lt1">
+        <a:alpha val="90000"/>
+      </a:schemeClr>
+    </dgm:fillClrLst>
+    <dgm:linClrLst meth="repeat">
+      <a:schemeClr val="accent4">
+        <a:tint val="80000"/>
+      </a:schemeClr>
+    </dgm:linClrLst>
+    <dgm:effectClrLst/>
+    <dgm:txLinClrLst/>
+    <dgm:txFillClrLst meth="repeat">
+      <a:schemeClr val="dk1"/>
+    </dgm:txFillClrLst>
+    <dgm:txEffectClrLst/>
+  </dgm:styleLbl>
+  <dgm:styleLbl name="fgAcc4">
+    <dgm:fillClrLst meth="repeat">
+      <a:schemeClr val="lt1">
+        <a:alpha val="90000"/>
+      </a:schemeClr>
+    </dgm:fillClrLst>
+    <dgm:linClrLst meth="repeat">
+      <a:schemeClr val="accent4">
+        <a:tint val="70000"/>
+      </a:schemeClr>
     </dgm:linClrLst>
     <dgm:effectClrLst/>
     <dgm:txLinClrLst/>
@@ -6708,6 +7585,293 @@
   <dgm:extLst>
     <a:ext uri="http://schemas.microsoft.com/office/drawing/2008/diagram">
       <dsp:dataModelExt xmlns:dsp="http://schemas.microsoft.com/office/drawing/2008/diagram" relId="rId6" minVer="http://schemas.openxmlformats.org/drawingml/2006/diagram"/>
+    </a:ext>
+  </dgm:extLst>
+</dgm:dataModel>
+</file>
+
+<file path=ppt/diagrams/data6.xml><?xml version="1.0" encoding="utf-8"?>
+<dgm:dataModel xmlns:dgm="http://schemas.openxmlformats.org/drawingml/2006/diagram" xmlns:a="http://schemas.openxmlformats.org/drawingml/2006/main">
+  <dgm:ptLst>
+    <dgm:pt modelId="{3ACBB890-112A-1946-875C-304B77F16841}" type="doc">
+      <dgm:prSet loTypeId="urn:microsoft.com/office/officeart/2005/8/layout/cycle1" loCatId="" qsTypeId="urn:microsoft.com/office/officeart/2005/8/quickstyle/simple1" qsCatId="simple" csTypeId="urn:microsoft.com/office/officeart/2005/8/colors/accent4_3" csCatId="accent4" phldr="1"/>
+      <dgm:spPr/>
+      <dgm:t>
+        <a:bodyPr/>
+        <a:lstStyle/>
+        <a:p>
+          <a:endParaRPr lang="en-US"/>
+        </a:p>
+      </dgm:t>
+    </dgm:pt>
+    <dgm:pt modelId="{35564A14-6D30-F046-8F0A-1318CE31C1DD}">
+      <dgm:prSet phldrT="[Text]"/>
+      <dgm:spPr/>
+      <dgm:t>
+        <a:bodyPr/>
+        <a:lstStyle/>
+        <a:p>
+          <a:r>
+            <a:rPr lang="en-US" b="1" dirty="0" smtClean="0">
+              <a:solidFill>
+                <a:srgbClr val="FFFFFF"/>
+              </a:solidFill>
+            </a:rPr>
+            <a:t>MEASURE</a:t>
+          </a:r>
+          <a:endParaRPr lang="en-US" b="1" dirty="0">
+            <a:solidFill>
+              <a:srgbClr val="FFFFFF"/>
+            </a:solidFill>
+          </a:endParaRPr>
+        </a:p>
+      </dgm:t>
+    </dgm:pt>
+    <dgm:pt modelId="{D732258C-8815-E543-9E45-AE3B895B731F}" type="parTrans" cxnId="{B5F416E1-DA8A-9A41-B801-E951D2F1B1F1}">
+      <dgm:prSet/>
+      <dgm:spPr/>
+      <dgm:t>
+        <a:bodyPr/>
+        <a:lstStyle/>
+        <a:p>
+          <a:endParaRPr lang="en-US">
+            <a:solidFill>
+              <a:schemeClr val="tx1">
+                <a:lumMod val="65000"/>
+                <a:lumOff val="35000"/>
+              </a:schemeClr>
+            </a:solidFill>
+          </a:endParaRPr>
+        </a:p>
+      </dgm:t>
+    </dgm:pt>
+    <dgm:pt modelId="{F2E563A8-1EC9-DE40-B187-CDE44946A42C}" type="sibTrans" cxnId="{B5F416E1-DA8A-9A41-B801-E951D2F1B1F1}">
+      <dgm:prSet/>
+      <dgm:spPr/>
+      <dgm:t>
+        <a:bodyPr/>
+        <a:lstStyle/>
+        <a:p>
+          <a:endParaRPr lang="en-US">
+            <a:solidFill>
+              <a:schemeClr val="tx1">
+                <a:lumMod val="65000"/>
+                <a:lumOff val="35000"/>
+              </a:schemeClr>
+            </a:solidFill>
+          </a:endParaRPr>
+        </a:p>
+      </dgm:t>
+    </dgm:pt>
+    <dgm:pt modelId="{DB385D71-D4D3-584F-B668-C79275E971C1}">
+      <dgm:prSet phldrT="[Text]"/>
+      <dgm:spPr/>
+      <dgm:t>
+        <a:bodyPr/>
+        <a:lstStyle/>
+        <a:p>
+          <a:r>
+            <a:rPr lang="en-US" b="1" dirty="0" smtClean="0">
+              <a:solidFill>
+                <a:srgbClr val="FFFFFF"/>
+              </a:solidFill>
+            </a:rPr>
+            <a:t>LEARN</a:t>
+          </a:r>
+          <a:endParaRPr lang="en-US" b="1" dirty="0">
+            <a:solidFill>
+              <a:srgbClr val="FFFFFF"/>
+            </a:solidFill>
+          </a:endParaRPr>
+        </a:p>
+      </dgm:t>
+    </dgm:pt>
+    <dgm:pt modelId="{FC723EE2-7057-704C-9893-CF9D9DCC71F8}" type="parTrans" cxnId="{7484310E-1BB0-AB43-8809-B58AF63BE05E}">
+      <dgm:prSet/>
+      <dgm:spPr/>
+      <dgm:t>
+        <a:bodyPr/>
+        <a:lstStyle/>
+        <a:p>
+          <a:endParaRPr lang="en-US">
+            <a:solidFill>
+              <a:schemeClr val="tx1">
+                <a:lumMod val="65000"/>
+                <a:lumOff val="35000"/>
+              </a:schemeClr>
+            </a:solidFill>
+          </a:endParaRPr>
+        </a:p>
+      </dgm:t>
+    </dgm:pt>
+    <dgm:pt modelId="{00B5D06C-9CF0-4742-8768-01DFFFF2B9B7}" type="sibTrans" cxnId="{7484310E-1BB0-AB43-8809-B58AF63BE05E}">
+      <dgm:prSet/>
+      <dgm:spPr/>
+      <dgm:t>
+        <a:bodyPr/>
+        <a:lstStyle/>
+        <a:p>
+          <a:endParaRPr lang="en-US">
+            <a:solidFill>
+              <a:schemeClr val="tx1">
+                <a:lumMod val="65000"/>
+                <a:lumOff val="35000"/>
+              </a:schemeClr>
+            </a:solidFill>
+          </a:endParaRPr>
+        </a:p>
+      </dgm:t>
+    </dgm:pt>
+    <dgm:pt modelId="{09ED0006-B489-3C4E-A9EC-012A77DBEE3D}">
+      <dgm:prSet phldrT="[Text]"/>
+      <dgm:spPr/>
+      <dgm:t>
+        <a:bodyPr/>
+        <a:lstStyle/>
+        <a:p>
+          <a:r>
+            <a:rPr lang="en-US" b="1" dirty="0" smtClean="0">
+              <a:solidFill>
+                <a:schemeClr val="bg1"/>
+              </a:solidFill>
+            </a:rPr>
+            <a:t>BUILD</a:t>
+          </a:r>
+          <a:endParaRPr lang="en-US" b="1" dirty="0">
+            <a:solidFill>
+              <a:schemeClr val="bg1"/>
+            </a:solidFill>
+          </a:endParaRPr>
+        </a:p>
+      </dgm:t>
+    </dgm:pt>
+    <dgm:pt modelId="{EDAD3851-684D-2A4C-9877-96E2CF2DFBF1}" type="parTrans" cxnId="{A945DF87-1ABF-C344-BAF1-7EB1A998645C}">
+      <dgm:prSet/>
+      <dgm:spPr/>
+      <dgm:t>
+        <a:bodyPr/>
+        <a:lstStyle/>
+        <a:p>
+          <a:endParaRPr lang="en-US">
+            <a:solidFill>
+              <a:schemeClr val="tx1">
+                <a:lumMod val="65000"/>
+                <a:lumOff val="35000"/>
+              </a:schemeClr>
+            </a:solidFill>
+          </a:endParaRPr>
+        </a:p>
+      </dgm:t>
+    </dgm:pt>
+    <dgm:pt modelId="{5C874E09-088B-0F40-83AA-4693B9D21EFD}" type="sibTrans" cxnId="{A945DF87-1ABF-C344-BAF1-7EB1A998645C}">
+      <dgm:prSet/>
+      <dgm:spPr/>
+      <dgm:t>
+        <a:bodyPr/>
+        <a:lstStyle/>
+        <a:p>
+          <a:endParaRPr lang="en-US">
+            <a:solidFill>
+              <a:schemeClr val="tx1">
+                <a:lumMod val="65000"/>
+                <a:lumOff val="35000"/>
+              </a:schemeClr>
+            </a:solidFill>
+          </a:endParaRPr>
+        </a:p>
+      </dgm:t>
+    </dgm:pt>
+    <dgm:pt modelId="{95C65290-8CB0-5D41-96AE-300ED5E15A72}" type="pres">
+      <dgm:prSet presAssocID="{3ACBB890-112A-1946-875C-304B77F16841}" presName="cycle" presStyleCnt="0">
+        <dgm:presLayoutVars>
+          <dgm:dir/>
+          <dgm:resizeHandles val="exact"/>
+        </dgm:presLayoutVars>
+      </dgm:prSet>
+      <dgm:spPr/>
+    </dgm:pt>
+    <dgm:pt modelId="{E3404703-2A99-A748-A864-CE1935C7752C}" type="pres">
+      <dgm:prSet presAssocID="{35564A14-6D30-F046-8F0A-1318CE31C1DD}" presName="dummy" presStyleCnt="0"/>
+      <dgm:spPr/>
+    </dgm:pt>
+    <dgm:pt modelId="{D6966C6E-6FE5-FF48-BD3C-AA351AC49CDD}" type="pres">
+      <dgm:prSet presAssocID="{35564A14-6D30-F046-8F0A-1318CE31C1DD}" presName="node" presStyleLbl="revTx" presStyleIdx="0" presStyleCnt="3">
+        <dgm:presLayoutVars>
+          <dgm:bulletEnabled val="1"/>
+        </dgm:presLayoutVars>
+      </dgm:prSet>
+      <dgm:spPr/>
+      <dgm:t>
+        <a:bodyPr/>
+        <a:lstStyle/>
+        <a:p>
+          <a:endParaRPr lang="en-US"/>
+        </a:p>
+      </dgm:t>
+    </dgm:pt>
+    <dgm:pt modelId="{DC7F634A-1079-7E46-9F91-4D18AF73BAC8}" type="pres">
+      <dgm:prSet presAssocID="{F2E563A8-1EC9-DE40-B187-CDE44946A42C}" presName="sibTrans" presStyleLbl="node1" presStyleIdx="0" presStyleCnt="3"/>
+      <dgm:spPr/>
+    </dgm:pt>
+    <dgm:pt modelId="{D8EADE95-0308-AF45-AF0F-2443C0541C85}" type="pres">
+      <dgm:prSet presAssocID="{DB385D71-D4D3-584F-B668-C79275E971C1}" presName="dummy" presStyleCnt="0"/>
+      <dgm:spPr/>
+    </dgm:pt>
+    <dgm:pt modelId="{53F3BD7A-07F5-004E-90ED-F19D5C54347F}" type="pres">
+      <dgm:prSet presAssocID="{DB385D71-D4D3-584F-B668-C79275E971C1}" presName="node" presStyleLbl="revTx" presStyleIdx="1" presStyleCnt="3">
+        <dgm:presLayoutVars>
+          <dgm:bulletEnabled val="1"/>
+        </dgm:presLayoutVars>
+      </dgm:prSet>
+      <dgm:spPr/>
+    </dgm:pt>
+    <dgm:pt modelId="{B9DDC635-4E84-3B43-94D0-C50831EFB09C}" type="pres">
+      <dgm:prSet presAssocID="{00B5D06C-9CF0-4742-8768-01DFFFF2B9B7}" presName="sibTrans" presStyleLbl="node1" presStyleIdx="1" presStyleCnt="3"/>
+      <dgm:spPr/>
+    </dgm:pt>
+    <dgm:pt modelId="{363FB918-B447-7F45-A74E-9AF95C666CAE}" type="pres">
+      <dgm:prSet presAssocID="{09ED0006-B489-3C4E-A9EC-012A77DBEE3D}" presName="dummy" presStyleCnt="0"/>
+      <dgm:spPr/>
+    </dgm:pt>
+    <dgm:pt modelId="{FDE9CFD6-51DF-9646-8569-73EA80EBC8CD}" type="pres">
+      <dgm:prSet presAssocID="{09ED0006-B489-3C4E-A9EC-012A77DBEE3D}" presName="node" presStyleLbl="revTx" presStyleIdx="2" presStyleCnt="3">
+        <dgm:presLayoutVars>
+          <dgm:bulletEnabled val="1"/>
+        </dgm:presLayoutVars>
+      </dgm:prSet>
+      <dgm:spPr/>
+    </dgm:pt>
+    <dgm:pt modelId="{BC14C308-8ECD-EC4D-864E-6FDA7864A72C}" type="pres">
+      <dgm:prSet presAssocID="{5C874E09-088B-0F40-83AA-4693B9D21EFD}" presName="sibTrans" presStyleLbl="node1" presStyleIdx="2" presStyleCnt="3"/>
+      <dgm:spPr/>
+    </dgm:pt>
+  </dgm:ptLst>
+  <dgm:cxnLst>
+    <dgm:cxn modelId="{82053627-A537-B344-A6E4-8AB488941F0F}" type="presOf" srcId="{F2E563A8-1EC9-DE40-B187-CDE44946A42C}" destId="{DC7F634A-1079-7E46-9F91-4D18AF73BAC8}" srcOrd="0" destOrd="0" presId="urn:microsoft.com/office/officeart/2005/8/layout/cycle1"/>
+    <dgm:cxn modelId="{B5F416E1-DA8A-9A41-B801-E951D2F1B1F1}" srcId="{3ACBB890-112A-1946-875C-304B77F16841}" destId="{35564A14-6D30-F046-8F0A-1318CE31C1DD}" srcOrd="0" destOrd="0" parTransId="{D732258C-8815-E543-9E45-AE3B895B731F}" sibTransId="{F2E563A8-1EC9-DE40-B187-CDE44946A42C}"/>
+    <dgm:cxn modelId="{A945DF87-1ABF-C344-BAF1-7EB1A998645C}" srcId="{3ACBB890-112A-1946-875C-304B77F16841}" destId="{09ED0006-B489-3C4E-A9EC-012A77DBEE3D}" srcOrd="2" destOrd="0" parTransId="{EDAD3851-684D-2A4C-9877-96E2CF2DFBF1}" sibTransId="{5C874E09-088B-0F40-83AA-4693B9D21EFD}"/>
+    <dgm:cxn modelId="{F82BF3CF-3CCD-CE49-8247-F3787D3B6966}" type="presOf" srcId="{5C874E09-088B-0F40-83AA-4693B9D21EFD}" destId="{BC14C308-8ECD-EC4D-864E-6FDA7864A72C}" srcOrd="0" destOrd="0" presId="urn:microsoft.com/office/officeart/2005/8/layout/cycle1"/>
+    <dgm:cxn modelId="{201EFC56-F922-CD49-A426-311FBBCBE670}" type="presOf" srcId="{DB385D71-D4D3-584F-B668-C79275E971C1}" destId="{53F3BD7A-07F5-004E-90ED-F19D5C54347F}" srcOrd="0" destOrd="0" presId="urn:microsoft.com/office/officeart/2005/8/layout/cycle1"/>
+    <dgm:cxn modelId="{6DD7877C-1763-2B42-AAD8-36C38E448299}" type="presOf" srcId="{00B5D06C-9CF0-4742-8768-01DFFFF2B9B7}" destId="{B9DDC635-4E84-3B43-94D0-C50831EFB09C}" srcOrd="0" destOrd="0" presId="urn:microsoft.com/office/officeart/2005/8/layout/cycle1"/>
+    <dgm:cxn modelId="{33B4C508-AA3C-9649-A684-1915870B21F2}" type="presOf" srcId="{3ACBB890-112A-1946-875C-304B77F16841}" destId="{95C65290-8CB0-5D41-96AE-300ED5E15A72}" srcOrd="0" destOrd="0" presId="urn:microsoft.com/office/officeart/2005/8/layout/cycle1"/>
+    <dgm:cxn modelId="{30A2FD67-3F36-0F4F-8AD8-67AB11A2FDF0}" type="presOf" srcId="{35564A14-6D30-F046-8F0A-1318CE31C1DD}" destId="{D6966C6E-6FE5-FF48-BD3C-AA351AC49CDD}" srcOrd="0" destOrd="0" presId="urn:microsoft.com/office/officeart/2005/8/layout/cycle1"/>
+    <dgm:cxn modelId="{7484310E-1BB0-AB43-8809-B58AF63BE05E}" srcId="{3ACBB890-112A-1946-875C-304B77F16841}" destId="{DB385D71-D4D3-584F-B668-C79275E971C1}" srcOrd="1" destOrd="0" parTransId="{FC723EE2-7057-704C-9893-CF9D9DCC71F8}" sibTransId="{00B5D06C-9CF0-4742-8768-01DFFFF2B9B7}"/>
+    <dgm:cxn modelId="{C41DABB6-46CE-EC4B-A2FE-6CEF76E1F981}" type="presOf" srcId="{09ED0006-B489-3C4E-A9EC-012A77DBEE3D}" destId="{FDE9CFD6-51DF-9646-8569-73EA80EBC8CD}" srcOrd="0" destOrd="0" presId="urn:microsoft.com/office/officeart/2005/8/layout/cycle1"/>
+    <dgm:cxn modelId="{21E50C74-C9FF-2F47-8572-4A27CD5A1227}" type="presParOf" srcId="{95C65290-8CB0-5D41-96AE-300ED5E15A72}" destId="{E3404703-2A99-A748-A864-CE1935C7752C}" srcOrd="0" destOrd="0" presId="urn:microsoft.com/office/officeart/2005/8/layout/cycle1"/>
+    <dgm:cxn modelId="{4ADE92F4-46D3-9249-8245-4CFA165EA096}" type="presParOf" srcId="{95C65290-8CB0-5D41-96AE-300ED5E15A72}" destId="{D6966C6E-6FE5-FF48-BD3C-AA351AC49CDD}" srcOrd="1" destOrd="0" presId="urn:microsoft.com/office/officeart/2005/8/layout/cycle1"/>
+    <dgm:cxn modelId="{AD72D65A-6485-0A47-B6B3-C98974EA8540}" type="presParOf" srcId="{95C65290-8CB0-5D41-96AE-300ED5E15A72}" destId="{DC7F634A-1079-7E46-9F91-4D18AF73BAC8}" srcOrd="2" destOrd="0" presId="urn:microsoft.com/office/officeart/2005/8/layout/cycle1"/>
+    <dgm:cxn modelId="{038E1FDE-A168-E74C-83CD-7AE4C6F93B7F}" type="presParOf" srcId="{95C65290-8CB0-5D41-96AE-300ED5E15A72}" destId="{D8EADE95-0308-AF45-AF0F-2443C0541C85}" srcOrd="3" destOrd="0" presId="urn:microsoft.com/office/officeart/2005/8/layout/cycle1"/>
+    <dgm:cxn modelId="{2B1EAE4E-D5B2-294A-978A-02B61BAB85F6}" type="presParOf" srcId="{95C65290-8CB0-5D41-96AE-300ED5E15A72}" destId="{53F3BD7A-07F5-004E-90ED-F19D5C54347F}" srcOrd="4" destOrd="0" presId="urn:microsoft.com/office/officeart/2005/8/layout/cycle1"/>
+    <dgm:cxn modelId="{E95C5308-0DE2-4843-BF18-1EDB0174AB3E}" type="presParOf" srcId="{95C65290-8CB0-5D41-96AE-300ED5E15A72}" destId="{B9DDC635-4E84-3B43-94D0-C50831EFB09C}" srcOrd="5" destOrd="0" presId="urn:microsoft.com/office/officeart/2005/8/layout/cycle1"/>
+    <dgm:cxn modelId="{FFD07AF0-7895-7642-AD95-6AFBDC363714}" type="presParOf" srcId="{95C65290-8CB0-5D41-96AE-300ED5E15A72}" destId="{363FB918-B447-7F45-A74E-9AF95C666CAE}" srcOrd="6" destOrd="0" presId="urn:microsoft.com/office/officeart/2005/8/layout/cycle1"/>
+    <dgm:cxn modelId="{9FEE0300-C531-194D-82D4-F328F0884859}" type="presParOf" srcId="{95C65290-8CB0-5D41-96AE-300ED5E15A72}" destId="{FDE9CFD6-51DF-9646-8569-73EA80EBC8CD}" srcOrd="7" destOrd="0" presId="urn:microsoft.com/office/officeart/2005/8/layout/cycle1"/>
+    <dgm:cxn modelId="{380FAC22-3A49-FB40-8F4C-B2E9BFD9F87B}" type="presParOf" srcId="{95C65290-8CB0-5D41-96AE-300ED5E15A72}" destId="{BC14C308-8ECD-EC4D-864E-6FDA7864A72C}" srcOrd="8" destOrd="0" presId="urn:microsoft.com/office/officeart/2005/8/layout/cycle1"/>
+  </dgm:cxnLst>
+  <dgm:bg/>
+  <dgm:whole/>
+  <dgm:extLst>
+    <a:ext uri="http://schemas.microsoft.com/office/drawing/2008/diagram">
+      <dsp:dataModelExt xmlns:dsp="http://schemas.microsoft.com/office/drawing/2008/diagram" relId="rId8" minVer="http://schemas.openxmlformats.org/drawingml/2006/diagram"/>
     </a:ext>
   </dgm:extLst>
 </dgm:dataModel>
@@ -10147,6 +11311,390 @@
 </dsp:drawing>
 </file>
 
+<file path=ppt/diagrams/drawing6.xml><?xml version="1.0" encoding="utf-8"?>
+<dsp:drawing xmlns:dgm="http://schemas.openxmlformats.org/drawingml/2006/diagram" xmlns:dsp="http://schemas.microsoft.com/office/drawing/2008/diagram" xmlns:a="http://schemas.openxmlformats.org/drawingml/2006/main">
+  <dsp:spTree>
+    <dsp:nvGrpSpPr>
+      <dsp:cNvPr id="0" name=""/>
+      <dsp:cNvGrpSpPr/>
+    </dsp:nvGrpSpPr>
+    <dsp:grpSpPr/>
+    <dsp:sp modelId="{D6966C6E-6FE5-FF48-BD3C-AA351AC49CDD}">
+      <dsp:nvSpPr>
+        <dsp:cNvPr id="0" name=""/>
+        <dsp:cNvSpPr/>
+      </dsp:nvSpPr>
+      <dsp:spPr>
+        <a:xfrm>
+          <a:off x="1804618" y="99715"/>
+          <a:ext cx="507476" cy="507476"/>
+        </a:xfrm>
+        <a:prstGeom prst="rect">
+          <a:avLst/>
+        </a:prstGeom>
+        <a:noFill/>
+        <a:ln>
+          <a:noFill/>
+        </a:ln>
+        <a:effectLst/>
+      </dsp:spPr>
+      <dsp:style>
+        <a:lnRef idx="0">
+          <a:scrgbClr r="0" g="0" b="0"/>
+        </a:lnRef>
+        <a:fillRef idx="0">
+          <a:scrgbClr r="0" g="0" b="0"/>
+        </a:fillRef>
+        <a:effectRef idx="0">
+          <a:scrgbClr r="0" g="0" b="0"/>
+        </a:effectRef>
+        <a:fontRef idx="minor"/>
+      </dsp:style>
+      <dsp:txBody>
+        <a:bodyPr spcFirstLastPara="0" vert="horz" wrap="square" lIns="11430" tIns="11430" rIns="11430" bIns="11430" numCol="1" spcCol="1270" anchor="ctr" anchorCtr="0">
+          <a:noAutofit/>
+        </a:bodyPr>
+        <a:lstStyle/>
+        <a:p>
+          <a:pPr lvl="0" algn="ctr" defTabSz="400050">
+            <a:lnSpc>
+              <a:spcPct val="90000"/>
+            </a:lnSpc>
+            <a:spcBef>
+              <a:spcPct val="0"/>
+            </a:spcBef>
+            <a:spcAft>
+              <a:spcPct val="35000"/>
+            </a:spcAft>
+          </a:pPr>
+          <a:r>
+            <a:rPr lang="en-US" sz="900" b="1" kern="1200" dirty="0" smtClean="0">
+              <a:solidFill>
+                <a:srgbClr val="FFFFFF"/>
+              </a:solidFill>
+            </a:rPr>
+            <a:t>MEASURE</a:t>
+          </a:r>
+          <a:endParaRPr lang="en-US" sz="900" b="1" kern="1200" dirty="0">
+            <a:solidFill>
+              <a:srgbClr val="FFFFFF"/>
+            </a:solidFill>
+          </a:endParaRPr>
+        </a:p>
+      </dsp:txBody>
+      <dsp:txXfrm>
+        <a:off x="1804618" y="99715"/>
+        <a:ext cx="507476" cy="507476"/>
+      </dsp:txXfrm>
+    </dsp:sp>
+    <dsp:sp modelId="{DC7F634A-1079-7E46-9F91-4D18AF73BAC8}">
+      <dsp:nvSpPr>
+        <dsp:cNvPr id="0" name=""/>
+        <dsp:cNvSpPr/>
+      </dsp:nvSpPr>
+      <dsp:spPr>
+        <a:xfrm>
+          <a:off x="1031562" y="-154"/>
+          <a:ext cx="1200021" cy="1200021"/>
+        </a:xfrm>
+        <a:prstGeom prst="circularArrow">
+          <a:avLst>
+            <a:gd name="adj1" fmla="val 8246"/>
+            <a:gd name="adj2" fmla="val 575937"/>
+            <a:gd name="adj3" fmla="val 2964679"/>
+            <a:gd name="adj4" fmla="val 51171"/>
+            <a:gd name="adj5" fmla="val 9621"/>
+          </a:avLst>
+        </a:prstGeom>
+        <a:solidFill>
+          <a:schemeClr val="accent4">
+            <a:shade val="80000"/>
+            <a:hueOff val="0"/>
+            <a:satOff val="0"/>
+            <a:lumOff val="0"/>
+            <a:alphaOff val="0"/>
+          </a:schemeClr>
+        </a:solidFill>
+        <a:ln w="25400" cap="flat" cmpd="sng" algn="ctr">
+          <a:solidFill>
+            <a:schemeClr val="lt1">
+              <a:hueOff val="0"/>
+              <a:satOff val="0"/>
+              <a:lumOff val="0"/>
+              <a:alphaOff val="0"/>
+            </a:schemeClr>
+          </a:solidFill>
+          <a:prstDash val="solid"/>
+        </a:ln>
+        <a:effectLst/>
+      </dsp:spPr>
+      <dsp:style>
+        <a:lnRef idx="2">
+          <a:scrgbClr r="0" g="0" b="0"/>
+        </a:lnRef>
+        <a:fillRef idx="1">
+          <a:scrgbClr r="0" g="0" b="0"/>
+        </a:fillRef>
+        <a:effectRef idx="0">
+          <a:scrgbClr r="0" g="0" b="0"/>
+        </a:effectRef>
+        <a:fontRef idx="minor">
+          <a:schemeClr val="lt1"/>
+        </a:fontRef>
+      </dsp:style>
+    </dsp:sp>
+    <dsp:sp modelId="{53F3BD7A-07F5-004E-90ED-F19D5C54347F}">
+      <dsp:nvSpPr>
+        <dsp:cNvPr id="0" name=""/>
+        <dsp:cNvSpPr/>
+      </dsp:nvSpPr>
+      <dsp:spPr>
+        <a:xfrm>
+          <a:off x="1377835" y="838925"/>
+          <a:ext cx="507476" cy="507476"/>
+        </a:xfrm>
+        <a:prstGeom prst="rect">
+          <a:avLst/>
+        </a:prstGeom>
+        <a:noFill/>
+        <a:ln>
+          <a:noFill/>
+        </a:ln>
+        <a:effectLst/>
+      </dsp:spPr>
+      <dsp:style>
+        <a:lnRef idx="0">
+          <a:scrgbClr r="0" g="0" b="0"/>
+        </a:lnRef>
+        <a:fillRef idx="0">
+          <a:scrgbClr r="0" g="0" b="0"/>
+        </a:fillRef>
+        <a:effectRef idx="0">
+          <a:scrgbClr r="0" g="0" b="0"/>
+        </a:effectRef>
+        <a:fontRef idx="minor"/>
+      </dsp:style>
+      <dsp:txBody>
+        <a:bodyPr spcFirstLastPara="0" vert="horz" wrap="square" lIns="11430" tIns="11430" rIns="11430" bIns="11430" numCol="1" spcCol="1270" anchor="ctr" anchorCtr="0">
+          <a:noAutofit/>
+        </a:bodyPr>
+        <a:lstStyle/>
+        <a:p>
+          <a:pPr lvl="0" algn="ctr" defTabSz="400050">
+            <a:lnSpc>
+              <a:spcPct val="90000"/>
+            </a:lnSpc>
+            <a:spcBef>
+              <a:spcPct val="0"/>
+            </a:spcBef>
+            <a:spcAft>
+              <a:spcPct val="35000"/>
+            </a:spcAft>
+          </a:pPr>
+          <a:r>
+            <a:rPr lang="en-US" sz="900" b="1" kern="1200" dirty="0" smtClean="0">
+              <a:solidFill>
+                <a:srgbClr val="FFFFFF"/>
+              </a:solidFill>
+            </a:rPr>
+            <a:t>LEARN</a:t>
+          </a:r>
+          <a:endParaRPr lang="en-US" sz="900" b="1" kern="1200" dirty="0">
+            <a:solidFill>
+              <a:srgbClr val="FFFFFF"/>
+            </a:solidFill>
+          </a:endParaRPr>
+        </a:p>
+      </dsp:txBody>
+      <dsp:txXfrm>
+        <a:off x="1377835" y="838925"/>
+        <a:ext cx="507476" cy="507476"/>
+      </dsp:txXfrm>
+    </dsp:sp>
+    <dsp:sp modelId="{B9DDC635-4E84-3B43-94D0-C50831EFB09C}">
+      <dsp:nvSpPr>
+        <dsp:cNvPr id="0" name=""/>
+        <dsp:cNvSpPr/>
+      </dsp:nvSpPr>
+      <dsp:spPr>
+        <a:xfrm>
+          <a:off x="1031562" y="-154"/>
+          <a:ext cx="1200021" cy="1200021"/>
+        </a:xfrm>
+        <a:prstGeom prst="circularArrow">
+          <a:avLst>
+            <a:gd name="adj1" fmla="val 8246"/>
+            <a:gd name="adj2" fmla="val 575937"/>
+            <a:gd name="adj3" fmla="val 10172892"/>
+            <a:gd name="adj4" fmla="val 7259384"/>
+            <a:gd name="adj5" fmla="val 9621"/>
+          </a:avLst>
+        </a:prstGeom>
+        <a:solidFill>
+          <a:schemeClr val="accent4">
+            <a:shade val="80000"/>
+            <a:hueOff val="286837"/>
+            <a:satOff val="-24292"/>
+            <a:lumOff val="18155"/>
+            <a:alphaOff val="0"/>
+          </a:schemeClr>
+        </a:solidFill>
+        <a:ln w="25400" cap="flat" cmpd="sng" algn="ctr">
+          <a:solidFill>
+            <a:schemeClr val="lt1">
+              <a:hueOff val="0"/>
+              <a:satOff val="0"/>
+              <a:lumOff val="0"/>
+              <a:alphaOff val="0"/>
+            </a:schemeClr>
+          </a:solidFill>
+          <a:prstDash val="solid"/>
+        </a:ln>
+        <a:effectLst/>
+      </dsp:spPr>
+      <dsp:style>
+        <a:lnRef idx="2">
+          <a:scrgbClr r="0" g="0" b="0"/>
+        </a:lnRef>
+        <a:fillRef idx="1">
+          <a:scrgbClr r="0" g="0" b="0"/>
+        </a:fillRef>
+        <a:effectRef idx="0">
+          <a:scrgbClr r="0" g="0" b="0"/>
+        </a:effectRef>
+        <a:fontRef idx="minor">
+          <a:schemeClr val="lt1"/>
+        </a:fontRef>
+      </dsp:style>
+    </dsp:sp>
+    <dsp:sp modelId="{FDE9CFD6-51DF-9646-8569-73EA80EBC8CD}">
+      <dsp:nvSpPr>
+        <dsp:cNvPr id="0" name=""/>
+        <dsp:cNvSpPr/>
+      </dsp:nvSpPr>
+      <dsp:spPr>
+        <a:xfrm>
+          <a:off x="951052" y="99715"/>
+          <a:ext cx="507476" cy="507476"/>
+        </a:xfrm>
+        <a:prstGeom prst="rect">
+          <a:avLst/>
+        </a:prstGeom>
+        <a:noFill/>
+        <a:ln>
+          <a:noFill/>
+        </a:ln>
+        <a:effectLst/>
+      </dsp:spPr>
+      <dsp:style>
+        <a:lnRef idx="0">
+          <a:scrgbClr r="0" g="0" b="0"/>
+        </a:lnRef>
+        <a:fillRef idx="0">
+          <a:scrgbClr r="0" g="0" b="0"/>
+        </a:fillRef>
+        <a:effectRef idx="0">
+          <a:scrgbClr r="0" g="0" b="0"/>
+        </a:effectRef>
+        <a:fontRef idx="minor"/>
+      </dsp:style>
+      <dsp:txBody>
+        <a:bodyPr spcFirstLastPara="0" vert="horz" wrap="square" lIns="11430" tIns="11430" rIns="11430" bIns="11430" numCol="1" spcCol="1270" anchor="ctr" anchorCtr="0">
+          <a:noAutofit/>
+        </a:bodyPr>
+        <a:lstStyle/>
+        <a:p>
+          <a:pPr lvl="0" algn="ctr" defTabSz="400050">
+            <a:lnSpc>
+              <a:spcPct val="90000"/>
+            </a:lnSpc>
+            <a:spcBef>
+              <a:spcPct val="0"/>
+            </a:spcBef>
+            <a:spcAft>
+              <a:spcPct val="35000"/>
+            </a:spcAft>
+          </a:pPr>
+          <a:r>
+            <a:rPr lang="en-US" sz="900" b="1" kern="1200" dirty="0" smtClean="0">
+              <a:solidFill>
+                <a:schemeClr val="bg1"/>
+              </a:solidFill>
+            </a:rPr>
+            <a:t>BUILD</a:t>
+          </a:r>
+          <a:endParaRPr lang="en-US" sz="900" b="1" kern="1200" dirty="0">
+            <a:solidFill>
+              <a:schemeClr val="bg1"/>
+            </a:solidFill>
+          </a:endParaRPr>
+        </a:p>
+      </dsp:txBody>
+      <dsp:txXfrm>
+        <a:off x="951052" y="99715"/>
+        <a:ext cx="507476" cy="507476"/>
+      </dsp:txXfrm>
+    </dsp:sp>
+    <dsp:sp modelId="{BC14C308-8ECD-EC4D-864E-6FDA7864A72C}">
+      <dsp:nvSpPr>
+        <dsp:cNvPr id="0" name=""/>
+        <dsp:cNvSpPr/>
+      </dsp:nvSpPr>
+      <dsp:spPr>
+        <a:xfrm>
+          <a:off x="1031562" y="-154"/>
+          <a:ext cx="1200021" cy="1200021"/>
+        </a:xfrm>
+        <a:prstGeom prst="circularArrow">
+          <a:avLst>
+            <a:gd name="adj1" fmla="val 8246"/>
+            <a:gd name="adj2" fmla="val 575937"/>
+            <a:gd name="adj3" fmla="val 16857490"/>
+            <a:gd name="adj4" fmla="val 14966573"/>
+            <a:gd name="adj5" fmla="val 9621"/>
+          </a:avLst>
+        </a:prstGeom>
+        <a:solidFill>
+          <a:schemeClr val="accent4">
+            <a:shade val="80000"/>
+            <a:hueOff val="573674"/>
+            <a:satOff val="-48584"/>
+            <a:lumOff val="36311"/>
+            <a:alphaOff val="0"/>
+          </a:schemeClr>
+        </a:solidFill>
+        <a:ln w="25400" cap="flat" cmpd="sng" algn="ctr">
+          <a:solidFill>
+            <a:schemeClr val="lt1">
+              <a:hueOff val="0"/>
+              <a:satOff val="0"/>
+              <a:lumOff val="0"/>
+              <a:alphaOff val="0"/>
+            </a:schemeClr>
+          </a:solidFill>
+          <a:prstDash val="solid"/>
+        </a:ln>
+        <a:effectLst/>
+      </dsp:spPr>
+      <dsp:style>
+        <a:lnRef idx="2">
+          <a:scrgbClr r="0" g="0" b="0"/>
+        </a:lnRef>
+        <a:fillRef idx="1">
+          <a:scrgbClr r="0" g="0" b="0"/>
+        </a:fillRef>
+        <a:effectRef idx="0">
+          <a:scrgbClr r="0" g="0" b="0"/>
+        </a:effectRef>
+        <a:fontRef idx="minor">
+          <a:schemeClr val="lt1"/>
+        </a:fontRef>
+      </dsp:style>
+    </dsp:sp>
+  </dsp:spTree>
+</dsp:drawing>
+</file>
+
 <file path=ppt/diagrams/layout1.xml><?xml version="1.0" encoding="utf-8"?>
 <dgm:layoutDef xmlns:dgm="http://schemas.openxmlformats.org/drawingml/2006/diagram" xmlns:a="http://schemas.openxmlformats.org/drawingml/2006/main" uniqueId="urn:microsoft.com/office/officeart/2005/8/layout/cycle1">
   <dgm:title val=""/>
@@ -11765,6 +13313,204 @@
 </dgm:layoutDef>
 </file>
 
+<file path=ppt/diagrams/layout6.xml><?xml version="1.0" encoding="utf-8"?>
+<dgm:layoutDef xmlns:dgm="http://schemas.openxmlformats.org/drawingml/2006/diagram" xmlns:a="http://schemas.openxmlformats.org/drawingml/2006/main" uniqueId="urn:microsoft.com/office/officeart/2005/8/layout/cycle1">
+  <dgm:title val=""/>
+  <dgm:desc val=""/>
+  <dgm:catLst>
+    <dgm:cat type="cycle" pri="2000"/>
+  </dgm:catLst>
+  <dgm:sampData>
+    <dgm:dataModel>
+      <dgm:ptLst>
+        <dgm:pt modelId="0" type="doc"/>
+        <dgm:pt modelId="1">
+          <dgm:prSet phldr="1"/>
+        </dgm:pt>
+        <dgm:pt modelId="2">
+          <dgm:prSet phldr="1"/>
+        </dgm:pt>
+        <dgm:pt modelId="3">
+          <dgm:prSet phldr="1"/>
+        </dgm:pt>
+        <dgm:pt modelId="4">
+          <dgm:prSet phldr="1"/>
+        </dgm:pt>
+        <dgm:pt modelId="5">
+          <dgm:prSet phldr="1"/>
+        </dgm:pt>
+      </dgm:ptLst>
+      <dgm:cxnLst>
+        <dgm:cxn modelId="6" srcId="0" destId="1" srcOrd="0" destOrd="0"/>
+        <dgm:cxn modelId="7" srcId="0" destId="2" srcOrd="1" destOrd="0"/>
+        <dgm:cxn modelId="8" srcId="0" destId="3" srcOrd="2" destOrd="0"/>
+        <dgm:cxn modelId="9" srcId="0" destId="4" srcOrd="3" destOrd="0"/>
+        <dgm:cxn modelId="10" srcId="0" destId="5" srcOrd="4" destOrd="0"/>
+      </dgm:cxnLst>
+      <dgm:bg/>
+      <dgm:whole/>
+    </dgm:dataModel>
+  </dgm:sampData>
+  <dgm:styleData>
+    <dgm:dataModel>
+      <dgm:ptLst>
+        <dgm:pt modelId="0" type="doc"/>
+        <dgm:pt modelId="1"/>
+        <dgm:pt modelId="2"/>
+        <dgm:pt modelId="3"/>
+      </dgm:ptLst>
+      <dgm:cxnLst>
+        <dgm:cxn modelId="4" srcId="0" destId="1" srcOrd="0" destOrd="0"/>
+        <dgm:cxn modelId="5" srcId="0" destId="2" srcOrd="1" destOrd="0"/>
+        <dgm:cxn modelId="6" srcId="0" destId="3" srcOrd="2" destOrd="0"/>
+      </dgm:cxnLst>
+      <dgm:bg/>
+      <dgm:whole/>
+    </dgm:dataModel>
+  </dgm:styleData>
+  <dgm:clrData>
+    <dgm:dataModel>
+      <dgm:ptLst>
+        <dgm:pt modelId="0" type="doc"/>
+        <dgm:pt modelId="1"/>
+        <dgm:pt modelId="2"/>
+        <dgm:pt modelId="3"/>
+        <dgm:pt modelId="4"/>
+        <dgm:pt modelId="5"/>
+        <dgm:pt modelId="6"/>
+      </dgm:ptLst>
+      <dgm:cxnLst>
+        <dgm:cxn modelId="7" srcId="0" destId="1" srcOrd="0" destOrd="0"/>
+        <dgm:cxn modelId="8" srcId="0" destId="2" srcOrd="1" destOrd="0"/>
+        <dgm:cxn modelId="9" srcId="0" destId="3" srcOrd="2" destOrd="0"/>
+        <dgm:cxn modelId="10" srcId="0" destId="4" srcOrd="3" destOrd="0"/>
+        <dgm:cxn modelId="11" srcId="0" destId="5" srcOrd="4" destOrd="0"/>
+        <dgm:cxn modelId="12" srcId="0" destId="6" srcOrd="5" destOrd="0"/>
+      </dgm:cxnLst>
+      <dgm:bg/>
+      <dgm:whole/>
+    </dgm:dataModel>
+  </dgm:clrData>
+  <dgm:layoutNode name="cycle">
+    <dgm:varLst>
+      <dgm:dir/>
+      <dgm:resizeHandles val="exact"/>
+    </dgm:varLst>
+    <dgm:choose name="Name0">
+      <dgm:if name="Name1" func="var" arg="dir" op="equ" val="norm">
+        <dgm:alg type="cycle">
+          <dgm:param type="stAng" val="0"/>
+          <dgm:param type="spanAng" val="360"/>
+        </dgm:alg>
+      </dgm:if>
+      <dgm:else name="Name2">
+        <dgm:alg type="cycle">
+          <dgm:param type="stAng" val="0"/>
+          <dgm:param type="spanAng" val="-360"/>
+        </dgm:alg>
+      </dgm:else>
+    </dgm:choose>
+    <dgm:shape xmlns:r="http://schemas.openxmlformats.org/officeDocument/2006/relationships" r:blip="">
+      <dgm:adjLst/>
+    </dgm:shape>
+    <dgm:presOf/>
+    <dgm:choose name="Name3">
+      <dgm:if name="Name4" func="var" arg="dir" op="equ" val="norm">
+        <dgm:constrLst>
+          <dgm:constr type="diam" val="1"/>
+          <dgm:constr type="w" for="ch" forName="node" refType="w"/>
+          <dgm:constr type="w" for="ch" ptType="sibTrans" refType="w" refFor="ch" refForName="node" fact="0.5"/>
+          <dgm:constr type="h" for="ch" ptType="sibTrans" op="equ"/>
+          <dgm:constr type="diam" for="ch" ptType="sibTrans" refType="diam" op="equ"/>
+          <dgm:constr type="sibSp" refType="w" refFor="ch" refForName="node" fact="0.15"/>
+          <dgm:constr type="w" for="ch" forName="dummy" refType="sibSp" fact="2.8"/>
+          <dgm:constr type="primFontSz" for="ch" forName="node" op="equ" val="65"/>
+        </dgm:constrLst>
+      </dgm:if>
+      <dgm:else name="Name5">
+        <dgm:constrLst>
+          <dgm:constr type="diam" val="1"/>
+          <dgm:constr type="w" for="ch" forName="node" refType="w"/>
+          <dgm:constr type="w" for="ch" ptType="sibTrans" refType="w" refFor="ch" refForName="node" fact="0.5"/>
+          <dgm:constr type="h" for="ch" ptType="sibTrans" op="equ"/>
+          <dgm:constr type="diam" for="ch" ptType="sibTrans" refType="diam" op="equ" fact="-1"/>
+          <dgm:constr type="sibSp" refType="w" refFor="ch" refForName="node" fact="0.15"/>
+          <dgm:constr type="w" for="ch" forName="dummy" refType="sibSp" fact="2.8"/>
+          <dgm:constr type="primFontSz" for="ch" forName="node" op="equ" val="65"/>
+        </dgm:constrLst>
+      </dgm:else>
+    </dgm:choose>
+    <dgm:ruleLst>
+      <dgm:rule type="diam" val="INF" fact="NaN" max="NaN"/>
+    </dgm:ruleLst>
+    <dgm:forEach name="nodesForEach" axis="ch" ptType="node">
+      <dgm:choose name="Name6">
+        <dgm:if name="Name7" axis="par ch" ptType="doc node" func="cnt" op="gt" val="1">
+          <dgm:layoutNode name="dummy">
+            <dgm:alg type="sp"/>
+            <dgm:shape xmlns:r="http://schemas.openxmlformats.org/officeDocument/2006/relationships" r:blip="">
+              <dgm:adjLst/>
+            </dgm:shape>
+            <dgm:presOf/>
+            <dgm:constrLst>
+              <dgm:constr type="h" refType="w"/>
+            </dgm:constrLst>
+            <dgm:ruleLst/>
+          </dgm:layoutNode>
+        </dgm:if>
+        <dgm:else name="Name8"/>
+      </dgm:choose>
+      <dgm:layoutNode name="node" styleLbl="revTx">
+        <dgm:varLst>
+          <dgm:bulletEnabled val="1"/>
+        </dgm:varLst>
+        <dgm:alg type="tx">
+          <dgm:param type="txAnchorVertCh" val="mid"/>
+        </dgm:alg>
+        <dgm:shape xmlns:r="http://schemas.openxmlformats.org/officeDocument/2006/relationships" type="rect" r:blip="">
+          <dgm:adjLst/>
+        </dgm:shape>
+        <dgm:presOf axis="desOrSelf" ptType="node"/>
+        <dgm:constrLst>
+          <dgm:constr type="h" refType="w"/>
+          <dgm:constr type="lMarg" refType="primFontSz" fact="0.1"/>
+          <dgm:constr type="rMarg" refType="primFontSz" fact="0.1"/>
+          <dgm:constr type="tMarg" refType="primFontSz" fact="0.1"/>
+          <dgm:constr type="bMarg" refType="primFontSz" fact="0.1"/>
+        </dgm:constrLst>
+        <dgm:ruleLst>
+          <dgm:rule type="primFontSz" val="5" fact="NaN" max="NaN"/>
+        </dgm:ruleLst>
+      </dgm:layoutNode>
+      <dgm:choose name="Name9">
+        <dgm:if name="Name10" axis="par ch" ptType="doc node" func="cnt" op="gt" val="1">
+          <dgm:forEach name="Name11" axis="followSib" ptType="sibTrans" hideLastTrans="0" cnt="1">
+            <dgm:layoutNode name="sibTrans" styleLbl="node1">
+              <dgm:alg type="conn">
+                <dgm:param type="connRout" val="curve"/>
+                <dgm:param type="begPts" val="radial"/>
+                <dgm:param type="endPts" val="radial"/>
+              </dgm:alg>
+              <dgm:shape xmlns:r="http://schemas.openxmlformats.org/officeDocument/2006/relationships" type="conn" r:blip="">
+                <dgm:adjLst/>
+              </dgm:shape>
+              <dgm:presOf axis="self"/>
+              <dgm:constrLst>
+                <dgm:constr type="h" refType="w" fact="0.65"/>
+                <dgm:constr type="begPad"/>
+                <dgm:constr type="endPad"/>
+              </dgm:constrLst>
+              <dgm:ruleLst/>
+            </dgm:layoutNode>
+          </dgm:forEach>
+        </dgm:if>
+        <dgm:else name="Name12"/>
+      </dgm:choose>
+    </dgm:forEach>
+  </dgm:layoutNode>
+</dgm:layoutDef>
+</file>
+
 <file path=ppt/diagrams/quickStyle1.xml><?xml version="1.0" encoding="utf-8"?>
 <dgm:styleDef xmlns:dgm="http://schemas.openxmlformats.org/drawingml/2006/diagram" xmlns:a="http://schemas.openxmlformats.org/drawingml/2006/main" uniqueId="urn:microsoft.com/office/officeart/2005/8/quickstyle/simple1">
   <dgm:title val=""/>
@@ -16933,6 +18679,1482 @@
     </dgm:style>
   </dgm:styleLbl>
 </dgm:styleDef>
+</file>
+
+<file path=ppt/diagrams/quickStyle6.xml><?xml version="1.0" encoding="utf-8"?>
+<dgm:styleDef xmlns:dgm="http://schemas.openxmlformats.org/drawingml/2006/diagram" xmlns:a="http://schemas.openxmlformats.org/drawingml/2006/main" uniqueId="urn:microsoft.com/office/officeart/2005/8/quickstyle/simple1">
+  <dgm:title val=""/>
+  <dgm:desc val=""/>
+  <dgm:catLst>
+    <dgm:cat type="simple" pri="10100"/>
+  </dgm:catLst>
+  <dgm:scene3d>
+    <a:camera prst="orthographicFront"/>
+    <a:lightRig rig="threePt" dir="t"/>
+  </dgm:scene3d>
+  <dgm:styleLbl name="node0">
+    <dgm:scene3d>
+      <a:camera prst="orthographicFront"/>
+      <a:lightRig rig="threePt" dir="t"/>
+    </dgm:scene3d>
+    <dgm:sp3d/>
+    <dgm:txPr/>
+    <dgm:style>
+      <a:lnRef idx="2">
+        <a:scrgbClr r="0" g="0" b="0"/>
+      </a:lnRef>
+      <a:fillRef idx="1">
+        <a:scrgbClr r="0" g="0" b="0"/>
+      </a:fillRef>
+      <a:effectRef idx="0">
+        <a:scrgbClr r="0" g="0" b="0"/>
+      </a:effectRef>
+      <a:fontRef idx="minor">
+        <a:schemeClr val="lt1"/>
+      </a:fontRef>
+    </dgm:style>
+  </dgm:styleLbl>
+  <dgm:styleLbl name="lnNode1">
+    <dgm:scene3d>
+      <a:camera prst="orthographicFront"/>
+      <a:lightRig rig="threePt" dir="t"/>
+    </dgm:scene3d>
+    <dgm:sp3d/>
+    <dgm:txPr/>
+    <dgm:style>
+      <a:lnRef idx="2">
+        <a:scrgbClr r="0" g="0" b="0"/>
+      </a:lnRef>
+      <a:fillRef idx="1">
+        <a:scrgbClr r="0" g="0" b="0"/>
+      </a:fillRef>
+      <a:effectRef idx="0">
+        <a:scrgbClr r="0" g="0" b="0"/>
+      </a:effectRef>
+      <a:fontRef idx="minor">
+        <a:schemeClr val="lt1"/>
+      </a:fontRef>
+    </dgm:style>
+  </dgm:styleLbl>
+  <dgm:styleLbl name="vennNode1">
+    <dgm:scene3d>
+      <a:camera prst="orthographicFront"/>
+      <a:lightRig rig="threePt" dir="t"/>
+    </dgm:scene3d>
+    <dgm:sp3d/>
+    <dgm:txPr/>
+    <dgm:style>
+      <a:lnRef idx="2">
+        <a:scrgbClr r="0" g="0" b="0"/>
+      </a:lnRef>
+      <a:fillRef idx="1">
+        <a:scrgbClr r="0" g="0" b="0"/>
+      </a:fillRef>
+      <a:effectRef idx="0">
+        <a:scrgbClr r="0" g="0" b="0"/>
+      </a:effectRef>
+      <a:fontRef idx="minor">
+        <a:schemeClr val="tx1"/>
+      </a:fontRef>
+    </dgm:style>
+  </dgm:styleLbl>
+  <dgm:styleLbl name="alignNode1">
+    <dgm:scene3d>
+      <a:camera prst="orthographicFront"/>
+      <a:lightRig rig="threePt" dir="t"/>
+    </dgm:scene3d>
+    <dgm:sp3d/>
+    <dgm:txPr/>
+    <dgm:style>
+      <a:lnRef idx="2">
+        <a:scrgbClr r="0" g="0" b="0"/>
+      </a:lnRef>
+      <a:fillRef idx="1">
+        <a:scrgbClr r="0" g="0" b="0"/>
+      </a:fillRef>
+      <a:effectRef idx="0">
+        <a:scrgbClr r="0" g="0" b="0"/>
+      </a:effectRef>
+      <a:fontRef idx="minor">
+        <a:schemeClr val="lt1"/>
+      </a:fontRef>
+    </dgm:style>
+  </dgm:styleLbl>
+  <dgm:styleLbl name="node1">
+    <dgm:scene3d>
+      <a:camera prst="orthographicFront"/>
+      <a:lightRig rig="threePt" dir="t"/>
+    </dgm:scene3d>
+    <dgm:sp3d/>
+    <dgm:txPr/>
+    <dgm:style>
+      <a:lnRef idx="2">
+        <a:scrgbClr r="0" g="0" b="0"/>
+      </a:lnRef>
+      <a:fillRef idx="1">
+        <a:scrgbClr r="0" g="0" b="0"/>
+      </a:fillRef>
+      <a:effectRef idx="0">
+        <a:scrgbClr r="0" g="0" b="0"/>
+      </a:effectRef>
+      <a:fontRef idx="minor">
+        <a:schemeClr val="lt1"/>
+      </a:fontRef>
+    </dgm:style>
+  </dgm:styleLbl>
+  <dgm:styleLbl name="node2">
+    <dgm:scene3d>
+      <a:camera prst="orthographicFront"/>
+      <a:lightRig rig="threePt" dir="t"/>
+    </dgm:scene3d>
+    <dgm:sp3d/>
+    <dgm:txPr/>
+    <dgm:style>
+      <a:lnRef idx="2">
+        <a:scrgbClr r="0" g="0" b="0"/>
+      </a:lnRef>
+      <a:fillRef idx="1">
+        <a:scrgbClr r="0" g="0" b="0"/>
+      </a:fillRef>
+      <a:effectRef idx="0">
+        <a:scrgbClr r="0" g="0" b="0"/>
+      </a:effectRef>
+      <a:fontRef idx="minor">
+        <a:schemeClr val="lt1"/>
+      </a:fontRef>
+    </dgm:style>
+  </dgm:styleLbl>
+  <dgm:styleLbl name="node3">
+    <dgm:scene3d>
+      <a:camera prst="orthographicFront"/>
+      <a:lightRig rig="threePt" dir="t"/>
+    </dgm:scene3d>
+    <dgm:sp3d/>
+    <dgm:txPr/>
+    <dgm:style>
+      <a:lnRef idx="2">
+        <a:scrgbClr r="0" g="0" b="0"/>
+      </a:lnRef>
+      <a:fillRef idx="1">
+        <a:scrgbClr r="0" g="0" b="0"/>
+      </a:fillRef>
+      <a:effectRef idx="0">
+        <a:scrgbClr r="0" g="0" b="0"/>
+      </a:effectRef>
+      <a:fontRef idx="minor">
+        <a:schemeClr val="lt1"/>
+      </a:fontRef>
+    </dgm:style>
+  </dgm:styleLbl>
+  <dgm:styleLbl name="node4">
+    <dgm:scene3d>
+      <a:camera prst="orthographicFront"/>
+      <a:lightRig rig="threePt" dir="t"/>
+    </dgm:scene3d>
+    <dgm:sp3d/>
+    <dgm:txPr/>
+    <dgm:style>
+      <a:lnRef idx="2">
+        <a:scrgbClr r="0" g="0" b="0"/>
+      </a:lnRef>
+      <a:fillRef idx="1">
+        <a:scrgbClr r="0" g="0" b="0"/>
+      </a:fillRef>
+      <a:effectRef idx="0">
+        <a:scrgbClr r="0" g="0" b="0"/>
+      </a:effectRef>
+      <a:fontRef idx="minor">
+        <a:schemeClr val="lt1"/>
+      </a:fontRef>
+    </dgm:style>
+  </dgm:styleLbl>
+  <dgm:styleLbl name="fgImgPlace1">
+    <dgm:scene3d>
+      <a:camera prst="orthographicFront"/>
+      <a:lightRig rig="threePt" dir="t"/>
+    </dgm:scene3d>
+    <dgm:sp3d/>
+    <dgm:txPr/>
+    <dgm:style>
+      <a:lnRef idx="2">
+        <a:scrgbClr r="0" g="0" b="0"/>
+      </a:lnRef>
+      <a:fillRef idx="1">
+        <a:scrgbClr r="0" g="0" b="0"/>
+      </a:fillRef>
+      <a:effectRef idx="0">
+        <a:scrgbClr r="0" g="0" b="0"/>
+      </a:effectRef>
+      <a:fontRef idx="minor"/>
+    </dgm:style>
+  </dgm:styleLbl>
+  <dgm:styleLbl name="alignImgPlace1">
+    <dgm:scene3d>
+      <a:camera prst="orthographicFront"/>
+      <a:lightRig rig="threePt" dir="t"/>
+    </dgm:scene3d>
+    <dgm:sp3d/>
+    <dgm:txPr/>
+    <dgm:style>
+      <a:lnRef idx="2">
+        <a:scrgbClr r="0" g="0" b="0"/>
+      </a:lnRef>
+      <a:fillRef idx="1">
+        <a:scrgbClr r="0" g="0" b="0"/>
+      </a:fillRef>
+      <a:effectRef idx="0">
+        <a:scrgbClr r="0" g="0" b="0"/>
+      </a:effectRef>
+      <a:fontRef idx="minor"/>
+    </dgm:style>
+  </dgm:styleLbl>
+  <dgm:styleLbl name="bgImgPlace1">
+    <dgm:scene3d>
+      <a:camera prst="orthographicFront"/>
+      <a:lightRig rig="threePt" dir="t"/>
+    </dgm:scene3d>
+    <dgm:sp3d/>
+    <dgm:txPr/>
+    <dgm:style>
+      <a:lnRef idx="2">
+        <a:scrgbClr r="0" g="0" b="0"/>
+      </a:lnRef>
+      <a:fillRef idx="1">
+        <a:scrgbClr r="0" g="0" b="0"/>
+      </a:fillRef>
+      <a:effectRef idx="0">
+        <a:scrgbClr r="0" g="0" b="0"/>
+      </a:effectRef>
+      <a:fontRef idx="minor"/>
+    </dgm:style>
+  </dgm:styleLbl>
+  <dgm:styleLbl name="sibTrans2D1">
+    <dgm:scene3d>
+      <a:camera prst="orthographicFront"/>
+      <a:lightRig rig="threePt" dir="t"/>
+    </dgm:scene3d>
+    <dgm:sp3d/>
+    <dgm:txPr/>
+    <dgm:style>
+      <a:lnRef idx="0">
+        <a:scrgbClr r="0" g="0" b="0"/>
+      </a:lnRef>
+      <a:fillRef idx="1">
+        <a:scrgbClr r="0" g="0" b="0"/>
+      </a:fillRef>
+      <a:effectRef idx="0">
+        <a:scrgbClr r="0" g="0" b="0"/>
+      </a:effectRef>
+      <a:fontRef idx="minor">
+        <a:schemeClr val="lt1"/>
+      </a:fontRef>
+    </dgm:style>
+  </dgm:styleLbl>
+  <dgm:styleLbl name="fgSibTrans2D1">
+    <dgm:scene3d>
+      <a:camera prst="orthographicFront"/>
+      <a:lightRig rig="threePt" dir="t"/>
+    </dgm:scene3d>
+    <dgm:sp3d/>
+    <dgm:txPr/>
+    <dgm:style>
+      <a:lnRef idx="0">
+        <a:scrgbClr r="0" g="0" b="0"/>
+      </a:lnRef>
+      <a:fillRef idx="1">
+        <a:scrgbClr r="0" g="0" b="0"/>
+      </a:fillRef>
+      <a:effectRef idx="0">
+        <a:scrgbClr r="0" g="0" b="0"/>
+      </a:effectRef>
+      <a:fontRef idx="minor">
+        <a:schemeClr val="lt1"/>
+      </a:fontRef>
+    </dgm:style>
+  </dgm:styleLbl>
+  <dgm:styleLbl name="bgSibTrans2D1">
+    <dgm:scene3d>
+      <a:camera prst="orthographicFront"/>
+      <a:lightRig rig="threePt" dir="t"/>
+    </dgm:scene3d>
+    <dgm:sp3d/>
+    <dgm:txPr/>
+    <dgm:style>
+      <a:lnRef idx="0">
+        <a:scrgbClr r="0" g="0" b="0"/>
+      </a:lnRef>
+      <a:fillRef idx="1">
+        <a:scrgbClr r="0" g="0" b="0"/>
+      </a:fillRef>
+      <a:effectRef idx="0">
+        <a:scrgbClr r="0" g="0" b="0"/>
+      </a:effectRef>
+      <a:fontRef idx="minor">
+        <a:schemeClr val="lt1"/>
+      </a:fontRef>
+    </dgm:style>
+  </dgm:styleLbl>
+  <dgm:styleLbl name="sibTrans1D1">
+    <dgm:scene3d>
+      <a:camera prst="orthographicFront"/>
+      <a:lightRig rig="threePt" dir="t"/>
+    </dgm:scene3d>
+    <dgm:sp3d/>
+    <dgm:txPr/>
+    <dgm:style>
+      <a:lnRef idx="1">
+        <a:scrgbClr r="0" g="0" b="0"/>
+      </a:lnRef>
+      <a:fillRef idx="0">
+        <a:scrgbClr r="0" g="0" b="0"/>
+      </a:fillRef>
+      <a:effectRef idx="0">
+        <a:scrgbClr r="0" g="0" b="0"/>
+      </a:effectRef>
+      <a:fontRef idx="minor"/>
+    </dgm:style>
+  </dgm:styleLbl>
+  <dgm:styleLbl name="callout">
+    <dgm:scene3d>
+      <a:camera prst="orthographicFront"/>
+      <a:lightRig rig="threePt" dir="t"/>
+    </dgm:scene3d>
+    <dgm:sp3d/>
+    <dgm:txPr/>
+    <dgm:style>
+      <a:lnRef idx="2">
+        <a:scrgbClr r="0" g="0" b="0"/>
+      </a:lnRef>
+      <a:fillRef idx="1">
+        <a:scrgbClr r="0" g="0" b="0"/>
+      </a:fillRef>
+      <a:effectRef idx="0">
+        <a:scrgbClr r="0" g="0" b="0"/>
+      </a:effectRef>
+      <a:fontRef idx="minor"/>
+    </dgm:style>
+  </dgm:styleLbl>
+  <dgm:styleLbl name="asst0">
+    <dgm:scene3d>
+      <a:camera prst="orthographicFront"/>
+      <a:lightRig rig="threePt" dir="t"/>
+    </dgm:scene3d>
+    <dgm:sp3d/>
+    <dgm:txPr/>
+    <dgm:style>
+      <a:lnRef idx="2">
+        <a:scrgbClr r="0" g="0" b="0"/>
+      </a:lnRef>
+      <a:fillRef idx="1">
+        <a:scrgbClr r="0" g="0" b="0"/>
+      </a:fillRef>
+      <a:effectRef idx="0">
+        <a:scrgbClr r="0" g="0" b="0"/>
+      </a:effectRef>
+      <a:fontRef idx="minor">
+        <a:schemeClr val="lt1"/>
+      </a:fontRef>
+    </dgm:style>
+  </dgm:styleLbl>
+  <dgm:styleLbl name="asst1">
+    <dgm:scene3d>
+      <a:camera prst="orthographicFront"/>
+      <a:lightRig rig="threePt" dir="t"/>
+    </dgm:scene3d>
+    <dgm:sp3d/>
+    <dgm:txPr/>
+    <dgm:style>
+      <a:lnRef idx="2">
+        <a:scrgbClr r="0" g="0" b="0"/>
+      </a:lnRef>
+      <a:fillRef idx="1">
+        <a:scrgbClr r="0" g="0" b="0"/>
+      </a:fillRef>
+      <a:effectRef idx="0">
+        <a:scrgbClr r="0" g="0" b="0"/>
+      </a:effectRef>
+      <a:fontRef idx="minor">
+        <a:schemeClr val="lt1"/>
+      </a:fontRef>
+    </dgm:style>
+  </dgm:styleLbl>
+  <dgm:styleLbl name="asst2">
+    <dgm:scene3d>
+      <a:camera prst="orthographicFront"/>
+      <a:lightRig rig="threePt" dir="t"/>
+    </dgm:scene3d>
+    <dgm:sp3d/>
+    <dgm:txPr/>
+    <dgm:style>
+      <a:lnRef idx="2">
+        <a:scrgbClr r="0" g="0" b="0"/>
+      </a:lnRef>
+      <a:fillRef idx="1">
+        <a:scrgbClr r="0" g="0" b="0"/>
+      </a:fillRef>
+      <a:effectRef idx="0">
+        <a:scrgbClr r="0" g="0" b="0"/>
+      </a:effectRef>
+      <a:fontRef idx="minor">
+        <a:schemeClr val="lt1"/>
+      </a:fontRef>
+    </dgm:style>
+  </dgm:styleLbl>
+  <dgm:styleLbl name="asst3">
+    <dgm:scene3d>
+      <a:camera prst="orthographicFront"/>
+      <a:lightRig rig="threePt" dir="t"/>
+    </dgm:scene3d>
+    <dgm:sp3d/>
+    <dgm:txPr/>
+    <dgm:style>
+      <a:lnRef idx="2">
+        <a:scrgbClr r="0" g="0" b="0"/>
+      </a:lnRef>
+      <a:fillRef idx="1">
+        <a:scrgbClr r="0" g="0" b="0"/>
+      </a:fillRef>
+      <a:effectRef idx="0">
+        <a:scrgbClr r="0" g="0" b="0"/>
+      </a:effectRef>
+      <a:fontRef idx="minor">
+        <a:schemeClr val="lt1"/>
+      </a:fontRef>
+    </dgm:style>
+  </dgm:styleLbl>
+  <dgm:styleLbl name="asst4">
+    <dgm:scene3d>
+      <a:camera prst="orthographicFront"/>
+      <a:lightRig rig="threePt" dir="t"/>
+    </dgm:scene3d>
+    <dgm:sp3d/>
+    <dgm:txPr/>
+    <dgm:style>
+      <a:lnRef idx="2">
+        <a:scrgbClr r="0" g="0" b="0"/>
+      </a:lnRef>
+      <a:fillRef idx="1">
+        <a:scrgbClr r="0" g="0" b="0"/>
+      </a:fillRef>
+      <a:effectRef idx="0">
+        <a:scrgbClr r="0" g="0" b="0"/>
+      </a:effectRef>
+      <a:fontRef idx="minor">
+        <a:schemeClr val="lt1"/>
+      </a:fontRef>
+    </dgm:style>
+  </dgm:styleLbl>
+  <dgm:styleLbl name="parChTrans2D1">
+    <dgm:scene3d>
+      <a:camera prst="orthographicFront"/>
+      <a:lightRig rig="threePt" dir="t"/>
+    </dgm:scene3d>
+    <dgm:sp3d/>
+    <dgm:txPr/>
+    <dgm:style>
+      <a:lnRef idx="2">
+        <a:scrgbClr r="0" g="0" b="0"/>
+      </a:lnRef>
+      <a:fillRef idx="1">
+        <a:scrgbClr r="0" g="0" b="0"/>
+      </a:fillRef>
+      <a:effectRef idx="0">
+        <a:scrgbClr r="0" g="0" b="0"/>
+      </a:effectRef>
+      <a:fontRef idx="minor">
+        <a:schemeClr val="lt1"/>
+      </a:fontRef>
+    </dgm:style>
+  </dgm:styleLbl>
+  <dgm:styleLbl name="parChTrans2D2">
+    <dgm:scene3d>
+      <a:camera prst="orthographicFront"/>
+      <a:lightRig rig="threePt" dir="t"/>
+    </dgm:scene3d>
+    <dgm:sp3d/>
+    <dgm:txPr/>
+    <dgm:style>
+      <a:lnRef idx="2">
+        <a:scrgbClr r="0" g="0" b="0"/>
+      </a:lnRef>
+      <a:fillRef idx="1">
+        <a:scrgbClr r="0" g="0" b="0"/>
+      </a:fillRef>
+      <a:effectRef idx="0">
+        <a:scrgbClr r="0" g="0" b="0"/>
+      </a:effectRef>
+      <a:fontRef idx="minor">
+        <a:schemeClr val="lt1"/>
+      </a:fontRef>
+    </dgm:style>
+  </dgm:styleLbl>
+  <dgm:styleLbl name="parChTrans2D3">
+    <dgm:scene3d>
+      <a:camera prst="orthographicFront"/>
+      <a:lightRig rig="threePt" dir="t"/>
+    </dgm:scene3d>
+    <dgm:sp3d/>
+    <dgm:txPr/>
+    <dgm:style>
+      <a:lnRef idx="2">
+        <a:scrgbClr r="0" g="0" b="0"/>
+      </a:lnRef>
+      <a:fillRef idx="1">
+        <a:scrgbClr r="0" g="0" b="0"/>
+      </a:fillRef>
+      <a:effectRef idx="0">
+        <a:scrgbClr r="0" g="0" b="0"/>
+      </a:effectRef>
+      <a:fontRef idx="minor">
+        <a:schemeClr val="lt1"/>
+      </a:fontRef>
+    </dgm:style>
+  </dgm:styleLbl>
+  <dgm:styleLbl name="parChTrans2D4">
+    <dgm:scene3d>
+      <a:camera prst="orthographicFront"/>
+      <a:lightRig rig="threePt" dir="t"/>
+    </dgm:scene3d>
+    <dgm:sp3d/>
+    <dgm:txPr/>
+    <dgm:style>
+      <a:lnRef idx="2">
+        <a:scrgbClr r="0" g="0" b="0"/>
+      </a:lnRef>
+      <a:fillRef idx="1">
+        <a:scrgbClr r="0" g="0" b="0"/>
+      </a:fillRef>
+      <a:effectRef idx="0">
+        <a:scrgbClr r="0" g="0" b="0"/>
+      </a:effectRef>
+      <a:fontRef idx="minor">
+        <a:schemeClr val="lt1"/>
+      </a:fontRef>
+    </dgm:style>
+  </dgm:styleLbl>
+  <dgm:styleLbl name="parChTrans1D1">
+    <dgm:scene3d>
+      <a:camera prst="orthographicFront"/>
+      <a:lightRig rig="threePt" dir="t"/>
+    </dgm:scene3d>
+    <dgm:sp3d/>
+    <dgm:txPr/>
+    <dgm:style>
+      <a:lnRef idx="2">
+        <a:scrgbClr r="0" g="0" b="0"/>
+      </a:lnRef>
+      <a:fillRef idx="0">
+        <a:scrgbClr r="0" g="0" b="0"/>
+      </a:fillRef>
+      <a:effectRef idx="0">
+        <a:scrgbClr r="0" g="0" b="0"/>
+      </a:effectRef>
+      <a:fontRef idx="minor"/>
+    </dgm:style>
+  </dgm:styleLbl>
+  <dgm:styleLbl name="parChTrans1D2">
+    <dgm:scene3d>
+      <a:camera prst="orthographicFront"/>
+      <a:lightRig rig="threePt" dir="t"/>
+    </dgm:scene3d>
+    <dgm:sp3d/>
+    <dgm:txPr/>
+    <dgm:style>
+      <a:lnRef idx="2">
+        <a:scrgbClr r="0" g="0" b="0"/>
+      </a:lnRef>
+      <a:fillRef idx="0">
+        <a:scrgbClr r="0" g="0" b="0"/>
+      </a:fillRef>
+      <a:effectRef idx="0">
+        <a:scrgbClr r="0" g="0" b="0"/>
+      </a:effectRef>
+      <a:fontRef idx="minor"/>
+    </dgm:style>
+  </dgm:styleLbl>
+  <dgm:styleLbl name="parChTrans1D3">
+    <dgm:scene3d>
+      <a:camera prst="orthographicFront"/>
+      <a:lightRig rig="threePt" dir="t"/>
+    </dgm:scene3d>
+    <dgm:sp3d/>
+    <dgm:txPr/>
+    <dgm:style>
+      <a:lnRef idx="2">
+        <a:scrgbClr r="0" g="0" b="0"/>
+      </a:lnRef>
+      <a:fillRef idx="0">
+        <a:scrgbClr r="0" g="0" b="0"/>
+      </a:fillRef>
+      <a:effectRef idx="0">
+        <a:scrgbClr r="0" g="0" b="0"/>
+      </a:effectRef>
+      <a:fontRef idx="minor"/>
+    </dgm:style>
+  </dgm:styleLbl>
+  <dgm:styleLbl name="parChTrans1D4">
+    <dgm:scene3d>
+      <a:camera prst="orthographicFront"/>
+      <a:lightRig rig="threePt" dir="t"/>
+    </dgm:scene3d>
+    <dgm:sp3d/>
+    <dgm:txPr/>
+    <dgm:style>
+      <a:lnRef idx="2">
+        <a:scrgbClr r="0" g="0" b="0"/>
+      </a:lnRef>
+      <a:fillRef idx="0">
+        <a:scrgbClr r="0" g="0" b="0"/>
+      </a:fillRef>
+      <a:effectRef idx="0">
+        <a:scrgbClr r="0" g="0" b="0"/>
+      </a:effectRef>
+      <a:fontRef idx="minor"/>
+    </dgm:style>
+  </dgm:styleLbl>
+  <dgm:styleLbl name="fgAcc1">
+    <dgm:scene3d>
+      <a:camera prst="orthographicFront"/>
+      <a:lightRig rig="threePt" dir="t"/>
+    </dgm:scene3d>
+    <dgm:sp3d/>
+    <dgm:txPr/>
+    <dgm:style>
+      <a:lnRef idx="2">
+        <a:scrgbClr r="0" g="0" b="0"/>
+      </a:lnRef>
+      <a:fillRef idx="1">
+        <a:scrgbClr r="0" g="0" b="0"/>
+      </a:fillRef>
+      <a:effectRef idx="0">
+        <a:scrgbClr r="0" g="0" b="0"/>
+      </a:effectRef>
+      <a:fontRef idx="minor"/>
+    </dgm:style>
+  </dgm:styleLbl>
+  <dgm:styleLbl name="conFgAcc1">
+    <dgm:scene3d>
+      <a:camera prst="orthographicFront"/>
+      <a:lightRig rig="threePt" dir="t"/>
+    </dgm:scene3d>
+    <dgm:sp3d/>
+    <dgm:txPr/>
+    <dgm:style>
+      <a:lnRef idx="2">
+        <a:scrgbClr r="0" g="0" b="0"/>
+      </a:lnRef>
+      <a:fillRef idx="1">
+        <a:scrgbClr r="0" g="0" b="0"/>
+      </a:fillRef>
+      <a:effectRef idx="0">
+        <a:scrgbClr r="0" g="0" b="0"/>
+      </a:effectRef>
+      <a:fontRef idx="minor"/>
+    </dgm:style>
+  </dgm:styleLbl>
+  <dgm:styleLbl name="alignAcc1">
+    <dgm:scene3d>
+      <a:camera prst="orthographicFront"/>
+      <a:lightRig rig="threePt" dir="t"/>
+    </dgm:scene3d>
+    <dgm:sp3d/>
+    <dgm:txPr/>
+    <dgm:style>
+      <a:lnRef idx="2">
+        <a:scrgbClr r="0" g="0" b="0"/>
+      </a:lnRef>
+      <a:fillRef idx="1">
+        <a:scrgbClr r="0" g="0" b="0"/>
+      </a:fillRef>
+      <a:effectRef idx="0">
+        <a:scrgbClr r="0" g="0" b="0"/>
+      </a:effectRef>
+      <a:fontRef idx="minor"/>
+    </dgm:style>
+  </dgm:styleLbl>
+  <dgm:styleLbl name="trAlignAcc1">
+    <dgm:scene3d>
+      <a:camera prst="orthographicFront"/>
+      <a:lightRig rig="threePt" dir="t"/>
+    </dgm:scene3d>
+    <dgm:sp3d/>
+    <dgm:txPr/>
+    <dgm:style>
+      <a:lnRef idx="1">
+        <a:scrgbClr r="0" g="0" b="0"/>
+      </a:lnRef>
+      <a:fillRef idx="1">
+        <a:scrgbClr r="0" g="0" b="0"/>
+      </a:fillRef>
+      <a:effectRef idx="0">
+        <a:scrgbClr r="0" g="0" b="0"/>
+      </a:effectRef>
+      <a:fontRef idx="minor"/>
+    </dgm:style>
+  </dgm:styleLbl>
+  <dgm:styleLbl name="bgAcc1">
+    <dgm:scene3d>
+      <a:camera prst="orthographicFront"/>
+      <a:lightRig rig="threePt" dir="t"/>
+    </dgm:scene3d>
+    <dgm:sp3d/>
+    <dgm:txPr/>
+    <dgm:style>
+      <a:lnRef idx="2">
+        <a:scrgbClr r="0" g="0" b="0"/>
+      </a:lnRef>
+      <a:fillRef idx="1">
+        <a:scrgbClr r="0" g="0" b="0"/>
+      </a:fillRef>
+      <a:effectRef idx="0">
+        <a:scrgbClr r="0" g="0" b="0"/>
+      </a:effectRef>
+      <a:fontRef idx="minor"/>
+    </dgm:style>
+  </dgm:styleLbl>
+  <dgm:styleLbl name="solidFgAcc1">
+    <dgm:scene3d>
+      <a:camera prst="orthographicFront"/>
+      <a:lightRig rig="threePt" dir="t"/>
+    </dgm:scene3d>
+    <dgm:sp3d/>
+    <dgm:txPr/>
+    <dgm:style>
+      <a:lnRef idx="2">
+        <a:scrgbClr r="0" g="0" b="0"/>
+      </a:lnRef>
+      <a:fillRef idx="1">
+        <a:scrgbClr r="0" g="0" b="0"/>
+      </a:fillRef>
+      <a:effectRef idx="0">
+        <a:scrgbClr r="0" g="0" b="0"/>
+      </a:effectRef>
+      <a:fontRef idx="minor"/>
+    </dgm:style>
+  </dgm:styleLbl>
+  <dgm:styleLbl name="solidAlignAcc1">
+    <dgm:scene3d>
+      <a:camera prst="orthographicFront"/>
+      <a:lightRig rig="threePt" dir="t"/>
+    </dgm:scene3d>
+    <dgm:sp3d/>
+    <dgm:txPr/>
+    <dgm:style>
+      <a:lnRef idx="2">
+        <a:scrgbClr r="0" g="0" b="0"/>
+      </a:lnRef>
+      <a:fillRef idx="1">
+        <a:scrgbClr r="0" g="0" b="0"/>
+      </a:fillRef>
+      <a:effectRef idx="0">
+        <a:scrgbClr r="0" g="0" b="0"/>
+      </a:effectRef>
+      <a:fontRef idx="minor"/>
+    </dgm:style>
+  </dgm:styleLbl>
+  <dgm:styleLbl name="solidBgAcc1">
+    <dgm:scene3d>
+      <a:camera prst="orthographicFront"/>
+      <a:lightRig rig="threePt" dir="t"/>
+    </dgm:scene3d>
+    <dgm:sp3d/>
+    <dgm:txPr/>
+    <dgm:style>
+      <a:lnRef idx="2">
+        <a:scrgbClr r="0" g="0" b="0"/>
+      </a:lnRef>
+      <a:fillRef idx="1">
+        <a:scrgbClr r="0" g="0" b="0"/>
+      </a:fillRef>
+      <a:effectRef idx="0">
+        <a:scrgbClr r="0" g="0" b="0"/>
+      </a:effectRef>
+      <a:fontRef idx="minor"/>
+    </dgm:style>
+  </dgm:styleLbl>
+  <dgm:styleLbl name="fgAccFollowNode1">
+    <dgm:scene3d>
+      <a:camera prst="orthographicFront"/>
+      <a:lightRig rig="threePt" dir="t"/>
+    </dgm:scene3d>
+    <dgm:sp3d/>
+    <dgm:txPr/>
+    <dgm:style>
+      <a:lnRef idx="2">
+        <a:scrgbClr r="0" g="0" b="0"/>
+      </a:lnRef>
+      <a:fillRef idx="1">
+        <a:scrgbClr r="0" g="0" b="0"/>
+      </a:fillRef>
+      <a:effectRef idx="0">
+        <a:scrgbClr r="0" g="0" b="0"/>
+      </a:effectRef>
+      <a:fontRef idx="minor"/>
+    </dgm:style>
+  </dgm:styleLbl>
+  <dgm:styleLbl name="alignAccFollowNode1">
+    <dgm:scene3d>
+      <a:camera prst="orthographicFront"/>
+      <a:lightRig rig="threePt" dir="t"/>
+    </dgm:scene3d>
+    <dgm:sp3d/>
+    <dgm:txPr/>
+    <dgm:style>
+      <a:lnRef idx="2">
+        <a:scrgbClr r="0" g="0" b="0"/>
+      </a:lnRef>
+      <a:fillRef idx="1">
+        <a:scrgbClr r="0" g="0" b="0"/>
+      </a:fillRef>
+      <a:effectRef idx="0">
+        <a:scrgbClr r="0" g="0" b="0"/>
+      </a:effectRef>
+      <a:fontRef idx="minor"/>
+    </dgm:style>
+  </dgm:styleLbl>
+  <dgm:styleLbl name="bgAccFollowNode1">
+    <dgm:scene3d>
+      <a:camera prst="orthographicFront"/>
+      <a:lightRig rig="threePt" dir="t"/>
+    </dgm:scene3d>
+    <dgm:sp3d/>
+    <dgm:txPr/>
+    <dgm:style>
+      <a:lnRef idx="2">
+        <a:scrgbClr r="0" g="0" b="0"/>
+      </a:lnRef>
+      <a:fillRef idx="1">
+        <a:scrgbClr r="0" g="0" b="0"/>
+      </a:fillRef>
+      <a:effectRef idx="0">
+        <a:scrgbClr r="0" g="0" b="0"/>
+      </a:effectRef>
+      <a:fontRef idx="minor"/>
+    </dgm:style>
+  </dgm:styleLbl>
+  <dgm:styleLbl name="fgAcc0">
+    <dgm:scene3d>
+      <a:camera prst="orthographicFront"/>
+      <a:lightRig rig="threePt" dir="t"/>
+    </dgm:scene3d>
+    <dgm:sp3d/>
+    <dgm:txPr/>
+    <dgm:style>
+      <a:lnRef idx="2">
+        <a:scrgbClr r="0" g="0" b="0"/>
+      </a:lnRef>
+      <a:fillRef idx="1">
+        <a:scrgbClr r="0" g="0" b="0"/>
+      </a:fillRef>
+      <a:effectRef idx="0">
+        <a:scrgbClr r="0" g="0" b="0"/>
+      </a:effectRef>
+      <a:fontRef idx="minor"/>
+    </dgm:style>
+  </dgm:styleLbl>
+  <dgm:styleLbl name="fgAcc2">
+    <dgm:scene3d>
+      <a:camera prst="orthographicFront"/>
+      <a:lightRig rig="threePt" dir="t"/>
+    </dgm:scene3d>
+    <dgm:sp3d/>
+    <dgm:txPr/>
+    <dgm:style>
+      <a:lnRef idx="2">
+        <a:scrgbClr r="0" g="0" b="0"/>
+      </a:lnRef>
+      <a:fillRef idx="1">
+        <a:scrgbClr r="0" g="0" b="0"/>
+      </a:fillRef>
+      <a:effectRef idx="0">
+        <a:scrgbClr r="0" g="0" b="0"/>
+      </a:effectRef>
+      <a:fontRef idx="minor"/>
+    </dgm:style>
+  </dgm:styleLbl>
+  <dgm:styleLbl name="fgAcc3">
+    <dgm:scene3d>
+      <a:camera prst="orthographicFront"/>
+      <a:lightRig rig="threePt" dir="t"/>
+    </dgm:scene3d>
+    <dgm:sp3d/>
+    <dgm:txPr/>
+    <dgm:style>
+      <a:lnRef idx="2">
+        <a:scrgbClr r="0" g="0" b="0"/>
+      </a:lnRef>
+      <a:fillRef idx="1">
+        <a:scrgbClr r="0" g="0" b="0"/>
+      </a:fillRef>
+      <a:effectRef idx="0">
+        <a:scrgbClr r="0" g="0" b="0"/>
+      </a:effectRef>
+      <a:fontRef idx="minor"/>
+    </dgm:style>
+  </dgm:styleLbl>
+  <dgm:styleLbl name="fgAcc4">
+    <dgm:scene3d>
+      <a:camera prst="orthographicFront"/>
+      <a:lightRig rig="threePt" dir="t"/>
+    </dgm:scene3d>
+    <dgm:sp3d/>
+    <dgm:txPr/>
+    <dgm:style>
+      <a:lnRef idx="2">
+        <a:scrgbClr r="0" g="0" b="0"/>
+      </a:lnRef>
+      <a:fillRef idx="1">
+        <a:scrgbClr r="0" g="0" b="0"/>
+      </a:fillRef>
+      <a:effectRef idx="0">
+        <a:scrgbClr r="0" g="0" b="0"/>
+      </a:effectRef>
+      <a:fontRef idx="minor"/>
+    </dgm:style>
+  </dgm:styleLbl>
+  <dgm:styleLbl name="bgShp">
+    <dgm:scene3d>
+      <a:camera prst="orthographicFront"/>
+      <a:lightRig rig="threePt" dir="t"/>
+    </dgm:scene3d>
+    <dgm:sp3d/>
+    <dgm:txPr/>
+    <dgm:style>
+      <a:lnRef idx="0">
+        <a:scrgbClr r="0" g="0" b="0"/>
+      </a:lnRef>
+      <a:fillRef idx="1">
+        <a:scrgbClr r="0" g="0" b="0"/>
+      </a:fillRef>
+      <a:effectRef idx="0">
+        <a:scrgbClr r="0" g="0" b="0"/>
+      </a:effectRef>
+      <a:fontRef idx="minor"/>
+    </dgm:style>
+  </dgm:styleLbl>
+  <dgm:styleLbl name="dkBgShp">
+    <dgm:scene3d>
+      <a:camera prst="orthographicFront"/>
+      <a:lightRig rig="threePt" dir="t"/>
+    </dgm:scene3d>
+    <dgm:sp3d/>
+    <dgm:txPr/>
+    <dgm:style>
+      <a:lnRef idx="0">
+        <a:scrgbClr r="0" g="0" b="0"/>
+      </a:lnRef>
+      <a:fillRef idx="1">
+        <a:scrgbClr r="0" g="0" b="0"/>
+      </a:fillRef>
+      <a:effectRef idx="0">
+        <a:scrgbClr r="0" g="0" b="0"/>
+      </a:effectRef>
+      <a:fontRef idx="minor"/>
+    </dgm:style>
+  </dgm:styleLbl>
+  <dgm:styleLbl name="trBgShp">
+    <dgm:scene3d>
+      <a:camera prst="orthographicFront"/>
+      <a:lightRig rig="threePt" dir="t"/>
+    </dgm:scene3d>
+    <dgm:sp3d/>
+    <dgm:txPr/>
+    <dgm:style>
+      <a:lnRef idx="0">
+        <a:scrgbClr r="0" g="0" b="0"/>
+      </a:lnRef>
+      <a:fillRef idx="1">
+        <a:scrgbClr r="0" g="0" b="0"/>
+      </a:fillRef>
+      <a:effectRef idx="0">
+        <a:scrgbClr r="0" g="0" b="0"/>
+      </a:effectRef>
+      <a:fontRef idx="minor"/>
+    </dgm:style>
+  </dgm:styleLbl>
+  <dgm:styleLbl name="fgShp">
+    <dgm:scene3d>
+      <a:camera prst="orthographicFront"/>
+      <a:lightRig rig="threePt" dir="t"/>
+    </dgm:scene3d>
+    <dgm:sp3d/>
+    <dgm:txPr/>
+    <dgm:style>
+      <a:lnRef idx="2">
+        <a:scrgbClr r="0" g="0" b="0"/>
+      </a:lnRef>
+      <a:fillRef idx="1">
+        <a:scrgbClr r="0" g="0" b="0"/>
+      </a:fillRef>
+      <a:effectRef idx="0">
+        <a:scrgbClr r="0" g="0" b="0"/>
+      </a:effectRef>
+      <a:fontRef idx="minor"/>
+    </dgm:style>
+  </dgm:styleLbl>
+  <dgm:styleLbl name="revTx">
+    <dgm:scene3d>
+      <a:camera prst="orthographicFront"/>
+      <a:lightRig rig="threePt" dir="t"/>
+    </dgm:scene3d>
+    <dgm:sp3d/>
+    <dgm:txPr/>
+    <dgm:style>
+      <a:lnRef idx="0">
+        <a:scrgbClr r="0" g="0" b="0"/>
+      </a:lnRef>
+      <a:fillRef idx="0">
+        <a:scrgbClr r="0" g="0" b="0"/>
+      </a:fillRef>
+      <a:effectRef idx="0">
+        <a:scrgbClr r="0" g="0" b="0"/>
+      </a:effectRef>
+      <a:fontRef idx="minor"/>
+    </dgm:style>
+  </dgm:styleLbl>
+</dgm:styleDef>
+</file>
+
+<file path=ppt/notesMasters/notesMaster1.xml><?xml version="1.0" encoding="utf-8"?>
+<p:notesMaster xmlns:a="http://schemas.openxmlformats.org/drawingml/2006/main" xmlns:r="http://schemas.openxmlformats.org/officeDocument/2006/relationships" xmlns:p="http://schemas.openxmlformats.org/presentationml/2006/main">
+  <p:cSld>
+    <p:bg>
+      <p:bgRef idx="1001">
+        <a:schemeClr val="bg1"/>
+      </p:bgRef>
+    </p:bg>
+    <p:spTree>
+      <p:nvGrpSpPr>
+        <p:cNvPr id="1" name=""/>
+        <p:cNvGrpSpPr/>
+        <p:nvPr/>
+      </p:nvGrpSpPr>
+      <p:grpSpPr>
+        <a:xfrm>
+          <a:off x="0" y="0"/>
+          <a:ext cx="0" cy="0"/>
+          <a:chOff x="0" y="0"/>
+          <a:chExt cx="0" cy="0"/>
+        </a:xfrm>
+      </p:grpSpPr>
+      <p:sp>
+        <p:nvSpPr>
+          <p:cNvPr id="2" name="Header Placeholder 1"/>
+          <p:cNvSpPr>
+            <a:spLocks noGrp="1"/>
+          </p:cNvSpPr>
+          <p:nvPr>
+            <p:ph type="hdr" sz="quarter"/>
+          </p:nvPr>
+        </p:nvSpPr>
+        <p:spPr>
+          <a:xfrm>
+            <a:off x="0" y="0"/>
+            <a:ext cx="2971800" cy="457200"/>
+          </a:xfrm>
+          <a:prstGeom prst="rect">
+            <a:avLst/>
+          </a:prstGeom>
+        </p:spPr>
+        <p:txBody>
+          <a:bodyPr vert="horz" lIns="91440" tIns="45720" rIns="91440" bIns="45720" rtlCol="0"/>
+          <a:lstStyle>
+            <a:lvl1pPr algn="l">
+              <a:defRPr sz="1200"/>
+            </a:lvl1pPr>
+          </a:lstStyle>
+          <a:p>
+            <a:endParaRPr lang="en-US"/>
+          </a:p>
+        </p:txBody>
+      </p:sp>
+      <p:sp>
+        <p:nvSpPr>
+          <p:cNvPr id="3" name="Date Placeholder 2"/>
+          <p:cNvSpPr>
+            <a:spLocks noGrp="1"/>
+          </p:cNvSpPr>
+          <p:nvPr>
+            <p:ph type="dt" idx="1"/>
+          </p:nvPr>
+        </p:nvSpPr>
+        <p:spPr>
+          <a:xfrm>
+            <a:off x="3884613" y="0"/>
+            <a:ext cx="2971800" cy="457200"/>
+          </a:xfrm>
+          <a:prstGeom prst="rect">
+            <a:avLst/>
+          </a:prstGeom>
+        </p:spPr>
+        <p:txBody>
+          <a:bodyPr vert="horz" lIns="91440" tIns="45720" rIns="91440" bIns="45720" rtlCol="0"/>
+          <a:lstStyle>
+            <a:lvl1pPr algn="r">
+              <a:defRPr sz="1200"/>
+            </a:lvl1pPr>
+          </a:lstStyle>
+          <a:p>
+            <a:fld id="{8C2FA42F-58F7-C04C-A0D0-B4D2E2FE1C8B}" type="datetimeFigureOut">
+              <a:rPr lang="en-US" smtClean="0"/>
+              <a:t>3/31/13</a:t>
+            </a:fld>
+            <a:endParaRPr lang="en-US"/>
+          </a:p>
+        </p:txBody>
+      </p:sp>
+      <p:sp>
+        <p:nvSpPr>
+          <p:cNvPr id="4" name="Slide Image Placeholder 3"/>
+          <p:cNvSpPr>
+            <a:spLocks noGrp="1" noRot="1" noChangeAspect="1"/>
+          </p:cNvSpPr>
+          <p:nvPr>
+            <p:ph type="sldImg" idx="2"/>
+          </p:nvPr>
+        </p:nvSpPr>
+        <p:spPr>
+          <a:xfrm>
+            <a:off x="1143000" y="685800"/>
+            <a:ext cx="4572000" cy="3429000"/>
+          </a:xfrm>
+          <a:prstGeom prst="rect">
+            <a:avLst/>
+          </a:prstGeom>
+          <a:noFill/>
+          <a:ln w="12700">
+            <a:solidFill>
+              <a:prstClr val="black"/>
+            </a:solidFill>
+          </a:ln>
+        </p:spPr>
+        <p:txBody>
+          <a:bodyPr vert="horz" lIns="91440" tIns="45720" rIns="91440" bIns="45720" rtlCol="0" anchor="ctr"/>
+          <a:lstStyle/>
+          <a:p>
+            <a:endParaRPr lang="en-US"/>
+          </a:p>
+        </p:txBody>
+      </p:sp>
+      <p:sp>
+        <p:nvSpPr>
+          <p:cNvPr id="5" name="Notes Placeholder 4"/>
+          <p:cNvSpPr>
+            <a:spLocks noGrp="1"/>
+          </p:cNvSpPr>
+          <p:nvPr>
+            <p:ph type="body" sz="quarter" idx="3"/>
+          </p:nvPr>
+        </p:nvSpPr>
+        <p:spPr>
+          <a:xfrm>
+            <a:off x="685800" y="4343400"/>
+            <a:ext cx="5486400" cy="4114800"/>
+          </a:xfrm>
+          <a:prstGeom prst="rect">
+            <a:avLst/>
+          </a:prstGeom>
+        </p:spPr>
+        <p:txBody>
+          <a:bodyPr vert="horz" lIns="91440" tIns="45720" rIns="91440" bIns="45720" rtlCol="0"/>
+          <a:lstStyle/>
+          <a:p>
+            <a:pPr lvl="0"/>
+            <a:r>
+              <a:rPr lang="en-US" smtClean="0"/>
+              <a:t>Click to edit Master text styles</a:t>
+            </a:r>
+          </a:p>
+          <a:p>
+            <a:pPr lvl="1"/>
+            <a:r>
+              <a:rPr lang="en-US" smtClean="0"/>
+              <a:t>Second level</a:t>
+            </a:r>
+          </a:p>
+          <a:p>
+            <a:pPr lvl="2"/>
+            <a:r>
+              <a:rPr lang="en-US" smtClean="0"/>
+              <a:t>Third level</a:t>
+            </a:r>
+          </a:p>
+          <a:p>
+            <a:pPr lvl="3"/>
+            <a:r>
+              <a:rPr lang="en-US" smtClean="0"/>
+              <a:t>Fourth level</a:t>
+            </a:r>
+          </a:p>
+          <a:p>
+            <a:pPr lvl="4"/>
+            <a:r>
+              <a:rPr lang="en-US" smtClean="0"/>
+              <a:t>Fifth level</a:t>
+            </a:r>
+            <a:endParaRPr lang="en-US"/>
+          </a:p>
+        </p:txBody>
+      </p:sp>
+      <p:sp>
+        <p:nvSpPr>
+          <p:cNvPr id="6" name="Footer Placeholder 5"/>
+          <p:cNvSpPr>
+            <a:spLocks noGrp="1"/>
+          </p:cNvSpPr>
+          <p:nvPr>
+            <p:ph type="ftr" sz="quarter" idx="4"/>
+          </p:nvPr>
+        </p:nvSpPr>
+        <p:spPr>
+          <a:xfrm>
+            <a:off x="0" y="8685213"/>
+            <a:ext cx="2971800" cy="457200"/>
+          </a:xfrm>
+          <a:prstGeom prst="rect">
+            <a:avLst/>
+          </a:prstGeom>
+        </p:spPr>
+        <p:txBody>
+          <a:bodyPr vert="horz" lIns="91440" tIns="45720" rIns="91440" bIns="45720" rtlCol="0" anchor="b"/>
+          <a:lstStyle>
+            <a:lvl1pPr algn="l">
+              <a:defRPr sz="1200"/>
+            </a:lvl1pPr>
+          </a:lstStyle>
+          <a:p>
+            <a:endParaRPr lang="en-US"/>
+          </a:p>
+        </p:txBody>
+      </p:sp>
+      <p:sp>
+        <p:nvSpPr>
+          <p:cNvPr id="7" name="Slide Number Placeholder 6"/>
+          <p:cNvSpPr>
+            <a:spLocks noGrp="1"/>
+          </p:cNvSpPr>
+          <p:nvPr>
+            <p:ph type="sldNum" sz="quarter" idx="5"/>
+          </p:nvPr>
+        </p:nvSpPr>
+        <p:spPr>
+          <a:xfrm>
+            <a:off x="3884613" y="8685213"/>
+            <a:ext cx="2971800" cy="457200"/>
+          </a:xfrm>
+          <a:prstGeom prst="rect">
+            <a:avLst/>
+          </a:prstGeom>
+        </p:spPr>
+        <p:txBody>
+          <a:bodyPr vert="horz" lIns="91440" tIns="45720" rIns="91440" bIns="45720" rtlCol="0" anchor="b"/>
+          <a:lstStyle>
+            <a:lvl1pPr algn="r">
+              <a:defRPr sz="1200"/>
+            </a:lvl1pPr>
+          </a:lstStyle>
+          <a:p>
+            <a:fld id="{43B5DB9D-A7B1-EF44-A3C9-3AE8688914BD}" type="slidenum">
+              <a:rPr lang="en-US" smtClean="0"/>
+              <a:t>‹#›</a:t>
+            </a:fld>
+            <a:endParaRPr lang="en-US"/>
+          </a:p>
+        </p:txBody>
+      </p:sp>
+    </p:spTree>
+    <p:extLst>
+      <p:ext uri="{BB962C8B-B14F-4D97-AF65-F5344CB8AC3E}">
+        <p14:creationId xmlns:p14="http://schemas.microsoft.com/office/powerpoint/2010/main" val="1863249061"/>
+      </p:ext>
+    </p:extLst>
+  </p:cSld>
+  <p:clrMap bg1="lt1" tx1="dk1" bg2="lt2" tx2="dk2" accent1="accent1" accent2="accent2" accent3="accent3" accent4="accent4" accent5="accent5" accent6="accent6" hlink="hlink" folHlink="folHlink"/>
+  <p:notesStyle>
+    <a:lvl1pPr marL="0" algn="l" defTabSz="457200" rtl="0" eaLnBrk="1" latinLnBrk="0" hangingPunct="1">
+      <a:defRPr sz="1200" kern="1200">
+        <a:solidFill>
+          <a:schemeClr val="tx1"/>
+        </a:solidFill>
+        <a:latin typeface="+mn-lt"/>
+        <a:ea typeface="+mn-ea"/>
+        <a:cs typeface="+mn-cs"/>
+      </a:defRPr>
+    </a:lvl1pPr>
+    <a:lvl2pPr marL="457200" algn="l" defTabSz="457200" rtl="0" eaLnBrk="1" latinLnBrk="0" hangingPunct="1">
+      <a:defRPr sz="1200" kern="1200">
+        <a:solidFill>
+          <a:schemeClr val="tx1"/>
+        </a:solidFill>
+        <a:latin typeface="+mn-lt"/>
+        <a:ea typeface="+mn-ea"/>
+        <a:cs typeface="+mn-cs"/>
+      </a:defRPr>
+    </a:lvl2pPr>
+    <a:lvl3pPr marL="914400" algn="l" defTabSz="457200" rtl="0" eaLnBrk="1" latinLnBrk="0" hangingPunct="1">
+      <a:defRPr sz="1200" kern="1200">
+        <a:solidFill>
+          <a:schemeClr val="tx1"/>
+        </a:solidFill>
+        <a:latin typeface="+mn-lt"/>
+        <a:ea typeface="+mn-ea"/>
+        <a:cs typeface="+mn-cs"/>
+      </a:defRPr>
+    </a:lvl3pPr>
+    <a:lvl4pPr marL="1371600" algn="l" defTabSz="457200" rtl="0" eaLnBrk="1" latinLnBrk="0" hangingPunct="1">
+      <a:defRPr sz="1200" kern="1200">
+        <a:solidFill>
+          <a:schemeClr val="tx1"/>
+        </a:solidFill>
+        <a:latin typeface="+mn-lt"/>
+        <a:ea typeface="+mn-ea"/>
+        <a:cs typeface="+mn-cs"/>
+      </a:defRPr>
+    </a:lvl4pPr>
+    <a:lvl5pPr marL="1828800" algn="l" defTabSz="457200" rtl="0" eaLnBrk="1" latinLnBrk="0" hangingPunct="1">
+      <a:defRPr sz="1200" kern="1200">
+        <a:solidFill>
+          <a:schemeClr val="tx1"/>
+        </a:solidFill>
+        <a:latin typeface="+mn-lt"/>
+        <a:ea typeface="+mn-ea"/>
+        <a:cs typeface="+mn-cs"/>
+      </a:defRPr>
+    </a:lvl5pPr>
+    <a:lvl6pPr marL="2286000" algn="l" defTabSz="457200" rtl="0" eaLnBrk="1" latinLnBrk="0" hangingPunct="1">
+      <a:defRPr sz="1200" kern="1200">
+        <a:solidFill>
+          <a:schemeClr val="tx1"/>
+        </a:solidFill>
+        <a:latin typeface="+mn-lt"/>
+        <a:ea typeface="+mn-ea"/>
+        <a:cs typeface="+mn-cs"/>
+      </a:defRPr>
+    </a:lvl6pPr>
+    <a:lvl7pPr marL="2743200" algn="l" defTabSz="457200" rtl="0" eaLnBrk="1" latinLnBrk="0" hangingPunct="1">
+      <a:defRPr sz="1200" kern="1200">
+        <a:solidFill>
+          <a:schemeClr val="tx1"/>
+        </a:solidFill>
+        <a:latin typeface="+mn-lt"/>
+        <a:ea typeface="+mn-ea"/>
+        <a:cs typeface="+mn-cs"/>
+      </a:defRPr>
+    </a:lvl7pPr>
+    <a:lvl8pPr marL="3200400" algn="l" defTabSz="457200" rtl="0" eaLnBrk="1" latinLnBrk="0" hangingPunct="1">
+      <a:defRPr sz="1200" kern="1200">
+        <a:solidFill>
+          <a:schemeClr val="tx1"/>
+        </a:solidFill>
+        <a:latin typeface="+mn-lt"/>
+        <a:ea typeface="+mn-ea"/>
+        <a:cs typeface="+mn-cs"/>
+      </a:defRPr>
+    </a:lvl8pPr>
+    <a:lvl9pPr marL="3657600" algn="l" defTabSz="457200" rtl="0" eaLnBrk="1" latinLnBrk="0" hangingPunct="1">
+      <a:defRPr sz="1200" kern="1200">
+        <a:solidFill>
+          <a:schemeClr val="tx1"/>
+        </a:solidFill>
+        <a:latin typeface="+mn-lt"/>
+        <a:ea typeface="+mn-ea"/>
+        <a:cs typeface="+mn-cs"/>
+      </a:defRPr>
+    </a:lvl9pPr>
+  </p:notesStyle>
+</p:notesMaster>
+</file>
+
+<file path=ppt/notesSlides/notesSlide1.xml><?xml version="1.0" encoding="utf-8"?>
+<p:notes xmlns:a="http://schemas.openxmlformats.org/drawingml/2006/main" xmlns:r="http://schemas.openxmlformats.org/officeDocument/2006/relationships" xmlns:p="http://schemas.openxmlformats.org/presentationml/2006/main">
+  <p:cSld>
+    <p:spTree>
+      <p:nvGrpSpPr>
+        <p:cNvPr id="1" name=""/>
+        <p:cNvGrpSpPr/>
+        <p:nvPr/>
+      </p:nvGrpSpPr>
+      <p:grpSpPr>
+        <a:xfrm>
+          <a:off x="0" y="0"/>
+          <a:ext cx="0" cy="0"/>
+          <a:chOff x="0" y="0"/>
+          <a:chExt cx="0" cy="0"/>
+        </a:xfrm>
+      </p:grpSpPr>
+      <p:sp>
+        <p:nvSpPr>
+          <p:cNvPr id="2" name="Slide Image Placeholder 1"/>
+          <p:cNvSpPr>
+            <a:spLocks noGrp="1" noRot="1" noChangeAspect="1"/>
+          </p:cNvSpPr>
+          <p:nvPr>
+            <p:ph type="sldImg"/>
+          </p:nvPr>
+        </p:nvSpPr>
+        <p:spPr/>
+      </p:sp>
+      <p:sp>
+        <p:nvSpPr>
+          <p:cNvPr id="3" name="Notes Placeholder 2"/>
+          <p:cNvSpPr>
+            <a:spLocks noGrp="1"/>
+          </p:cNvSpPr>
+          <p:nvPr>
+            <p:ph type="body" idx="1"/>
+          </p:nvPr>
+        </p:nvSpPr>
+        <p:spPr/>
+        <p:txBody>
+          <a:bodyPr/>
+          <a:lstStyle/>
+          <a:p>
+            <a:r>
+              <a:rPr lang="en-US" dirty="0" smtClean="0"/>
+              <a:t>Recommendations</a:t>
+            </a:r>
+            <a:r>
+              <a:rPr lang="en-US" baseline="0" dirty="0" smtClean="0"/>
+              <a:t> &amp; Next Steps included here</a:t>
+            </a:r>
+            <a:endParaRPr lang="en-US" dirty="0"/>
+          </a:p>
+        </p:txBody>
+      </p:sp>
+      <p:sp>
+        <p:nvSpPr>
+          <p:cNvPr id="4" name="Slide Number Placeholder 3"/>
+          <p:cNvSpPr>
+            <a:spLocks noGrp="1"/>
+          </p:cNvSpPr>
+          <p:nvPr>
+            <p:ph type="sldNum" sz="quarter" idx="10"/>
+          </p:nvPr>
+        </p:nvSpPr>
+        <p:spPr/>
+        <p:txBody>
+          <a:bodyPr/>
+          <a:lstStyle/>
+          <a:p>
+            <a:fld id="{43B5DB9D-A7B1-EF44-A3C9-3AE8688914BD}" type="slidenum">
+              <a:rPr lang="en-US" smtClean="0"/>
+              <a:t>9</a:t>
+            </a:fld>
+            <a:endParaRPr lang="en-US"/>
+          </a:p>
+        </p:txBody>
+      </p:sp>
+    </p:spTree>
+    <p:extLst>
+      <p:ext uri="{BB962C8B-B14F-4D97-AF65-F5344CB8AC3E}">
+        <p14:creationId xmlns:p14="http://schemas.microsoft.com/office/powerpoint/2010/main" val="3014690503"/>
+      </p:ext>
+    </p:extLst>
+  </p:cSld>
+  <p:clrMapOvr>
+    <a:masterClrMapping/>
+  </p:clrMapOvr>
+</p:notes>
 </file>
 
 <file path=ppt/slideLayouts/slideLayout1.xml><?xml version="1.0" encoding="utf-8"?>
@@ -25206,98 +28428,7 @@
           <a:p>
             <a:r>
               <a:rPr lang="en-US" dirty="0" smtClean="0"/>
-              <a:t>Recommendations &amp; Next Steps</a:t>
-            </a:r>
-            <a:endParaRPr lang="en-US" dirty="0"/>
-          </a:p>
-        </p:txBody>
-      </p:sp>
-      <p:sp>
-        <p:nvSpPr>
-          <p:cNvPr id="3" name="Content Placeholder 2"/>
-          <p:cNvSpPr>
-            <a:spLocks noGrp="1"/>
-          </p:cNvSpPr>
-          <p:nvPr>
-            <p:ph sz="half" idx="1"/>
-          </p:nvPr>
-        </p:nvSpPr>
-        <p:spPr/>
-        <p:txBody>
-          <a:bodyPr/>
-          <a:lstStyle/>
-          <a:p>
-            <a:endParaRPr lang="en-US"/>
-          </a:p>
-        </p:txBody>
-      </p:sp>
-      <p:sp>
-        <p:nvSpPr>
-          <p:cNvPr id="4" name="Content Placeholder 3"/>
-          <p:cNvSpPr>
-            <a:spLocks noGrp="1"/>
-          </p:cNvSpPr>
-          <p:nvPr>
-            <p:ph sz="half" idx="2"/>
-          </p:nvPr>
-        </p:nvSpPr>
-        <p:spPr/>
-        <p:txBody>
-          <a:bodyPr/>
-          <a:lstStyle/>
-          <a:p>
-            <a:endParaRPr lang="en-US"/>
-          </a:p>
-        </p:txBody>
-      </p:sp>
-    </p:spTree>
-    <p:extLst>
-      <p:ext uri="{BB962C8B-B14F-4D97-AF65-F5344CB8AC3E}">
-        <p14:creationId xmlns:p14="http://schemas.microsoft.com/office/powerpoint/2010/main" val="3625280664"/>
-      </p:ext>
-    </p:extLst>
-  </p:cSld>
-  <p:clrMapOvr>
-    <a:masterClrMapping/>
-  </p:clrMapOvr>
-</p:sld>
-</file>
-
-<file path=ppt/slides/slide11.xml><?xml version="1.0" encoding="utf-8"?>
-<p:sld xmlns:a="http://schemas.openxmlformats.org/drawingml/2006/main" xmlns:r="http://schemas.openxmlformats.org/officeDocument/2006/relationships" xmlns:p="http://schemas.openxmlformats.org/presentationml/2006/main">
-  <p:cSld>
-    <p:spTree>
-      <p:nvGrpSpPr>
-        <p:cNvPr id="1" name=""/>
-        <p:cNvGrpSpPr/>
-        <p:nvPr/>
-      </p:nvGrpSpPr>
-      <p:grpSpPr>
-        <a:xfrm>
-          <a:off x="0" y="0"/>
-          <a:ext cx="0" cy="0"/>
-          <a:chOff x="0" y="0"/>
-          <a:chExt cx="0" cy="0"/>
-        </a:xfrm>
-      </p:grpSpPr>
-      <p:sp>
-        <p:nvSpPr>
-          <p:cNvPr id="2" name="Title 1"/>
-          <p:cNvSpPr>
-            <a:spLocks noGrp="1"/>
-          </p:cNvSpPr>
-          <p:nvPr>
-            <p:ph type="title"/>
-          </p:nvPr>
-        </p:nvSpPr>
-        <p:spPr/>
-        <p:txBody>
-          <a:bodyPr/>
-          <a:lstStyle/>
-          <a:p>
-            <a:r>
-              <a:rPr lang="en-US" dirty="0" smtClean="0"/>
-              <a:t>Questions?</a:t>
+              <a:t> Additional Questions?</a:t>
             </a:r>
             <a:endParaRPr lang="en-US" dirty="0"/>
           </a:p>
@@ -25413,6 +28544,30 @@
           </a:p>
         </p:txBody>
       </p:sp>
+      <p:pic>
+        <p:nvPicPr>
+          <p:cNvPr id="4" name="Picture 3"/>
+          <p:cNvPicPr>
+            <a:picLocks noChangeAspect="1"/>
+          </p:cNvPicPr>
+          <p:nvPr/>
+        </p:nvPicPr>
+        <p:blipFill>
+          <a:blip r:embed="rId2"/>
+          <a:stretch>
+            <a:fillRect/>
+          </a:stretch>
+        </p:blipFill>
+        <p:spPr>
+          <a:xfrm>
+            <a:off x="7054704" y="176875"/>
+            <a:ext cx="1700481" cy="537352"/>
+          </a:xfrm>
+          <a:prstGeom prst="rect">
+            <a:avLst/>
+          </a:prstGeom>
+        </p:spPr>
+      </p:pic>
     </p:spTree>
     <p:extLst>
       <p:ext uri="{BB962C8B-B14F-4D97-AF65-F5344CB8AC3E}">
@@ -27039,13 +30194,13 @@
           <p:nvPr>
             <p:extLst>
               <p:ext uri="{D42A27DB-BD31-4B8C-83A1-F6EECF244321}">
-                <p14:modId xmlns:p14="http://schemas.microsoft.com/office/powerpoint/2010/main" val="2804552608"/>
+                <p14:modId xmlns:p14="http://schemas.microsoft.com/office/powerpoint/2010/main" val="479894499"/>
               </p:ext>
             </p:extLst>
           </p:nvPr>
         </p:nvGraphicFramePr>
         <p:xfrm>
-          <a:off x="268839" y="1701719"/>
+          <a:off x="268839" y="1655364"/>
           <a:ext cx="8557064" cy="2797202"/>
         </p:xfrm>
         <a:graphic>
@@ -27584,7 +30739,11 @@
             </a:r>
             <a:r>
               <a:rPr lang="en-US" sz="2000" dirty="0" smtClean="0"/>
-              <a:t>Management, &amp; Automatic Deployment </a:t>
+              <a:t>Management, &amp; </a:t>
+            </a:r>
+            <a:r>
+              <a:rPr lang="en-US" sz="2000" b="1" dirty="0" smtClean="0"/>
+              <a:t>Automatic Deployment </a:t>
             </a:r>
           </a:p>
           <a:p>
@@ -27601,6 +30760,12 @@
             <a:r>
               <a:rPr lang="en-US" sz="2000" dirty="0" smtClean="0"/>
               <a:t> Design</a:t>
+            </a:r>
+          </a:p>
+          <a:p>
+            <a:r>
+              <a:rPr lang="en-US" sz="2000" dirty="0" smtClean="0"/>
+              <a:t>242 Commits in 45 Man Days</a:t>
             </a:r>
           </a:p>
         </p:txBody>
@@ -27862,7 +31027,15 @@
           <a:p>
             <a:r>
               <a:rPr lang="en-US" sz="2000" dirty="0" smtClean="0"/>
-              <a:t>Cutting-edge Presentation Technologies (JavaScript)</a:t>
+              <a:t>Cutting-edge Presentation Technologies (</a:t>
+            </a:r>
+            <a:r>
+              <a:rPr lang="en-US" sz="2000" b="1" dirty="0" smtClean="0"/>
+              <a:t>JavaScript</a:t>
+            </a:r>
+            <a:r>
+              <a:rPr lang="en-US" sz="2000" dirty="0" smtClean="0"/>
+              <a:t>)</a:t>
             </a:r>
             <a:endParaRPr lang="en-US" sz="2000" b="1" dirty="0" smtClean="0"/>
           </a:p>
@@ -27874,11 +31047,11 @@
           </a:p>
           <a:p>
             <a:r>
-              <a:rPr lang="en-US" sz="2000" dirty="0" smtClean="0"/>
+              <a:rPr lang="en-US" sz="2000" b="1" dirty="0" smtClean="0"/>
               <a:t>Continuous Delivery </a:t>
             </a:r>
             <a:br>
-              <a:rPr lang="en-US" sz="2000" dirty="0" smtClean="0"/>
+              <a:rPr lang="en-US" sz="2000" b="1" dirty="0" smtClean="0"/>
             </a:br>
             <a:r>
               <a:rPr lang="en-US" sz="2000" i="1" dirty="0" smtClean="0">
@@ -27955,6 +31128,68 @@
           <a:chExt cx="0" cy="0"/>
         </a:xfrm>
       </p:grpSpPr>
+      <p:pic>
+        <p:nvPicPr>
+          <p:cNvPr id="13" name="Picture Placeholder 12"/>
+          <p:cNvPicPr>
+            <a:picLocks noGrp="1" noChangeAspect="1"/>
+          </p:cNvPicPr>
+          <p:nvPr>
+            <p:ph type="pic" sz="quarter" idx="13"/>
+          </p:nvPr>
+        </p:nvPicPr>
+        <p:blipFill>
+          <a:blip r:embed="rId3"/>
+          <a:srcRect l="-45562" r="-45562"/>
+          <a:stretch>
+            <a:fillRect/>
+          </a:stretch>
+        </p:blipFill>
+        <p:spPr>
+          <a:xfrm>
+            <a:off x="0" y="3241180"/>
+            <a:ext cx="6515381" cy="3325848"/>
+          </a:xfrm>
+        </p:spPr>
+      </p:pic>
+      <p:sp>
+        <p:nvSpPr>
+          <p:cNvPr id="15" name="Cloud Callout 14"/>
+          <p:cNvSpPr/>
+          <p:nvPr/>
+        </p:nvSpPr>
+        <p:spPr>
+          <a:xfrm rot="900000">
+            <a:off x="3912070" y="2346557"/>
+            <a:ext cx="3448554" cy="1696537"/>
+          </a:xfrm>
+          <a:prstGeom prst="cloudCallout">
+            <a:avLst/>
+          </a:prstGeom>
+        </p:spPr>
+        <p:style>
+          <a:lnRef idx="1">
+            <a:schemeClr val="accent1"/>
+          </a:lnRef>
+          <a:fillRef idx="3">
+            <a:schemeClr val="accent1"/>
+          </a:fillRef>
+          <a:effectRef idx="2">
+            <a:schemeClr val="accent1"/>
+          </a:effectRef>
+          <a:fontRef idx="minor">
+            <a:schemeClr val="lt1"/>
+          </a:fontRef>
+        </p:style>
+        <p:txBody>
+          <a:bodyPr rtlCol="0" anchor="ctr"/>
+          <a:lstStyle/>
+          <a:p>
+            <a:pPr algn="ctr"/>
+            <a:endParaRPr lang="en-US"/>
+          </a:p>
+        </p:txBody>
+      </p:sp>
       <p:sp>
         <p:nvSpPr>
           <p:cNvPr id="5" name="Subtitle 4"/>
@@ -28013,30 +31248,28 @@
           </a:p>
         </p:txBody>
       </p:sp>
-      <p:pic>
-        <p:nvPicPr>
-          <p:cNvPr id="13" name="Picture Placeholder 12"/>
-          <p:cNvPicPr>
-            <a:picLocks noGrp="1" noChangeAspect="1"/>
-          </p:cNvPicPr>
+      <p:graphicFrame>
+        <p:nvGraphicFramePr>
+          <p:cNvPr id="14" name="Diagram 13"/>
+          <p:cNvGraphicFramePr/>
           <p:nvPr>
-            <p:ph type="pic" sz="quarter" idx="13"/>
+            <p:extLst>
+              <p:ext uri="{D42A27DB-BD31-4B8C-83A1-F6EECF244321}">
+                <p14:modId xmlns:p14="http://schemas.microsoft.com/office/powerpoint/2010/main" val="2206834930"/>
+              </p:ext>
+            </p:extLst>
           </p:nvPr>
-        </p:nvPicPr>
-        <p:blipFill>
-          <a:blip r:embed="rId2"/>
-          <a:srcRect l="-45562" r="-45562"/>
-          <a:stretch>
-            <a:fillRect/>
-          </a:stretch>
-        </p:blipFill>
-        <p:spPr>
-          <a:xfrm>
-            <a:off x="1146302" y="2605071"/>
-            <a:ext cx="6515381" cy="3325848"/>
-          </a:xfrm>
-        </p:spPr>
-      </p:pic>
+        </p:nvGraphicFramePr>
+        <p:xfrm>
+          <a:off x="3958420" y="2582952"/>
+          <a:ext cx="3263147" cy="1346882"/>
+        </p:xfrm>
+        <a:graphic>
+          <a:graphicData uri="http://schemas.openxmlformats.org/drawingml/2006/diagram">
+            <dgm:relIds xmlns:dgm="http://schemas.openxmlformats.org/drawingml/2006/diagram" xmlns:r="http://schemas.openxmlformats.org/officeDocument/2006/relationships" r:dm="rId4" r:lo="rId5" r:qs="rId6" r:cs="rId7"/>
+          </a:graphicData>
+        </a:graphic>
+      </p:graphicFrame>
     </p:spTree>
     <p:extLst>
       <p:ext uri="{BB962C8B-B14F-4D97-AF65-F5344CB8AC3E}">
@@ -28307,4 +31540,324 @@
   </a:objectDefaults>
   <a:extraClrSchemeLst/>
 </a:theme>
+</file>
+
+<file path=ppt/theme/theme2.xml><?xml version="1.0" encoding="utf-8"?>
+<a:theme xmlns:a="http://schemas.openxmlformats.org/drawingml/2006/main" name="Office Theme">
+  <a:themeElements>
+    <a:clrScheme name="Office">
+      <a:dk1>
+        <a:sysClr val="windowText" lastClr="000000"/>
+      </a:dk1>
+      <a:lt1>
+        <a:sysClr val="window" lastClr="FFFFFF"/>
+      </a:lt1>
+      <a:dk2>
+        <a:srgbClr val="1F497D"/>
+      </a:dk2>
+      <a:lt2>
+        <a:srgbClr val="EEECE1"/>
+      </a:lt2>
+      <a:accent1>
+        <a:srgbClr val="4F81BD"/>
+      </a:accent1>
+      <a:accent2>
+        <a:srgbClr val="C0504D"/>
+      </a:accent2>
+      <a:accent3>
+        <a:srgbClr val="9BBB59"/>
+      </a:accent3>
+      <a:accent4>
+        <a:srgbClr val="8064A2"/>
+      </a:accent4>
+      <a:accent5>
+        <a:srgbClr val="4BACC6"/>
+      </a:accent5>
+      <a:accent6>
+        <a:srgbClr val="F79646"/>
+      </a:accent6>
+      <a:hlink>
+        <a:srgbClr val="0000FF"/>
+      </a:hlink>
+      <a:folHlink>
+        <a:srgbClr val="800080"/>
+      </a:folHlink>
+    </a:clrScheme>
+    <a:fontScheme name="Office">
+      <a:majorFont>
+        <a:latin typeface="Calibri"/>
+        <a:ea typeface=""/>
+        <a:cs typeface=""/>
+        <a:font script="Jpan" typeface="ＭＳ Ｐゴシック"/>
+        <a:font script="Hang" typeface="맑은 고딕"/>
+        <a:font script="Hans" typeface="宋体"/>
+        <a:font script="Hant" typeface="新細明體"/>
+        <a:font script="Arab" typeface="Times New Roman"/>
+        <a:font script="Hebr" typeface="Times New Roman"/>
+        <a:font script="Thai" typeface="Angsana New"/>
+        <a:font script="Ethi" typeface="Nyala"/>
+        <a:font script="Beng" typeface="Vrinda"/>
+        <a:font script="Gujr" typeface="Shruti"/>
+        <a:font script="Khmr" typeface="MoolBoran"/>
+        <a:font script="Knda" typeface="Tunga"/>
+        <a:font script="Guru" typeface="Raavi"/>
+        <a:font script="Cans" typeface="Euphemia"/>
+        <a:font script="Cher" typeface="Plantagenet Cherokee"/>
+        <a:font script="Yiii" typeface="Microsoft Yi Baiti"/>
+        <a:font script="Tibt" typeface="Microsoft Himalaya"/>
+        <a:font script="Thaa" typeface="MV Boli"/>
+        <a:font script="Deva" typeface="Mangal"/>
+        <a:font script="Telu" typeface="Gautami"/>
+        <a:font script="Taml" typeface="Latha"/>
+        <a:font script="Syrc" typeface="Estrangelo Edessa"/>
+        <a:font script="Orya" typeface="Kalinga"/>
+        <a:font script="Mlym" typeface="Kartika"/>
+        <a:font script="Laoo" typeface="DokChampa"/>
+        <a:font script="Sinh" typeface="Iskoola Pota"/>
+        <a:font script="Mong" typeface="Mongolian Baiti"/>
+        <a:font script="Viet" typeface="Times New Roman"/>
+        <a:font script="Uigh" typeface="Microsoft Uighur"/>
+        <a:font script="Geor" typeface="Sylfaen"/>
+      </a:majorFont>
+      <a:minorFont>
+        <a:latin typeface="Calibri"/>
+        <a:ea typeface=""/>
+        <a:cs typeface=""/>
+        <a:font script="Jpan" typeface="ＭＳ Ｐゴシック"/>
+        <a:font script="Hang" typeface="맑은 고딕"/>
+        <a:font script="Hans" typeface="宋体"/>
+        <a:font script="Hant" typeface="新細明體"/>
+        <a:font script="Arab" typeface="Arial"/>
+        <a:font script="Hebr" typeface="Arial"/>
+        <a:font script="Thai" typeface="Cordia New"/>
+        <a:font script="Ethi" typeface="Nyala"/>
+        <a:font script="Beng" typeface="Vrinda"/>
+        <a:font script="Gujr" typeface="Shruti"/>
+        <a:font script="Khmr" typeface="DaunPenh"/>
+        <a:font script="Knda" typeface="Tunga"/>
+        <a:font script="Guru" typeface="Raavi"/>
+        <a:font script="Cans" typeface="Euphemia"/>
+        <a:font script="Cher" typeface="Plantagenet Cherokee"/>
+        <a:font script="Yiii" typeface="Microsoft Yi Baiti"/>
+        <a:font script="Tibt" typeface="Microsoft Himalaya"/>
+        <a:font script="Thaa" typeface="MV Boli"/>
+        <a:font script="Deva" typeface="Mangal"/>
+        <a:font script="Telu" typeface="Gautami"/>
+        <a:font script="Taml" typeface="Latha"/>
+        <a:font script="Syrc" typeface="Estrangelo Edessa"/>
+        <a:font script="Orya" typeface="Kalinga"/>
+        <a:font script="Mlym" typeface="Kartika"/>
+        <a:font script="Laoo" typeface="DokChampa"/>
+        <a:font script="Sinh" typeface="Iskoola Pota"/>
+        <a:font script="Mong" typeface="Mongolian Baiti"/>
+        <a:font script="Viet" typeface="Arial"/>
+        <a:font script="Uigh" typeface="Microsoft Uighur"/>
+        <a:font script="Geor" typeface="Sylfaen"/>
+      </a:minorFont>
+    </a:fontScheme>
+    <a:fmtScheme name="Office">
+      <a:fillStyleLst>
+        <a:solidFill>
+          <a:schemeClr val="phClr"/>
+        </a:solidFill>
+        <a:gradFill rotWithShape="1">
+          <a:gsLst>
+            <a:gs pos="0">
+              <a:schemeClr val="phClr">
+                <a:tint val="50000"/>
+                <a:satMod val="300000"/>
+              </a:schemeClr>
+            </a:gs>
+            <a:gs pos="35000">
+              <a:schemeClr val="phClr">
+                <a:tint val="37000"/>
+                <a:satMod val="300000"/>
+              </a:schemeClr>
+            </a:gs>
+            <a:gs pos="100000">
+              <a:schemeClr val="phClr">
+                <a:tint val="15000"/>
+                <a:satMod val="350000"/>
+              </a:schemeClr>
+            </a:gs>
+          </a:gsLst>
+          <a:lin ang="16200000" scaled="1"/>
+        </a:gradFill>
+        <a:gradFill rotWithShape="1">
+          <a:gsLst>
+            <a:gs pos="0">
+              <a:schemeClr val="phClr">
+                <a:tint val="100000"/>
+                <a:shade val="100000"/>
+                <a:satMod val="130000"/>
+              </a:schemeClr>
+            </a:gs>
+            <a:gs pos="100000">
+              <a:schemeClr val="phClr">
+                <a:tint val="50000"/>
+                <a:shade val="100000"/>
+                <a:satMod val="350000"/>
+              </a:schemeClr>
+            </a:gs>
+          </a:gsLst>
+          <a:lin ang="16200000" scaled="0"/>
+        </a:gradFill>
+      </a:fillStyleLst>
+      <a:lnStyleLst>
+        <a:ln w="9525" cap="flat" cmpd="sng" algn="ctr">
+          <a:solidFill>
+            <a:schemeClr val="phClr">
+              <a:shade val="95000"/>
+              <a:satMod val="105000"/>
+            </a:schemeClr>
+          </a:solidFill>
+          <a:prstDash val="solid"/>
+        </a:ln>
+        <a:ln w="25400" cap="flat" cmpd="sng" algn="ctr">
+          <a:solidFill>
+            <a:schemeClr val="phClr"/>
+          </a:solidFill>
+          <a:prstDash val="solid"/>
+        </a:ln>
+        <a:ln w="38100" cap="flat" cmpd="sng" algn="ctr">
+          <a:solidFill>
+            <a:schemeClr val="phClr"/>
+          </a:solidFill>
+          <a:prstDash val="solid"/>
+        </a:ln>
+      </a:lnStyleLst>
+      <a:effectStyleLst>
+        <a:effectStyle>
+          <a:effectLst>
+            <a:outerShdw blurRad="40000" dist="20000" dir="5400000" rotWithShape="0">
+              <a:srgbClr val="000000">
+                <a:alpha val="38000"/>
+              </a:srgbClr>
+            </a:outerShdw>
+          </a:effectLst>
+        </a:effectStyle>
+        <a:effectStyle>
+          <a:effectLst>
+            <a:outerShdw blurRad="40000" dist="23000" dir="5400000" rotWithShape="0">
+              <a:srgbClr val="000000">
+                <a:alpha val="35000"/>
+              </a:srgbClr>
+            </a:outerShdw>
+          </a:effectLst>
+        </a:effectStyle>
+        <a:effectStyle>
+          <a:effectLst>
+            <a:outerShdw blurRad="40000" dist="23000" dir="5400000" rotWithShape="0">
+              <a:srgbClr val="000000">
+                <a:alpha val="35000"/>
+              </a:srgbClr>
+            </a:outerShdw>
+          </a:effectLst>
+          <a:scene3d>
+            <a:camera prst="orthographicFront">
+              <a:rot lat="0" lon="0" rev="0"/>
+            </a:camera>
+            <a:lightRig rig="threePt" dir="t">
+              <a:rot lat="0" lon="0" rev="1200000"/>
+            </a:lightRig>
+          </a:scene3d>
+          <a:sp3d>
+            <a:bevelT w="63500" h="25400"/>
+          </a:sp3d>
+        </a:effectStyle>
+      </a:effectStyleLst>
+      <a:bgFillStyleLst>
+        <a:solidFill>
+          <a:schemeClr val="phClr"/>
+        </a:solidFill>
+        <a:gradFill rotWithShape="1">
+          <a:gsLst>
+            <a:gs pos="0">
+              <a:schemeClr val="phClr">
+                <a:tint val="40000"/>
+                <a:satMod val="350000"/>
+              </a:schemeClr>
+            </a:gs>
+            <a:gs pos="40000">
+              <a:schemeClr val="phClr">
+                <a:tint val="45000"/>
+                <a:shade val="99000"/>
+                <a:satMod val="350000"/>
+              </a:schemeClr>
+            </a:gs>
+            <a:gs pos="100000">
+              <a:schemeClr val="phClr">
+                <a:shade val="20000"/>
+                <a:satMod val="255000"/>
+              </a:schemeClr>
+            </a:gs>
+          </a:gsLst>
+          <a:path path="circle">
+            <a:fillToRect l="50000" t="-80000" r="50000" b="180000"/>
+          </a:path>
+        </a:gradFill>
+        <a:gradFill rotWithShape="1">
+          <a:gsLst>
+            <a:gs pos="0">
+              <a:schemeClr val="phClr">
+                <a:tint val="80000"/>
+                <a:satMod val="300000"/>
+              </a:schemeClr>
+            </a:gs>
+            <a:gs pos="100000">
+              <a:schemeClr val="phClr">
+                <a:shade val="30000"/>
+                <a:satMod val="200000"/>
+              </a:schemeClr>
+            </a:gs>
+          </a:gsLst>
+          <a:path path="circle">
+            <a:fillToRect l="50000" t="50000" r="50000" b="50000"/>
+          </a:path>
+        </a:gradFill>
+      </a:bgFillStyleLst>
+    </a:fmtScheme>
+  </a:themeElements>
+  <a:objectDefaults>
+    <a:spDef>
+      <a:spPr/>
+      <a:bodyPr/>
+      <a:lstStyle/>
+      <a:style>
+        <a:lnRef idx="1">
+          <a:schemeClr val="accent1"/>
+        </a:lnRef>
+        <a:fillRef idx="3">
+          <a:schemeClr val="accent1"/>
+        </a:fillRef>
+        <a:effectRef idx="2">
+          <a:schemeClr val="accent1"/>
+        </a:effectRef>
+        <a:fontRef idx="minor">
+          <a:schemeClr val="lt1"/>
+        </a:fontRef>
+      </a:style>
+    </a:spDef>
+    <a:lnDef>
+      <a:spPr/>
+      <a:bodyPr/>
+      <a:lstStyle/>
+      <a:style>
+        <a:lnRef idx="2">
+          <a:schemeClr val="accent1"/>
+        </a:lnRef>
+        <a:fillRef idx="0">
+          <a:schemeClr val="accent1"/>
+        </a:fillRef>
+        <a:effectRef idx="1">
+          <a:schemeClr val="accent1"/>
+        </a:effectRef>
+        <a:fontRef idx="minor">
+          <a:schemeClr val="tx1"/>
+        </a:fontRef>
+      </a:style>
+    </a:lnDef>
+  </a:objectDefaults>
+  <a:extraClrSchemeLst/>
+</a:theme>
 </file>
</xml_diff>

<commit_message>
syncing styles - minor issues there
</commit_message>
<xml_diff>
--- a/docs/presentations/LeanUx - IT Management.pptx
+++ b/docs/presentations/LeanUx - IT Management.pptx
@@ -32729,12 +32729,12 @@
           </a:p>
           <a:p>
             <a:r>
-              <a:rPr lang="en-US" sz="1800" b="1" dirty="0" err="1"/>
-              <a:t>CloudBerry</a:t>
+              <a:rPr lang="en-US" sz="1800" b="1" dirty="0" smtClean="0"/>
+              <a:t>Cloudberry </a:t>
             </a:r>
             <a:r>
               <a:rPr lang="en-US" sz="1800" b="1" dirty="0"/>
-              <a:t> Design, including iPad responsive </a:t>
+              <a:t>Design, including iPad responsive </a:t>
             </a:r>
             <a:r>
               <a:rPr lang="en-US" sz="1800" b="1" dirty="0" smtClean="0"/>
@@ -32763,7 +32763,7 @@
             </a:r>
             <a:r>
               <a:rPr lang="en-US" sz="1800" dirty="0" smtClean="0"/>
-              <a:t>Management, &amp; Automatic Deployment | 242 Commits</a:t>
+              <a:t>Management, &amp; Automatic Deployment | 250 Commits</a:t>
             </a:r>
             <a:endParaRPr lang="en-US" sz="1800" b="1" dirty="0" smtClean="0"/>
           </a:p>
@@ -33047,13 +33047,22 @@
           <a:p>
             <a:r>
               <a:rPr lang="en-US" sz="1800" b="1" dirty="0" smtClean="0"/>
-              <a:t>Complimentary Data Storage Mechanism Used</a:t>
+              <a:t>Complimentary Data Storage Mechanism Used </a:t>
             </a:r>
+            <a:r>
+              <a:rPr lang="en-US" sz="1800" dirty="0" smtClean="0"/>
+              <a:t>(Document DB)</a:t>
+            </a:r>
+            <a:endParaRPr lang="en-US" sz="1800" b="1" dirty="0" smtClean="0"/>
           </a:p>
           <a:p>
             <a:r>
+              <a:rPr lang="en-US" sz="1800" b="1" smtClean="0"/>
+              <a:t>Continuous Delivery Ready</a:t>
+            </a:r>
+            <a:r>
               <a:rPr lang="en-US" sz="1800" b="1" dirty="0" smtClean="0"/>
-              <a:t>Continuous Delivery-Enabled </a:t>
+              <a:t/>
             </a:r>
             <a:br>
               <a:rPr lang="en-US" sz="1800" b="1" dirty="0" smtClean="0"/>

</xml_diff>

<commit_message>
had to hard code refereshing of the right side bar save value since new success views are shown; commented out lastSaved base model override - seems to have stopped working; last saved added to each step now
</commit_message>
<xml_diff>
--- a/docs/presentations/LeanUx - IT Management.pptx
+++ b/docs/presentations/LeanUx - IT Management.pptx
@@ -32237,7 +32237,7 @@
         </p:blipFill>
         <p:spPr>
           <a:xfrm>
-            <a:off x="6929013" y="2114449"/>
+            <a:off x="6845583" y="2114449"/>
             <a:ext cx="1933972" cy="611135"/>
           </a:xfrm>
           <a:prstGeom prst="rect">
@@ -33057,12 +33057,8 @@
           </a:p>
           <a:p>
             <a:r>
-              <a:rPr lang="en-US" sz="1800" b="1" smtClean="0"/>
+              <a:rPr lang="en-US" sz="1800" b="1" dirty="0" smtClean="0"/>
               <a:t>Continuous Delivery Ready</a:t>
-            </a:r>
-            <a:r>
-              <a:rPr lang="en-US" sz="1800" b="1" dirty="0" smtClean="0"/>
-              <a:t/>
             </a:r>
             <a:br>
               <a:rPr lang="en-US" sz="1800" b="1" dirty="0" smtClean="0"/>
@@ -33405,10 +33401,10 @@
           <a:p>
             <a:pPr algn="ctr"/>
             <a:r>
-              <a:rPr lang="en-US" sz="3600" dirty="0" smtClean="0"/>
+              <a:rPr lang="en-US" sz="3600" i="1" dirty="0" smtClean="0"/>
               <a:t>…all in 45 cumulative days.</a:t>
             </a:r>
-            <a:endParaRPr lang="en-US" sz="3600" dirty="0"/>
+            <a:endParaRPr lang="en-US" sz="3600" i="1" dirty="0"/>
           </a:p>
         </p:txBody>
       </p:sp>

</xml_diff>